<commit_message>
alteração arquivo primeira apresentacao
</commit_message>
<xml_diff>
--- a/primeira entrega.pptx
+++ b/primeira entrega.pptx
@@ -11,6 +11,8 @@
     <p:sldId id="259" r:id="rId6"/>
     <p:sldId id="260" r:id="rId7"/>
     <p:sldId id="261" r:id="rId8"/>
+    <p:sldId id="262" r:id="rId9"/>
+    <p:sldId id="263" r:id="rId10"/>
   </p:sldIdLst>
   <p:sldSz cx="12192000" cy="6858000"/>
   <p:notesSz cx="7559675" cy="10691812"/>
@@ -69,7 +71,7 @@
         <p:spPr>
           <a:xfrm>
             <a:off x="1523880" y="1122480"/>
-            <a:ext cx="9143280" cy="2386800"/>
+            <a:ext cx="9142920" cy="2386440"/>
           </a:xfrm>
           <a:prstGeom prst="rect">
             <a:avLst/>
@@ -78,10 +80,8 @@
         <p:txBody>
           <a:bodyPr lIns="0" rIns="0" tIns="0" bIns="0" anchor="ctr"/>
           <a:p>
-            <a:endParaRPr b="0" lang="pt-BR" sz="1800" spc="-1" strike="noStrike">
-              <a:solidFill>
-                <a:srgbClr val="000000"/>
-              </a:solidFill>
+            <a:pPr algn="ctr"/>
+            <a:endParaRPr b="0" lang="pt-BR" sz="4400" spc="-1" strike="noStrike">
               <a:latin typeface="Arial"/>
             </a:endParaRPr>
           </a:p>
@@ -100,7 +100,7 @@
         <p:spPr>
           <a:xfrm>
             <a:off x="609480" y="1604520"/>
-            <a:ext cx="10972440" cy="1896840"/>
+            <a:ext cx="10972080" cy="1896840"/>
           </a:xfrm>
           <a:prstGeom prst="rect">
             <a:avLst/>
@@ -111,10 +111,7 @@
             <a:normAutofit/>
           </a:bodyPr>
           <a:p>
-            <a:endParaRPr b="0" lang="pt-BR" sz="2800" spc="-1" strike="noStrike">
-              <a:solidFill>
-                <a:srgbClr val="000000"/>
-              </a:solidFill>
+            <a:endParaRPr b="0" lang="pt-BR" sz="3200" spc="-1" strike="noStrike">
               <a:latin typeface="Arial"/>
             </a:endParaRPr>
           </a:p>
@@ -133,7 +130,7 @@
         <p:spPr>
           <a:xfrm>
             <a:off x="609480" y="3682080"/>
-            <a:ext cx="10972440" cy="1896840"/>
+            <a:ext cx="10972080" cy="1896840"/>
           </a:xfrm>
           <a:prstGeom prst="rect">
             <a:avLst/>
@@ -144,10 +141,7 @@
             <a:normAutofit/>
           </a:bodyPr>
           <a:p>
-            <a:endParaRPr b="0" lang="pt-BR" sz="2800" spc="-1" strike="noStrike">
-              <a:solidFill>
-                <a:srgbClr val="000000"/>
-              </a:solidFill>
+            <a:endParaRPr b="0" lang="pt-BR" sz="3200" spc="-1" strike="noStrike">
               <a:latin typeface="Arial"/>
             </a:endParaRPr>
           </a:p>
@@ -188,7 +182,7 @@
         <p:spPr>
           <a:xfrm>
             <a:off x="1523880" y="1122480"/>
-            <a:ext cx="9143280" cy="2386800"/>
+            <a:ext cx="9142920" cy="2386440"/>
           </a:xfrm>
           <a:prstGeom prst="rect">
             <a:avLst/>
@@ -197,10 +191,8 @@
         <p:txBody>
           <a:bodyPr lIns="0" rIns="0" tIns="0" bIns="0" anchor="ctr"/>
           <a:p>
-            <a:endParaRPr b="0" lang="pt-BR" sz="1800" spc="-1" strike="noStrike">
-              <a:solidFill>
-                <a:srgbClr val="000000"/>
-              </a:solidFill>
+            <a:pPr algn="ctr"/>
+            <a:endParaRPr b="0" lang="pt-BR" sz="4400" spc="-1" strike="noStrike">
               <a:latin typeface="Arial"/>
             </a:endParaRPr>
           </a:p>
@@ -230,10 +222,7 @@
             <a:normAutofit/>
           </a:bodyPr>
           <a:p>
-            <a:endParaRPr b="0" lang="pt-BR" sz="2800" spc="-1" strike="noStrike">
-              <a:solidFill>
-                <a:srgbClr val="000000"/>
-              </a:solidFill>
+            <a:endParaRPr b="0" lang="pt-BR" sz="3200" spc="-1" strike="noStrike">
               <a:latin typeface="Arial"/>
             </a:endParaRPr>
           </a:p>
@@ -263,10 +252,7 @@
             <a:normAutofit/>
           </a:bodyPr>
           <a:p>
-            <a:endParaRPr b="0" lang="pt-BR" sz="2800" spc="-1" strike="noStrike">
-              <a:solidFill>
-                <a:srgbClr val="000000"/>
-              </a:solidFill>
+            <a:endParaRPr b="0" lang="pt-BR" sz="3200" spc="-1" strike="noStrike">
               <a:latin typeface="Arial"/>
             </a:endParaRPr>
           </a:p>
@@ -296,10 +282,7 @@
             <a:normAutofit/>
           </a:bodyPr>
           <a:p>
-            <a:endParaRPr b="0" lang="pt-BR" sz="2800" spc="-1" strike="noStrike">
-              <a:solidFill>
-                <a:srgbClr val="000000"/>
-              </a:solidFill>
+            <a:endParaRPr b="0" lang="pt-BR" sz="3200" spc="-1" strike="noStrike">
               <a:latin typeface="Arial"/>
             </a:endParaRPr>
           </a:p>
@@ -329,10 +312,7 @@
             <a:normAutofit/>
           </a:bodyPr>
           <a:p>
-            <a:endParaRPr b="0" lang="pt-BR" sz="2800" spc="-1" strike="noStrike">
-              <a:solidFill>
-                <a:srgbClr val="000000"/>
-              </a:solidFill>
+            <a:endParaRPr b="0" lang="pt-BR" sz="3200" spc="-1" strike="noStrike">
               <a:latin typeface="Arial"/>
             </a:endParaRPr>
           </a:p>
@@ -373,7 +353,7 @@
         <p:spPr>
           <a:xfrm>
             <a:off x="1523880" y="1122480"/>
-            <a:ext cx="9143280" cy="2386800"/>
+            <a:ext cx="9142920" cy="2386440"/>
           </a:xfrm>
           <a:prstGeom prst="rect">
             <a:avLst/>
@@ -382,10 +362,8 @@
         <p:txBody>
           <a:bodyPr lIns="0" rIns="0" tIns="0" bIns="0" anchor="ctr"/>
           <a:p>
-            <a:endParaRPr b="0" lang="pt-BR" sz="1800" spc="-1" strike="noStrike">
-              <a:solidFill>
-                <a:srgbClr val="000000"/>
-              </a:solidFill>
+            <a:pPr algn="ctr"/>
+            <a:endParaRPr b="0" lang="pt-BR" sz="4400" spc="-1" strike="noStrike">
               <a:latin typeface="Arial"/>
             </a:endParaRPr>
           </a:p>
@@ -404,7 +382,7 @@
         <p:spPr>
           <a:xfrm>
             <a:off x="609480" y="1604520"/>
-            <a:ext cx="3533040" cy="1896840"/>
+            <a:ext cx="3532680" cy="1896840"/>
           </a:xfrm>
           <a:prstGeom prst="rect">
             <a:avLst/>
@@ -415,10 +393,7 @@
             <a:normAutofit/>
           </a:bodyPr>
           <a:p>
-            <a:endParaRPr b="0" lang="pt-BR" sz="2800" spc="-1" strike="noStrike">
-              <a:solidFill>
-                <a:srgbClr val="000000"/>
-              </a:solidFill>
+            <a:endParaRPr b="0" lang="pt-BR" sz="3200" spc="-1" strike="noStrike">
               <a:latin typeface="Arial"/>
             </a:endParaRPr>
           </a:p>
@@ -436,8 +411,8 @@
         </p:nvSpPr>
         <p:spPr>
           <a:xfrm>
-            <a:off x="4319640" y="1604520"/>
-            <a:ext cx="3533040" cy="1896840"/>
+            <a:off x="4319280" y="1604520"/>
+            <a:ext cx="3532680" cy="1896840"/>
           </a:xfrm>
           <a:prstGeom prst="rect">
             <a:avLst/>
@@ -448,10 +423,7 @@
             <a:normAutofit/>
           </a:bodyPr>
           <a:p>
-            <a:endParaRPr b="0" lang="pt-BR" sz="2800" spc="-1" strike="noStrike">
-              <a:solidFill>
-                <a:srgbClr val="000000"/>
-              </a:solidFill>
+            <a:endParaRPr b="0" lang="pt-BR" sz="3200" spc="-1" strike="noStrike">
               <a:latin typeface="Arial"/>
             </a:endParaRPr>
           </a:p>
@@ -469,8 +441,8 @@
         </p:nvSpPr>
         <p:spPr>
           <a:xfrm>
-            <a:off x="8029800" y="1604520"/>
-            <a:ext cx="3533040" cy="1896840"/>
+            <a:off x="8028720" y="1604520"/>
+            <a:ext cx="3532680" cy="1896840"/>
           </a:xfrm>
           <a:prstGeom prst="rect">
             <a:avLst/>
@@ -481,10 +453,7 @@
             <a:normAutofit/>
           </a:bodyPr>
           <a:p>
-            <a:endParaRPr b="0" lang="pt-BR" sz="2800" spc="-1" strike="noStrike">
-              <a:solidFill>
-                <a:srgbClr val="000000"/>
-              </a:solidFill>
+            <a:endParaRPr b="0" lang="pt-BR" sz="3200" spc="-1" strike="noStrike">
               <a:latin typeface="Arial"/>
             </a:endParaRPr>
           </a:p>
@@ -503,7 +472,7 @@
         <p:spPr>
           <a:xfrm>
             <a:off x="609480" y="3682080"/>
-            <a:ext cx="3533040" cy="1896840"/>
+            <a:ext cx="3532680" cy="1896840"/>
           </a:xfrm>
           <a:prstGeom prst="rect">
             <a:avLst/>
@@ -514,10 +483,7 @@
             <a:normAutofit/>
           </a:bodyPr>
           <a:p>
-            <a:endParaRPr b="0" lang="pt-BR" sz="2800" spc="-1" strike="noStrike">
-              <a:solidFill>
-                <a:srgbClr val="000000"/>
-              </a:solidFill>
+            <a:endParaRPr b="0" lang="pt-BR" sz="3200" spc="-1" strike="noStrike">
               <a:latin typeface="Arial"/>
             </a:endParaRPr>
           </a:p>
@@ -535,8 +501,8 @@
         </p:nvSpPr>
         <p:spPr>
           <a:xfrm>
-            <a:off x="4319640" y="3682080"/>
-            <a:ext cx="3533040" cy="1896840"/>
+            <a:off x="4319280" y="3682080"/>
+            <a:ext cx="3532680" cy="1896840"/>
           </a:xfrm>
           <a:prstGeom prst="rect">
             <a:avLst/>
@@ -547,10 +513,7 @@
             <a:normAutofit/>
           </a:bodyPr>
           <a:p>
-            <a:endParaRPr b="0" lang="pt-BR" sz="2800" spc="-1" strike="noStrike">
-              <a:solidFill>
-                <a:srgbClr val="000000"/>
-              </a:solidFill>
+            <a:endParaRPr b="0" lang="pt-BR" sz="3200" spc="-1" strike="noStrike">
               <a:latin typeface="Arial"/>
             </a:endParaRPr>
           </a:p>
@@ -568,8 +531,8 @@
         </p:nvSpPr>
         <p:spPr>
           <a:xfrm>
-            <a:off x="8029800" y="3682080"/>
-            <a:ext cx="3533040" cy="1896840"/>
+            <a:off x="8028720" y="3682080"/>
+            <a:ext cx="3532680" cy="1896840"/>
           </a:xfrm>
           <a:prstGeom prst="rect">
             <a:avLst/>
@@ -580,10 +543,7 @@
             <a:normAutofit/>
           </a:bodyPr>
           <a:p>
-            <a:endParaRPr b="0" lang="pt-BR" sz="2800" spc="-1" strike="noStrike">
-              <a:solidFill>
-                <a:srgbClr val="000000"/>
-              </a:solidFill>
+            <a:endParaRPr b="0" lang="pt-BR" sz="3200" spc="-1" strike="noStrike">
               <a:latin typeface="Arial"/>
             </a:endParaRPr>
           </a:p>
@@ -624,7 +584,7 @@
         <p:spPr>
           <a:xfrm>
             <a:off x="1523880" y="1122480"/>
-            <a:ext cx="9143280" cy="2386800"/>
+            <a:ext cx="9142920" cy="2386440"/>
           </a:xfrm>
           <a:prstGeom prst="rect">
             <a:avLst/>
@@ -633,10 +593,8 @@
         <p:txBody>
           <a:bodyPr lIns="0" rIns="0" tIns="0" bIns="0" anchor="ctr"/>
           <a:p>
-            <a:endParaRPr b="0" lang="pt-BR" sz="1800" spc="-1" strike="noStrike">
-              <a:solidFill>
-                <a:srgbClr val="000000"/>
-              </a:solidFill>
+            <a:pPr algn="ctr"/>
+            <a:endParaRPr b="0" lang="pt-BR" sz="4400" spc="-1" strike="noStrike">
               <a:latin typeface="Arial"/>
             </a:endParaRPr>
           </a:p>
@@ -655,7 +613,7 @@
         <p:spPr>
           <a:xfrm>
             <a:off x="609480" y="1604520"/>
-            <a:ext cx="10972440" cy="3977280"/>
+            <a:ext cx="10972080" cy="3976920"/>
           </a:xfrm>
           <a:prstGeom prst="rect">
             <a:avLst/>
@@ -706,7 +664,7 @@
         <p:spPr>
           <a:xfrm>
             <a:off x="1523880" y="1122480"/>
-            <a:ext cx="9143280" cy="2386800"/>
+            <a:ext cx="9142920" cy="2386440"/>
           </a:xfrm>
           <a:prstGeom prst="rect">
             <a:avLst/>
@@ -715,10 +673,8 @@
         <p:txBody>
           <a:bodyPr lIns="0" rIns="0" tIns="0" bIns="0" anchor="ctr"/>
           <a:p>
-            <a:endParaRPr b="0" lang="pt-BR" sz="1800" spc="-1" strike="noStrike">
-              <a:solidFill>
-                <a:srgbClr val="000000"/>
-              </a:solidFill>
+            <a:pPr algn="ctr"/>
+            <a:endParaRPr b="0" lang="pt-BR" sz="4400" spc="-1" strike="noStrike">
               <a:latin typeface="Arial"/>
             </a:endParaRPr>
           </a:p>
@@ -737,7 +693,7 @@
         <p:spPr>
           <a:xfrm>
             <a:off x="609480" y="1604520"/>
-            <a:ext cx="10972440" cy="3977280"/>
+            <a:ext cx="10972080" cy="3976920"/>
           </a:xfrm>
           <a:prstGeom prst="rect">
             <a:avLst/>
@@ -748,10 +704,7 @@
             <a:normAutofit/>
           </a:bodyPr>
           <a:p>
-            <a:endParaRPr b="0" lang="pt-BR" sz="2800" spc="-1" strike="noStrike">
-              <a:solidFill>
-                <a:srgbClr val="000000"/>
-              </a:solidFill>
+            <a:endParaRPr b="0" lang="pt-BR" sz="3200" spc="-1" strike="noStrike">
               <a:latin typeface="Arial"/>
             </a:endParaRPr>
           </a:p>
@@ -792,7 +745,7 @@
         <p:spPr>
           <a:xfrm>
             <a:off x="1523880" y="1122480"/>
-            <a:ext cx="9143280" cy="2386800"/>
+            <a:ext cx="9142920" cy="2386440"/>
           </a:xfrm>
           <a:prstGeom prst="rect">
             <a:avLst/>
@@ -801,10 +754,8 @@
         <p:txBody>
           <a:bodyPr lIns="0" rIns="0" tIns="0" bIns="0" anchor="ctr"/>
           <a:p>
-            <a:endParaRPr b="0" lang="pt-BR" sz="1800" spc="-1" strike="noStrike">
-              <a:solidFill>
-                <a:srgbClr val="000000"/>
-              </a:solidFill>
+            <a:pPr algn="ctr"/>
+            <a:endParaRPr b="0" lang="pt-BR" sz="4400" spc="-1" strike="noStrike">
               <a:latin typeface="Arial"/>
             </a:endParaRPr>
           </a:p>
@@ -823,7 +774,7 @@
         <p:spPr>
           <a:xfrm>
             <a:off x="609480" y="1604520"/>
-            <a:ext cx="5354280" cy="3977280"/>
+            <a:ext cx="5354280" cy="3976920"/>
           </a:xfrm>
           <a:prstGeom prst="rect">
             <a:avLst/>
@@ -834,10 +785,7 @@
             <a:normAutofit/>
           </a:bodyPr>
           <a:p>
-            <a:endParaRPr b="0" lang="pt-BR" sz="2800" spc="-1" strike="noStrike">
-              <a:solidFill>
-                <a:srgbClr val="000000"/>
-              </a:solidFill>
+            <a:endParaRPr b="0" lang="pt-BR" sz="3200" spc="-1" strike="noStrike">
               <a:latin typeface="Arial"/>
             </a:endParaRPr>
           </a:p>
@@ -856,7 +804,7 @@
         <p:spPr>
           <a:xfrm>
             <a:off x="6231960" y="1604520"/>
-            <a:ext cx="5354280" cy="3977280"/>
+            <a:ext cx="5354280" cy="3976920"/>
           </a:xfrm>
           <a:prstGeom prst="rect">
             <a:avLst/>
@@ -867,10 +815,7 @@
             <a:normAutofit/>
           </a:bodyPr>
           <a:p>
-            <a:endParaRPr b="0" lang="pt-BR" sz="2800" spc="-1" strike="noStrike">
-              <a:solidFill>
-                <a:srgbClr val="000000"/>
-              </a:solidFill>
+            <a:endParaRPr b="0" lang="pt-BR" sz="3200" spc="-1" strike="noStrike">
               <a:latin typeface="Arial"/>
             </a:endParaRPr>
           </a:p>
@@ -911,7 +856,7 @@
         <p:spPr>
           <a:xfrm>
             <a:off x="1523880" y="1122480"/>
-            <a:ext cx="9143280" cy="2386800"/>
+            <a:ext cx="9142920" cy="2386440"/>
           </a:xfrm>
           <a:prstGeom prst="rect">
             <a:avLst/>
@@ -920,10 +865,8 @@
         <p:txBody>
           <a:bodyPr lIns="0" rIns="0" tIns="0" bIns="0" anchor="ctr"/>
           <a:p>
-            <a:endParaRPr b="0" lang="pt-BR" sz="1800" spc="-1" strike="noStrike">
-              <a:solidFill>
-                <a:srgbClr val="000000"/>
-              </a:solidFill>
+            <a:pPr algn="ctr"/>
+            <a:endParaRPr b="0" lang="pt-BR" sz="4400" spc="-1" strike="noStrike">
               <a:latin typeface="Arial"/>
             </a:endParaRPr>
           </a:p>
@@ -964,7 +907,7 @@
         <p:spPr>
           <a:xfrm>
             <a:off x="1523880" y="1122480"/>
-            <a:ext cx="9143280" cy="11064960"/>
+            <a:ext cx="9142920" cy="11063520"/>
           </a:xfrm>
           <a:prstGeom prst="rect">
             <a:avLst/>
@@ -1015,7 +958,7 @@
         <p:spPr>
           <a:xfrm>
             <a:off x="1523880" y="1122480"/>
-            <a:ext cx="9143280" cy="2386800"/>
+            <a:ext cx="9142920" cy="2386440"/>
           </a:xfrm>
           <a:prstGeom prst="rect">
             <a:avLst/>
@@ -1024,10 +967,8 @@
         <p:txBody>
           <a:bodyPr lIns="0" rIns="0" tIns="0" bIns="0" anchor="ctr"/>
           <a:p>
-            <a:endParaRPr b="0" lang="pt-BR" sz="1800" spc="-1" strike="noStrike">
-              <a:solidFill>
-                <a:srgbClr val="000000"/>
-              </a:solidFill>
+            <a:pPr algn="ctr"/>
+            <a:endParaRPr b="0" lang="pt-BR" sz="4400" spc="-1" strike="noStrike">
               <a:latin typeface="Arial"/>
             </a:endParaRPr>
           </a:p>
@@ -1057,10 +998,7 @@
             <a:normAutofit/>
           </a:bodyPr>
           <a:p>
-            <a:endParaRPr b="0" lang="pt-BR" sz="2800" spc="-1" strike="noStrike">
-              <a:solidFill>
-                <a:srgbClr val="000000"/>
-              </a:solidFill>
+            <a:endParaRPr b="0" lang="pt-BR" sz="3200" spc="-1" strike="noStrike">
               <a:latin typeface="Arial"/>
             </a:endParaRPr>
           </a:p>
@@ -1079,7 +1017,7 @@
         <p:spPr>
           <a:xfrm>
             <a:off x="6231960" y="1604520"/>
-            <a:ext cx="5354280" cy="3977280"/>
+            <a:ext cx="5354280" cy="3976920"/>
           </a:xfrm>
           <a:prstGeom prst="rect">
             <a:avLst/>
@@ -1090,10 +1028,7 @@
             <a:normAutofit/>
           </a:bodyPr>
           <a:p>
-            <a:endParaRPr b="0" lang="pt-BR" sz="2800" spc="-1" strike="noStrike">
-              <a:solidFill>
-                <a:srgbClr val="000000"/>
-              </a:solidFill>
+            <a:endParaRPr b="0" lang="pt-BR" sz="3200" spc="-1" strike="noStrike">
               <a:latin typeface="Arial"/>
             </a:endParaRPr>
           </a:p>
@@ -1123,10 +1058,7 @@
             <a:normAutofit/>
           </a:bodyPr>
           <a:p>
-            <a:endParaRPr b="0" lang="pt-BR" sz="2800" spc="-1" strike="noStrike">
-              <a:solidFill>
-                <a:srgbClr val="000000"/>
-              </a:solidFill>
+            <a:endParaRPr b="0" lang="pt-BR" sz="3200" spc="-1" strike="noStrike">
               <a:latin typeface="Arial"/>
             </a:endParaRPr>
           </a:p>
@@ -1167,7 +1099,7 @@
         <p:spPr>
           <a:xfrm>
             <a:off x="1523880" y="1122480"/>
-            <a:ext cx="9143280" cy="2386800"/>
+            <a:ext cx="9142920" cy="2386440"/>
           </a:xfrm>
           <a:prstGeom prst="rect">
             <a:avLst/>
@@ -1176,10 +1108,8 @@
         <p:txBody>
           <a:bodyPr lIns="0" rIns="0" tIns="0" bIns="0" anchor="ctr"/>
           <a:p>
-            <a:endParaRPr b="0" lang="pt-BR" sz="1800" spc="-1" strike="noStrike">
-              <a:solidFill>
-                <a:srgbClr val="000000"/>
-              </a:solidFill>
+            <a:pPr algn="ctr"/>
+            <a:endParaRPr b="0" lang="pt-BR" sz="4400" spc="-1" strike="noStrike">
               <a:latin typeface="Arial"/>
             </a:endParaRPr>
           </a:p>
@@ -1198,7 +1128,7 @@
         <p:spPr>
           <a:xfrm>
             <a:off x="609480" y="1604520"/>
-            <a:ext cx="5354280" cy="3977280"/>
+            <a:ext cx="5354280" cy="3976920"/>
           </a:xfrm>
           <a:prstGeom prst="rect">
             <a:avLst/>
@@ -1209,10 +1139,7 @@
             <a:normAutofit/>
           </a:bodyPr>
           <a:p>
-            <a:endParaRPr b="0" lang="pt-BR" sz="2800" spc="-1" strike="noStrike">
-              <a:solidFill>
-                <a:srgbClr val="000000"/>
-              </a:solidFill>
+            <a:endParaRPr b="0" lang="pt-BR" sz="3200" spc="-1" strike="noStrike">
               <a:latin typeface="Arial"/>
             </a:endParaRPr>
           </a:p>
@@ -1242,10 +1169,7 @@
             <a:normAutofit/>
           </a:bodyPr>
           <a:p>
-            <a:endParaRPr b="0" lang="pt-BR" sz="2800" spc="-1" strike="noStrike">
-              <a:solidFill>
-                <a:srgbClr val="000000"/>
-              </a:solidFill>
+            <a:endParaRPr b="0" lang="pt-BR" sz="3200" spc="-1" strike="noStrike">
               <a:latin typeface="Arial"/>
             </a:endParaRPr>
           </a:p>
@@ -1275,10 +1199,7 @@
             <a:normAutofit/>
           </a:bodyPr>
           <a:p>
-            <a:endParaRPr b="0" lang="pt-BR" sz="2800" spc="-1" strike="noStrike">
-              <a:solidFill>
-                <a:srgbClr val="000000"/>
-              </a:solidFill>
+            <a:endParaRPr b="0" lang="pt-BR" sz="3200" spc="-1" strike="noStrike">
               <a:latin typeface="Arial"/>
             </a:endParaRPr>
           </a:p>
@@ -1319,7 +1240,7 @@
         <p:spPr>
           <a:xfrm>
             <a:off x="1523880" y="1122480"/>
-            <a:ext cx="9143280" cy="2386800"/>
+            <a:ext cx="9142920" cy="2386440"/>
           </a:xfrm>
           <a:prstGeom prst="rect">
             <a:avLst/>
@@ -1328,10 +1249,8 @@
         <p:txBody>
           <a:bodyPr lIns="0" rIns="0" tIns="0" bIns="0" anchor="ctr"/>
           <a:p>
-            <a:endParaRPr b="0" lang="pt-BR" sz="1800" spc="-1" strike="noStrike">
-              <a:solidFill>
-                <a:srgbClr val="000000"/>
-              </a:solidFill>
+            <a:pPr algn="ctr"/>
+            <a:endParaRPr b="0" lang="pt-BR" sz="4400" spc="-1" strike="noStrike">
               <a:latin typeface="Arial"/>
             </a:endParaRPr>
           </a:p>
@@ -1361,10 +1280,7 @@
             <a:normAutofit/>
           </a:bodyPr>
           <a:p>
-            <a:endParaRPr b="0" lang="pt-BR" sz="2800" spc="-1" strike="noStrike">
-              <a:solidFill>
-                <a:srgbClr val="000000"/>
-              </a:solidFill>
+            <a:endParaRPr b="0" lang="pt-BR" sz="3200" spc="-1" strike="noStrike">
               <a:latin typeface="Arial"/>
             </a:endParaRPr>
           </a:p>
@@ -1394,10 +1310,7 @@
             <a:normAutofit/>
           </a:bodyPr>
           <a:p>
-            <a:endParaRPr b="0" lang="pt-BR" sz="2800" spc="-1" strike="noStrike">
-              <a:solidFill>
-                <a:srgbClr val="000000"/>
-              </a:solidFill>
+            <a:endParaRPr b="0" lang="pt-BR" sz="3200" spc="-1" strike="noStrike">
               <a:latin typeface="Arial"/>
             </a:endParaRPr>
           </a:p>
@@ -1416,7 +1329,7 @@
         <p:spPr>
           <a:xfrm>
             <a:off x="609480" y="3682080"/>
-            <a:ext cx="10972440" cy="1896840"/>
+            <a:ext cx="10972080" cy="1896840"/>
           </a:xfrm>
           <a:prstGeom prst="rect">
             <a:avLst/>
@@ -1427,10 +1340,7 @@
             <a:normAutofit/>
           </a:bodyPr>
           <a:p>
-            <a:endParaRPr b="0" lang="pt-BR" sz="2800" spc="-1" strike="noStrike">
-              <a:solidFill>
-                <a:srgbClr val="000000"/>
-              </a:solidFill>
+            <a:endParaRPr b="0" lang="pt-BR" sz="3200" spc="-1" strike="noStrike">
               <a:latin typeface="Arial"/>
             </a:endParaRPr>
           </a:p>
@@ -1478,7 +1388,7 @@
         <p:spPr>
           <a:xfrm>
             <a:off x="1523880" y="1122480"/>
-            <a:ext cx="9143280" cy="2386800"/>
+            <a:ext cx="9142920" cy="2386440"/>
           </a:xfrm>
           <a:prstGeom prst="rect">
             <a:avLst/>
@@ -1488,27 +1398,42 @@
           <a:bodyPr lIns="0" rIns="0" tIns="0" bIns="0" anchor="ctr"/>
           <a:p>
             <a:r>
-              <a:rPr b="0" lang="pt-BR" sz="4400" spc="-1" strike="noStrike">
-                <a:solidFill>
-                  <a:srgbClr val="000000"/>
-                </a:solidFill>
-                <a:latin typeface="Arial"/>
-              </a:rPr>
-              <a:t>Clique para editar o formato do texto do </a:t>
-            </a:r>
-            <a:r>
-              <a:rPr b="0" lang="pt-BR" sz="4400" spc="-1" strike="noStrike">
-                <a:solidFill>
-                  <a:srgbClr val="000000"/>
-                </a:solidFill>
-                <a:latin typeface="Arial"/>
-              </a:rPr>
-              <a:t>título</a:t>
-            </a:r>
-            <a:endParaRPr b="0" lang="pt-BR" sz="4400" spc="-1" strike="noStrike">
-              <a:solidFill>
-                <a:srgbClr val="000000"/>
-              </a:solidFill>
+              <a:rPr b="0" lang="pt-BR" sz="1800" spc="-1" strike="noStrike">
+                <a:latin typeface="Arial"/>
+              </a:rPr>
+              <a:t>Clique </a:t>
+            </a:r>
+            <a:r>
+              <a:rPr b="0" lang="pt-BR" sz="1800" spc="-1" strike="noStrike">
+                <a:latin typeface="Arial"/>
+              </a:rPr>
+              <a:t>para </a:t>
+            </a:r>
+            <a:r>
+              <a:rPr b="0" lang="pt-BR" sz="1800" spc="-1" strike="noStrike">
+                <a:latin typeface="Arial"/>
+              </a:rPr>
+              <a:t>editar o </a:t>
+            </a:r>
+            <a:r>
+              <a:rPr b="0" lang="pt-BR" sz="1800" spc="-1" strike="noStrike">
+                <a:latin typeface="Arial"/>
+              </a:rPr>
+              <a:t>formato </a:t>
+            </a:r>
+            <a:r>
+              <a:rPr b="0" lang="pt-BR" sz="1800" spc="-1" strike="noStrike">
+                <a:latin typeface="Arial"/>
+              </a:rPr>
+              <a:t>do texto </a:t>
+            </a:r>
+            <a:r>
+              <a:rPr b="0" lang="pt-BR" sz="1800" spc="-1" strike="noStrike">
+                <a:latin typeface="Arial"/>
+              </a:rPr>
+              <a:t>do título</a:t>
+            </a:r>
+            <a:endParaRPr b="0" lang="pt-BR" sz="1800" spc="-1" strike="noStrike">
               <a:latin typeface="Arial"/>
             </a:endParaRPr>
           </a:p>
@@ -1527,7 +1452,7 @@
         <p:spPr>
           <a:xfrm>
             <a:off x="609480" y="1604520"/>
-            <a:ext cx="10972440" cy="3977280"/>
+            <a:ext cx="10972080" cy="3976920"/>
           </a:xfrm>
           <a:prstGeom prst="rect">
             <a:avLst/>
@@ -1550,18 +1475,12 @@
               <a:buChar char=""/>
             </a:pPr>
             <a:r>
-              <a:rPr b="0" lang="pt-BR" sz="2800" spc="-1" strike="noStrike">
-                <a:solidFill>
-                  <a:srgbClr val="000000"/>
-                </a:solidFill>
+              <a:rPr b="0" lang="pt-BR" sz="1800" spc="-1" strike="noStrike">
                 <a:latin typeface="Arial"/>
               </a:rPr>
               <a:t>Clique para editar o formato do texto da estrutura de tópicos</a:t>
             </a:r>
-            <a:endParaRPr b="0" lang="pt-BR" sz="2800" spc="-1" strike="noStrike">
-              <a:solidFill>
-                <a:srgbClr val="000000"/>
-              </a:solidFill>
+            <a:endParaRPr b="0" lang="pt-BR" sz="1800" spc="-1" strike="noStrike">
               <a:latin typeface="Arial"/>
             </a:endParaRPr>
           </a:p>
@@ -1578,18 +1497,12 @@
               <a:buChar char=""/>
             </a:pPr>
             <a:r>
-              <a:rPr b="0" lang="pt-BR" sz="2000" spc="-1" strike="noStrike">
-                <a:solidFill>
-                  <a:srgbClr val="000000"/>
-                </a:solidFill>
+              <a:rPr b="0" lang="pt-BR" sz="1800" spc="-1" strike="noStrike">
                 <a:latin typeface="Arial"/>
               </a:rPr>
               <a:t>2.º nível da estrutura de tópicos</a:t>
             </a:r>
-            <a:endParaRPr b="0" lang="pt-BR" sz="2000" spc="-1" strike="noStrike">
-              <a:solidFill>
-                <a:srgbClr val="000000"/>
-              </a:solidFill>
+            <a:endParaRPr b="0" lang="pt-BR" sz="1800" spc="-1" strike="noStrike">
               <a:latin typeface="Arial"/>
             </a:endParaRPr>
           </a:p>
@@ -1607,17 +1520,11 @@
             </a:pPr>
             <a:r>
               <a:rPr b="0" lang="pt-BR" sz="1800" spc="-1" strike="noStrike">
-                <a:solidFill>
-                  <a:srgbClr val="000000"/>
-                </a:solidFill>
                 <a:latin typeface="Arial"/>
               </a:rPr>
               <a:t>3.º nível da estrutura de tópicos</a:t>
             </a:r>
             <a:endParaRPr b="0" lang="pt-BR" sz="1800" spc="-1" strike="noStrike">
-              <a:solidFill>
-                <a:srgbClr val="000000"/>
-              </a:solidFill>
               <a:latin typeface="Arial"/>
             </a:endParaRPr>
           </a:p>
@@ -1635,17 +1542,11 @@
             </a:pPr>
             <a:r>
               <a:rPr b="0" lang="pt-BR" sz="1800" spc="-1" strike="noStrike">
-                <a:solidFill>
-                  <a:srgbClr val="000000"/>
-                </a:solidFill>
                 <a:latin typeface="Arial"/>
               </a:rPr>
               <a:t>4.º nível da estrutura de tópicos</a:t>
             </a:r>
             <a:endParaRPr b="0" lang="pt-BR" sz="1800" spc="-1" strike="noStrike">
-              <a:solidFill>
-                <a:srgbClr val="000000"/>
-              </a:solidFill>
               <a:latin typeface="Arial"/>
             </a:endParaRPr>
           </a:p>
@@ -1662,18 +1563,12 @@
               <a:buChar char=""/>
             </a:pPr>
             <a:r>
-              <a:rPr b="0" lang="pt-BR" sz="2000" spc="-1" strike="noStrike">
-                <a:solidFill>
-                  <a:srgbClr val="000000"/>
-                </a:solidFill>
+              <a:rPr b="0" lang="pt-BR" sz="1800" spc="-1" strike="noStrike">
                 <a:latin typeface="Arial"/>
               </a:rPr>
               <a:t>5.º nível da estrutura de tópicos</a:t>
             </a:r>
-            <a:endParaRPr b="0" lang="pt-BR" sz="2000" spc="-1" strike="noStrike">
-              <a:solidFill>
-                <a:srgbClr val="000000"/>
-              </a:solidFill>
+            <a:endParaRPr b="0" lang="pt-BR" sz="1800" spc="-1" strike="noStrike">
               <a:latin typeface="Arial"/>
             </a:endParaRPr>
           </a:p>
@@ -1690,18 +1585,12 @@
               <a:buChar char=""/>
             </a:pPr>
             <a:r>
-              <a:rPr b="0" lang="pt-BR" sz="2000" spc="-1" strike="noStrike">
-                <a:solidFill>
-                  <a:srgbClr val="000000"/>
-                </a:solidFill>
+              <a:rPr b="0" lang="pt-BR" sz="1800" spc="-1" strike="noStrike">
                 <a:latin typeface="Arial"/>
               </a:rPr>
               <a:t>6.º nível da estrutura de tópicos</a:t>
             </a:r>
-            <a:endParaRPr b="0" lang="pt-BR" sz="2000" spc="-1" strike="noStrike">
-              <a:solidFill>
-                <a:srgbClr val="000000"/>
-              </a:solidFill>
+            <a:endParaRPr b="0" lang="pt-BR" sz="1800" spc="-1" strike="noStrike">
               <a:latin typeface="Arial"/>
             </a:endParaRPr>
           </a:p>
@@ -1718,18 +1607,12 @@
               <a:buChar char=""/>
             </a:pPr>
             <a:r>
-              <a:rPr b="0" lang="pt-BR" sz="2000" spc="-1" strike="noStrike">
-                <a:solidFill>
-                  <a:srgbClr val="000000"/>
-                </a:solidFill>
+              <a:rPr b="0" lang="pt-BR" sz="1800" spc="-1" strike="noStrike">
                 <a:latin typeface="Arial"/>
               </a:rPr>
               <a:t>7.º nível da estrutura de tópicos</a:t>
             </a:r>
-            <a:endParaRPr b="0" lang="pt-BR" sz="2000" spc="-1" strike="noStrike">
-              <a:solidFill>
-                <a:srgbClr val="000000"/>
-              </a:solidFill>
+            <a:endParaRPr b="0" lang="pt-BR" sz="1800" spc="-1" strike="noStrike">
               <a:latin typeface="Arial"/>
             </a:endParaRPr>
           </a:p>
@@ -1788,7 +1671,7 @@
         <p:spPr>
           <a:xfrm>
             <a:off x="0" y="0"/>
-            <a:ext cx="12191400" cy="2115360"/>
+            <a:ext cx="12192120" cy="1586520"/>
           </a:xfrm>
           <a:prstGeom prst="rect">
             <a:avLst/>
@@ -1820,7 +1703,7 @@
         <p:spPr>
           <a:xfrm>
             <a:off x="10561680" y="0"/>
-            <a:ext cx="1083600" cy="2507400"/>
+            <a:ext cx="1083240" cy="2507040"/>
           </a:xfrm>
           <a:prstGeom prst="rect">
             <a:avLst/>
@@ -1838,8 +1721,8 @@
         </p:nvSpPr>
         <p:spPr>
           <a:xfrm>
-            <a:off x="2520000" y="1584000"/>
-            <a:ext cx="7512840" cy="1322640"/>
+            <a:off x="2520000" y="1764000"/>
+            <a:ext cx="7512480" cy="1322280"/>
           </a:xfrm>
           <a:prstGeom prst="rect">
             <a:avLst/>
@@ -1858,7 +1741,11 @@
         <p:txBody>
           <a:bodyPr lIns="90000" rIns="90000" tIns="45000" bIns="45000"/>
           <a:p>
-            <a:pPr algn="just"/>
+            <a:pPr algn="just">
+              <a:lnSpc>
+                <a:spcPct val="100000"/>
+              </a:lnSpc>
+            </a:pPr>
             <a:br/>
             <a:r>
               <a:rPr b="1" lang="pt-BR" sz="3200" spc="-1" strike="noStrike">
@@ -1895,7 +1782,7 @@
         <p:spPr>
           <a:xfrm>
             <a:off x="504000" y="6479280"/>
-            <a:ext cx="11130480" cy="720360"/>
+            <a:ext cx="11130120" cy="720000"/>
           </a:xfrm>
           <a:prstGeom prst="rect">
             <a:avLst/>
@@ -1945,39 +1832,16 @@
           </a:p>
         </p:txBody>
       </p:sp>
-      <p:pic>
-        <p:nvPicPr>
-          <p:cNvPr id="42" name="Google Shape;92;p13" descr=""/>
-          <p:cNvPicPr/>
-          <p:nvPr/>
-        </p:nvPicPr>
-        <p:blipFill>
-          <a:blip r:embed="rId2"/>
-          <a:stretch/>
-        </p:blipFill>
-        <p:spPr>
-          <a:xfrm>
-            <a:off x="268920" y="573840"/>
-            <a:ext cx="5751360" cy="1359360"/>
-          </a:xfrm>
-          <a:prstGeom prst="rect">
-            <a:avLst/>
-          </a:prstGeom>
-          <a:ln>
-            <a:noFill/>
-          </a:ln>
-        </p:spPr>
-      </p:pic>
-      <p:sp>
-        <p:nvSpPr>
-          <p:cNvPr id="43" name="CustomShape 4"/>
+      <p:sp>
+        <p:nvSpPr>
+          <p:cNvPr id="42" name="CustomShape 4"/>
           <p:cNvSpPr/>
           <p:nvPr/>
         </p:nvSpPr>
         <p:spPr>
           <a:xfrm>
             <a:off x="3415320" y="2748600"/>
-            <a:ext cx="4890960" cy="829080"/>
+            <a:ext cx="4890600" cy="828720"/>
           </a:xfrm>
           <a:prstGeom prst="rect">
             <a:avLst/>
@@ -2029,14 +1893,14 @@
       </p:sp>
       <p:sp>
         <p:nvSpPr>
-          <p:cNvPr id="44" name="CustomShape 5"/>
+          <p:cNvPr id="43" name="CustomShape 5"/>
           <p:cNvSpPr/>
           <p:nvPr/>
         </p:nvSpPr>
         <p:spPr>
           <a:xfrm>
             <a:off x="1188000" y="3969720"/>
-            <a:ext cx="9575640" cy="1369800"/>
+            <a:ext cx="9575280" cy="1369440"/>
           </a:xfrm>
           <a:prstGeom prst="rect">
             <a:avLst/>
@@ -2086,6 +1950,29 @@
           </a:p>
         </p:txBody>
       </p:sp>
+      <p:pic>
+        <p:nvPicPr>
+          <p:cNvPr id="44" name="Google Shape;166;p39" descr=""/>
+          <p:cNvPicPr/>
+          <p:nvPr/>
+        </p:nvPicPr>
+        <p:blipFill>
+          <a:blip r:embed="rId2"/>
+          <a:stretch/>
+        </p:blipFill>
+        <p:spPr>
+          <a:xfrm>
+            <a:off x="235080" y="283680"/>
+            <a:ext cx="4000680" cy="1019520"/>
+          </a:xfrm>
+          <a:prstGeom prst="rect">
+            <a:avLst/>
+          </a:prstGeom>
+          <a:ln>
+            <a:noFill/>
+          </a:ln>
+        </p:spPr>
+      </p:pic>
     </p:spTree>
   </p:cSld>
   <p:timing>
@@ -2151,7 +2038,7 @@
         <p:spPr>
           <a:xfrm>
             <a:off x="0" y="0"/>
-            <a:ext cx="12191400" cy="2115360"/>
+            <a:ext cx="12192120" cy="1586520"/>
           </a:xfrm>
           <a:prstGeom prst="rect">
             <a:avLst/>
@@ -2183,7 +2070,7 @@
         <p:spPr>
           <a:xfrm>
             <a:off x="10561680" y="0"/>
-            <a:ext cx="1083600" cy="2507400"/>
+            <a:ext cx="1083240" cy="2507040"/>
           </a:xfrm>
           <a:prstGeom prst="rect">
             <a:avLst/>
@@ -2201,8 +2088,8 @@
         </p:nvSpPr>
         <p:spPr>
           <a:xfrm>
-            <a:off x="2296800" y="2234160"/>
-            <a:ext cx="7512840" cy="1322640"/>
+            <a:off x="2296800" y="1982160"/>
+            <a:ext cx="7512480" cy="1322280"/>
           </a:xfrm>
           <a:prstGeom prst="rect">
             <a:avLst/>
@@ -2262,7 +2149,7 @@
         <p:spPr>
           <a:xfrm>
             <a:off x="504000" y="6479280"/>
-            <a:ext cx="11130480" cy="720360"/>
+            <a:ext cx="11130120" cy="720000"/>
           </a:xfrm>
           <a:prstGeom prst="rect">
             <a:avLst/>
@@ -2312,39 +2199,16 @@
           </a:p>
         </p:txBody>
       </p:sp>
-      <p:pic>
-        <p:nvPicPr>
-          <p:cNvPr id="49" name="Google Shape;92;p13" descr=""/>
-          <p:cNvPicPr/>
-          <p:nvPr/>
-        </p:nvPicPr>
-        <p:blipFill>
-          <a:blip r:embed="rId2"/>
-          <a:stretch/>
-        </p:blipFill>
-        <p:spPr>
-          <a:xfrm>
-            <a:off x="268920" y="573840"/>
-            <a:ext cx="5751360" cy="1359360"/>
-          </a:xfrm>
-          <a:prstGeom prst="rect">
-            <a:avLst/>
-          </a:prstGeom>
-          <a:ln>
-            <a:noFill/>
-          </a:ln>
-        </p:spPr>
-      </p:pic>
-      <p:sp>
-        <p:nvSpPr>
-          <p:cNvPr id="50" name="CustomShape 4"/>
+      <p:sp>
+        <p:nvSpPr>
+          <p:cNvPr id="49" name="CustomShape 4"/>
           <p:cNvSpPr/>
           <p:nvPr/>
         </p:nvSpPr>
         <p:spPr>
           <a:xfrm>
             <a:off x="3415320" y="2748600"/>
-            <a:ext cx="4890960" cy="829080"/>
+            <a:ext cx="4890600" cy="828720"/>
           </a:xfrm>
           <a:prstGeom prst="rect">
             <a:avLst/>
@@ -2396,14 +2260,14 @@
       </p:sp>
       <p:sp>
         <p:nvSpPr>
-          <p:cNvPr id="51" name="CustomShape 5"/>
+          <p:cNvPr id="50" name="CustomShape 5"/>
           <p:cNvSpPr/>
           <p:nvPr/>
         </p:nvSpPr>
         <p:spPr>
           <a:xfrm>
             <a:off x="1188000" y="3969720"/>
-            <a:ext cx="9575640" cy="601920"/>
+            <a:ext cx="9575280" cy="601560"/>
           </a:xfrm>
           <a:prstGeom prst="rect">
             <a:avLst/>
@@ -2445,14 +2309,14 @@
       </p:sp>
       <p:sp>
         <p:nvSpPr>
-          <p:cNvPr id="52" name="CustomShape 6"/>
+          <p:cNvPr id="51" name="CustomShape 6"/>
           <p:cNvSpPr/>
           <p:nvPr/>
         </p:nvSpPr>
         <p:spPr>
           <a:xfrm>
             <a:off x="900000" y="3773880"/>
-            <a:ext cx="10186920" cy="1625760"/>
+            <a:ext cx="10186560" cy="1625400"/>
           </a:xfrm>
           <a:prstGeom prst="rect">
             <a:avLst/>
@@ -2602,6 +2466,57 @@
           </a:p>
         </p:txBody>
       </p:sp>
+      <p:sp>
+        <p:nvSpPr>
+          <p:cNvPr id="52" name="CustomShape 7"/>
+          <p:cNvSpPr/>
+          <p:nvPr/>
+        </p:nvSpPr>
+        <p:spPr>
+          <a:xfrm>
+            <a:off x="0" y="0"/>
+            <a:ext cx="9143640" cy="1586520"/>
+          </a:xfrm>
+          <a:prstGeom prst="rect">
+            <a:avLst/>
+          </a:prstGeom>
+          <a:solidFill>
+            <a:srgbClr val="347c36"/>
+          </a:solidFill>
+          <a:ln>
+            <a:noFill/>
+          </a:ln>
+        </p:spPr>
+        <p:style>
+          <a:lnRef idx="0"/>
+          <a:fillRef idx="0"/>
+          <a:effectRef idx="0"/>
+          <a:fontRef idx="minor"/>
+        </p:style>
+      </p:sp>
+      <p:pic>
+        <p:nvPicPr>
+          <p:cNvPr id="53" name="Google Shape;166;p39" descr=""/>
+          <p:cNvPicPr/>
+          <p:nvPr/>
+        </p:nvPicPr>
+        <p:blipFill>
+          <a:blip r:embed="rId2"/>
+          <a:stretch/>
+        </p:blipFill>
+        <p:spPr>
+          <a:xfrm>
+            <a:off x="235080" y="283680"/>
+            <a:ext cx="4000680" cy="1019520"/>
+          </a:xfrm>
+          <a:prstGeom prst="rect">
+            <a:avLst/>
+          </a:prstGeom>
+          <a:ln>
+            <a:noFill/>
+          </a:ln>
+        </p:spPr>
+      </p:pic>
     </p:spTree>
   </p:cSld>
   <p:timing>
@@ -2660,14 +2575,14 @@
       </p:grpSpPr>
       <p:sp>
         <p:nvSpPr>
-          <p:cNvPr id="53" name="CustomShape 1"/>
+          <p:cNvPr id="54" name="CustomShape 1"/>
           <p:cNvSpPr/>
           <p:nvPr/>
         </p:nvSpPr>
         <p:spPr>
           <a:xfrm>
             <a:off x="0" y="0"/>
-            <a:ext cx="12191400" cy="2115360"/>
+            <a:ext cx="12192120" cy="1586520"/>
           </a:xfrm>
           <a:prstGeom prst="rect">
             <a:avLst/>
@@ -2688,7 +2603,7 @@
       </p:sp>
       <p:pic>
         <p:nvPicPr>
-          <p:cNvPr id="54" name="Google Shape;89;p13" descr=""/>
+          <p:cNvPr id="55" name="Google Shape;89;p13" descr=""/>
           <p:cNvPicPr/>
           <p:nvPr/>
         </p:nvPicPr>
@@ -2699,7 +2614,7 @@
         <p:spPr>
           <a:xfrm>
             <a:off x="10561680" y="0"/>
-            <a:ext cx="1083600" cy="2507400"/>
+            <a:ext cx="1083240" cy="2507040"/>
           </a:xfrm>
           <a:prstGeom prst="rect">
             <a:avLst/>
@@ -2711,14 +2626,14 @@
       </p:pic>
       <p:sp>
         <p:nvSpPr>
-          <p:cNvPr id="55" name="CustomShape 2"/>
+          <p:cNvPr id="56" name="CustomShape 2"/>
           <p:cNvSpPr/>
           <p:nvPr/>
         </p:nvSpPr>
         <p:spPr>
           <a:xfrm>
             <a:off x="2296800" y="2234160"/>
-            <a:ext cx="7512840" cy="1322640"/>
+            <a:ext cx="7512480" cy="1322280"/>
           </a:xfrm>
           <a:prstGeom prst="rect">
             <a:avLst/>
@@ -2771,14 +2686,14 @@
       </p:sp>
       <p:sp>
         <p:nvSpPr>
-          <p:cNvPr id="56" name="CustomShape 3"/>
+          <p:cNvPr id="57" name="CustomShape 3"/>
           <p:cNvSpPr/>
           <p:nvPr/>
         </p:nvSpPr>
         <p:spPr>
           <a:xfrm>
             <a:off x="504000" y="6479280"/>
-            <a:ext cx="11130480" cy="720360"/>
+            <a:ext cx="11130120" cy="720000"/>
           </a:xfrm>
           <a:prstGeom prst="rect">
             <a:avLst/>
@@ -2828,29 +2743,6 @@
           </a:p>
         </p:txBody>
       </p:sp>
-      <p:pic>
-        <p:nvPicPr>
-          <p:cNvPr id="57" name="Google Shape;92;p13" descr=""/>
-          <p:cNvPicPr/>
-          <p:nvPr/>
-        </p:nvPicPr>
-        <p:blipFill>
-          <a:blip r:embed="rId2"/>
-          <a:stretch/>
-        </p:blipFill>
-        <p:spPr>
-          <a:xfrm>
-            <a:off x="268920" y="573840"/>
-            <a:ext cx="5751360" cy="1359360"/>
-          </a:xfrm>
-          <a:prstGeom prst="rect">
-            <a:avLst/>
-          </a:prstGeom>
-          <a:ln>
-            <a:noFill/>
-          </a:ln>
-        </p:spPr>
-      </p:pic>
       <p:sp>
         <p:nvSpPr>
           <p:cNvPr id="58" name="CustomShape 4"/>
@@ -2860,7 +2752,7 @@
         <p:spPr>
           <a:xfrm>
             <a:off x="3415320" y="2748600"/>
-            <a:ext cx="4890960" cy="829080"/>
+            <a:ext cx="4890600" cy="828720"/>
           </a:xfrm>
           <a:prstGeom prst="rect">
             <a:avLst/>
@@ -2919,7 +2811,7 @@
         <p:spPr>
           <a:xfrm>
             <a:off x="576000" y="3969720"/>
-            <a:ext cx="9575640" cy="601920"/>
+            <a:ext cx="9575280" cy="601560"/>
           </a:xfrm>
           <a:prstGeom prst="rect">
             <a:avLst/>
@@ -2974,7 +2866,7 @@
             <a:avLst/>
           </a:prstGeom>
           <a:ln>
-            <a:tailEnd len="med" type="triangle" w="med"/>
+            <a:noFill/>
           </a:ln>
         </p:spPr>
         <p:style>
@@ -2992,10 +2884,10 @@
         </p:nvGrpSpPr>
         <p:grpSpPr>
           <a:xfrm>
-            <a:off x="1584000" y="3816000"/>
-            <a:ext cx="1223640" cy="755640"/>
-            <a:chOff x="1584000" y="3816000"/>
-            <a:chExt cx="1223640" cy="755640"/>
+            <a:off x="1332000" y="3780000"/>
+            <a:ext cx="1223280" cy="755280"/>
+            <a:chOff x="1332000" y="3780000"/>
+            <a:chExt cx="1223280" cy="755280"/>
           </a:xfrm>
         </p:grpSpPr>
         <p:sp>
@@ -3006,8 +2898,8 @@
           </p:nvSpPr>
           <p:spPr>
             <a:xfrm>
-              <a:off x="1584000" y="3816000"/>
-              <a:ext cx="1223640" cy="755640"/>
+              <a:off x="1332000" y="3780000"/>
+              <a:ext cx="1223280" cy="755280"/>
             </a:xfrm>
             <a:custGeom>
               <a:avLst/>
@@ -3076,8 +2968,8 @@
           </p:nvSpPr>
           <p:spPr>
             <a:xfrm>
-              <a:off x="1728000" y="4104000"/>
-              <a:ext cx="180360" cy="426960"/>
+              <a:off x="1476000" y="4068000"/>
+              <a:ext cx="180000" cy="426600"/>
             </a:xfrm>
             <a:prstGeom prst="rect">
               <a:avLst/>
@@ -3102,8 +2994,8 @@
           </p:nvSpPr>
           <p:spPr>
             <a:xfrm>
-              <a:off x="1692000" y="4017960"/>
-              <a:ext cx="1082520" cy="373680"/>
+              <a:off x="1440000" y="3981960"/>
+              <a:ext cx="1082160" cy="373320"/>
             </a:xfrm>
             <a:prstGeom prst="rect">
               <a:avLst/>
@@ -3182,14 +3074,14 @@
         </p:nvSpPr>
         <p:spPr>
           <a:xfrm>
-            <a:off x="2916000" y="4113720"/>
+            <a:off x="2664000" y="4077720"/>
             <a:ext cx="828000" cy="360"/>
           </a:xfrm>
           <a:prstGeom prst="line">
             <a:avLst/>
           </a:prstGeom>
           <a:ln>
-            <a:tailEnd len="med" type="triangle" w="med"/>
+            <a:noFill/>
           </a:ln>
         </p:spPr>
         <p:style>
@@ -3207,10 +3099,10 @@
         </p:nvGrpSpPr>
         <p:grpSpPr>
           <a:xfrm>
-            <a:off x="3825720" y="3859560"/>
-            <a:ext cx="1223640" cy="755640"/>
-            <a:chOff x="3825720" y="3859560"/>
-            <a:chExt cx="1223640" cy="755640"/>
+            <a:off x="3501720" y="3823560"/>
+            <a:ext cx="1223280" cy="755280"/>
+            <a:chOff x="3501720" y="3823560"/>
+            <a:chExt cx="1223280" cy="755280"/>
           </a:xfrm>
         </p:grpSpPr>
         <p:sp>
@@ -3221,8 +3113,8 @@
           </p:nvSpPr>
           <p:spPr>
             <a:xfrm>
-              <a:off x="3825720" y="3859560"/>
-              <a:ext cx="1223640" cy="755640"/>
+              <a:off x="3501720" y="3823560"/>
+              <a:ext cx="1223280" cy="755280"/>
             </a:xfrm>
             <a:custGeom>
               <a:avLst/>
@@ -3291,8 +3183,8 @@
           </p:nvSpPr>
           <p:spPr>
             <a:xfrm>
-              <a:off x="3969720" y="4147560"/>
-              <a:ext cx="180360" cy="426960"/>
+              <a:off x="3645720" y="4111560"/>
+              <a:ext cx="180000" cy="426600"/>
             </a:xfrm>
             <a:prstGeom prst="rect">
               <a:avLst/>
@@ -3317,8 +3209,8 @@
           </p:nvSpPr>
           <p:spPr>
             <a:xfrm>
-              <a:off x="3933720" y="4061520"/>
-              <a:ext cx="1046160" cy="515520"/>
+              <a:off x="3609720" y="4025520"/>
+              <a:ext cx="1045800" cy="515160"/>
             </a:xfrm>
             <a:prstGeom prst="rect">
               <a:avLst/>
@@ -3407,14 +3299,14 @@
         </p:nvSpPr>
         <p:spPr>
           <a:xfrm>
-            <a:off x="5148360" y="4222080"/>
+            <a:off x="4896360" y="4186080"/>
             <a:ext cx="828000" cy="360"/>
           </a:xfrm>
           <a:prstGeom prst="line">
             <a:avLst/>
           </a:prstGeom>
           <a:ln>
-            <a:tailEnd len="med" type="triangle" w="med"/>
+            <a:noFill/>
           </a:ln>
         </p:spPr>
         <p:style>
@@ -3432,10 +3324,10 @@
         </p:nvGrpSpPr>
         <p:grpSpPr>
           <a:xfrm>
-            <a:off x="6058080" y="3967920"/>
-            <a:ext cx="1223640" cy="755640"/>
-            <a:chOff x="6058080" y="3967920"/>
-            <a:chExt cx="1223640" cy="755640"/>
+            <a:off x="5986080" y="3931920"/>
+            <a:ext cx="1223280" cy="755280"/>
+            <a:chOff x="5986080" y="3931920"/>
+            <a:chExt cx="1223280" cy="755280"/>
           </a:xfrm>
         </p:grpSpPr>
         <p:sp>
@@ -3446,8 +3338,8 @@
           </p:nvSpPr>
           <p:spPr>
             <a:xfrm>
-              <a:off x="6058080" y="3967920"/>
-              <a:ext cx="1223640" cy="755640"/>
+              <a:off x="5986080" y="3931920"/>
+              <a:ext cx="1223280" cy="755280"/>
             </a:xfrm>
             <a:custGeom>
               <a:avLst/>
@@ -3516,8 +3408,8 @@
           </p:nvSpPr>
           <p:spPr>
             <a:xfrm>
-              <a:off x="6202080" y="4255920"/>
-              <a:ext cx="180360" cy="426960"/>
+              <a:off x="6130080" y="4219920"/>
+              <a:ext cx="180000" cy="426600"/>
             </a:xfrm>
             <a:prstGeom prst="rect">
               <a:avLst/>
@@ -3542,8 +3434,8 @@
           </p:nvSpPr>
           <p:spPr>
             <a:xfrm>
-              <a:off x="6166080" y="4169880"/>
-              <a:ext cx="919440" cy="515520"/>
+              <a:off x="6094080" y="4133880"/>
+              <a:ext cx="919080" cy="515160"/>
             </a:xfrm>
             <a:prstGeom prst="rect">
               <a:avLst/>
@@ -3642,14 +3534,14 @@
         </p:nvSpPr>
         <p:spPr>
           <a:xfrm>
-            <a:off x="7380720" y="4330440"/>
+            <a:off x="7128720" y="4294440"/>
             <a:ext cx="828000" cy="360"/>
           </a:xfrm>
           <a:prstGeom prst="line">
             <a:avLst/>
           </a:prstGeom>
           <a:ln>
-            <a:tailEnd len="med" type="triangle" w="med"/>
+            <a:noFill/>
           </a:ln>
         </p:spPr>
         <p:style>
@@ -3667,10 +3559,10 @@
         </p:nvGrpSpPr>
         <p:grpSpPr>
           <a:xfrm>
-            <a:off x="8290440" y="4076280"/>
-            <a:ext cx="1223640" cy="755640"/>
-            <a:chOff x="8290440" y="4076280"/>
-            <a:chExt cx="1223640" cy="755640"/>
+            <a:off x="8434440" y="4040280"/>
+            <a:ext cx="1223280" cy="755280"/>
+            <a:chOff x="8434440" y="4040280"/>
+            <a:chExt cx="1223280" cy="755280"/>
           </a:xfrm>
         </p:grpSpPr>
         <p:sp>
@@ -3681,8 +3573,8 @@
           </p:nvSpPr>
           <p:spPr>
             <a:xfrm>
-              <a:off x="8290440" y="4076280"/>
-              <a:ext cx="1223640" cy="755640"/>
+              <a:off x="8434440" y="4040280"/>
+              <a:ext cx="1223280" cy="755280"/>
             </a:xfrm>
             <a:custGeom>
               <a:avLst/>
@@ -3751,8 +3643,8 @@
           </p:nvSpPr>
           <p:spPr>
             <a:xfrm>
-              <a:off x="8434440" y="4364280"/>
-              <a:ext cx="180360" cy="426960"/>
+              <a:off x="8578440" y="4328280"/>
+              <a:ext cx="180000" cy="426600"/>
             </a:xfrm>
             <a:prstGeom prst="rect">
               <a:avLst/>
@@ -3777,8 +3669,8 @@
           </p:nvSpPr>
           <p:spPr>
             <a:xfrm>
-              <a:off x="8398440" y="4278240"/>
-              <a:ext cx="940680" cy="373680"/>
+              <a:off x="8542440" y="4242240"/>
+              <a:ext cx="940320" cy="373320"/>
             </a:xfrm>
             <a:prstGeom prst="rect">
               <a:avLst/>
@@ -3854,7 +3746,7 @@
             <a:avLst/>
           </a:prstGeom>
           <a:ln>
-            <a:tailEnd len="med" type="triangle" w="med"/>
+            <a:noFill/>
           </a:ln>
         </p:spPr>
         <p:style>
@@ -3872,10 +3764,10 @@
         </p:nvGrpSpPr>
         <p:grpSpPr>
           <a:xfrm>
-            <a:off x="10630800" y="4220640"/>
-            <a:ext cx="1223640" cy="859320"/>
-            <a:chOff x="10630800" y="4220640"/>
-            <a:chExt cx="1223640" cy="859320"/>
+            <a:off x="10738800" y="4220640"/>
+            <a:ext cx="1223280" cy="858960"/>
+            <a:chOff x="10738800" y="4220640"/>
+            <a:chExt cx="1223280" cy="858960"/>
           </a:xfrm>
         </p:grpSpPr>
         <p:sp>
@@ -3886,8 +3778,8 @@
           </p:nvSpPr>
           <p:spPr>
             <a:xfrm>
-              <a:off x="10630800" y="4220640"/>
-              <a:ext cx="1223640" cy="755640"/>
+              <a:off x="10738800" y="4220640"/>
+              <a:ext cx="1223280" cy="755280"/>
             </a:xfrm>
             <a:custGeom>
               <a:avLst/>
@@ -3956,8 +3848,8 @@
           </p:nvSpPr>
           <p:spPr>
             <a:xfrm>
-              <a:off x="10774800" y="4508640"/>
-              <a:ext cx="180360" cy="426960"/>
+              <a:off x="10882800" y="4508640"/>
+              <a:ext cx="180000" cy="426600"/>
             </a:xfrm>
             <a:prstGeom prst="rect">
               <a:avLst/>
@@ -3982,8 +3874,8 @@
           </p:nvSpPr>
           <p:spPr>
             <a:xfrm>
-              <a:off x="10738800" y="4422600"/>
-              <a:ext cx="835560" cy="657360"/>
+              <a:off x="10846800" y="4422600"/>
+              <a:ext cx="835200" cy="657000"/>
             </a:xfrm>
             <a:prstGeom prst="rect">
               <a:avLst/>
@@ -4074,6 +3966,169 @@
           </p:txBody>
         </p:sp>
       </p:grpSp>
+      <p:sp>
+        <p:nvSpPr>
+          <p:cNvPr id="85" name="Line 31"/>
+          <p:cNvSpPr/>
+          <p:nvPr/>
+        </p:nvSpPr>
+        <p:spPr>
+          <a:xfrm>
+            <a:off x="108000" y="3960000"/>
+            <a:ext cx="1224000" cy="0"/>
+          </a:xfrm>
+          <a:prstGeom prst="line">
+            <a:avLst/>
+          </a:prstGeom>
+          <a:ln>
+            <a:solidFill>
+              <a:srgbClr val="000000"/>
+            </a:solidFill>
+            <a:tailEnd len="med" type="triangle" w="med"/>
+          </a:ln>
+        </p:spPr>
+        <p:style>
+          <a:lnRef idx="0"/>
+          <a:fillRef idx="0"/>
+          <a:effectRef idx="0"/>
+          <a:fontRef idx="minor"/>
+        </p:style>
+      </p:sp>
+      <p:sp>
+        <p:nvSpPr>
+          <p:cNvPr id="86" name="Line 32"/>
+          <p:cNvSpPr/>
+          <p:nvPr/>
+        </p:nvSpPr>
+        <p:spPr>
+          <a:xfrm>
+            <a:off x="2592000" y="4104000"/>
+            <a:ext cx="936000" cy="0"/>
+          </a:xfrm>
+          <a:prstGeom prst="line">
+            <a:avLst/>
+          </a:prstGeom>
+          <a:ln>
+            <a:solidFill>
+              <a:srgbClr val="000000"/>
+            </a:solidFill>
+            <a:tailEnd len="med" type="triangle" w="med"/>
+          </a:ln>
+        </p:spPr>
+        <p:style>
+          <a:lnRef idx="0"/>
+          <a:fillRef idx="0"/>
+          <a:effectRef idx="0"/>
+          <a:fontRef idx="minor"/>
+        </p:style>
+      </p:sp>
+      <p:sp>
+        <p:nvSpPr>
+          <p:cNvPr id="87" name="Line 33"/>
+          <p:cNvSpPr/>
+          <p:nvPr/>
+        </p:nvSpPr>
+        <p:spPr>
+          <a:xfrm>
+            <a:off x="4752000" y="4284000"/>
+            <a:ext cx="1224000" cy="0"/>
+          </a:xfrm>
+          <a:prstGeom prst="line">
+            <a:avLst/>
+          </a:prstGeom>
+          <a:ln>
+            <a:solidFill>
+              <a:srgbClr val="000000"/>
+            </a:solidFill>
+            <a:tailEnd len="med" type="triangle" w="med"/>
+          </a:ln>
+        </p:spPr>
+        <p:style>
+          <a:lnRef idx="0"/>
+          <a:fillRef idx="0"/>
+          <a:effectRef idx="0"/>
+          <a:fontRef idx="minor"/>
+        </p:style>
+      </p:sp>
+      <p:sp>
+        <p:nvSpPr>
+          <p:cNvPr id="88" name="Line 34"/>
+          <p:cNvSpPr/>
+          <p:nvPr/>
+        </p:nvSpPr>
+        <p:spPr>
+          <a:xfrm>
+            <a:off x="7236000" y="4428000"/>
+            <a:ext cx="1224000" cy="0"/>
+          </a:xfrm>
+          <a:prstGeom prst="line">
+            <a:avLst/>
+          </a:prstGeom>
+          <a:ln>
+            <a:solidFill>
+              <a:srgbClr val="000000"/>
+            </a:solidFill>
+            <a:tailEnd len="med" type="triangle" w="med"/>
+          </a:ln>
+        </p:spPr>
+        <p:style>
+          <a:lnRef idx="0"/>
+          <a:fillRef idx="0"/>
+          <a:effectRef idx="0"/>
+          <a:fontRef idx="minor"/>
+        </p:style>
+      </p:sp>
+      <p:sp>
+        <p:nvSpPr>
+          <p:cNvPr id="89" name="Line 35"/>
+          <p:cNvSpPr/>
+          <p:nvPr/>
+        </p:nvSpPr>
+        <p:spPr>
+          <a:xfrm>
+            <a:off x="9684000" y="4608000"/>
+            <a:ext cx="1044000" cy="0"/>
+          </a:xfrm>
+          <a:prstGeom prst="line">
+            <a:avLst/>
+          </a:prstGeom>
+          <a:ln>
+            <a:solidFill>
+              <a:srgbClr val="000000"/>
+            </a:solidFill>
+            <a:tailEnd len="med" type="triangle" w="med"/>
+          </a:ln>
+        </p:spPr>
+        <p:style>
+          <a:lnRef idx="0"/>
+          <a:fillRef idx="0"/>
+          <a:effectRef idx="0"/>
+          <a:fontRef idx="minor"/>
+        </p:style>
+      </p:sp>
+      <p:pic>
+        <p:nvPicPr>
+          <p:cNvPr id="90" name="Google Shape;166;p39" descr=""/>
+          <p:cNvPicPr/>
+          <p:nvPr/>
+        </p:nvPicPr>
+        <p:blipFill>
+          <a:blip r:embed="rId2"/>
+          <a:stretch/>
+        </p:blipFill>
+        <p:spPr>
+          <a:xfrm>
+            <a:off x="235080" y="283680"/>
+            <a:ext cx="4000680" cy="1019520"/>
+          </a:xfrm>
+          <a:prstGeom prst="rect">
+            <a:avLst/>
+          </a:prstGeom>
+          <a:ln>
+            <a:noFill/>
+          </a:ln>
+        </p:spPr>
+      </p:pic>
     </p:spTree>
   </p:cSld>
   <p:timing>
@@ -4132,14 +4187,14 @@
       </p:grpSpPr>
       <p:sp>
         <p:nvSpPr>
-          <p:cNvPr id="85" name="CustomShape 1"/>
+          <p:cNvPr id="91" name="CustomShape 1"/>
           <p:cNvSpPr/>
           <p:nvPr/>
         </p:nvSpPr>
         <p:spPr>
           <a:xfrm>
             <a:off x="0" y="0"/>
-            <a:ext cx="12191400" cy="2115360"/>
+            <a:ext cx="12192120" cy="1586520"/>
           </a:xfrm>
           <a:prstGeom prst="rect">
             <a:avLst/>
@@ -4160,7 +4215,7 @@
       </p:sp>
       <p:pic>
         <p:nvPicPr>
-          <p:cNvPr id="86" name="Google Shape;89;p13" descr=""/>
+          <p:cNvPr id="92" name="Google Shape;89;p13" descr=""/>
           <p:cNvPicPr/>
           <p:nvPr/>
         </p:nvPicPr>
@@ -4171,7 +4226,7 @@
         <p:spPr>
           <a:xfrm>
             <a:off x="10561680" y="0"/>
-            <a:ext cx="1083600" cy="2507400"/>
+            <a:ext cx="1083240" cy="2507040"/>
           </a:xfrm>
           <a:prstGeom prst="rect">
             <a:avLst/>
@@ -4183,14 +4238,14 @@
       </p:pic>
       <p:sp>
         <p:nvSpPr>
-          <p:cNvPr id="87" name="CustomShape 2"/>
+          <p:cNvPr id="93" name="CustomShape 2"/>
           <p:cNvSpPr/>
           <p:nvPr/>
         </p:nvSpPr>
         <p:spPr>
           <a:xfrm>
             <a:off x="2304000" y="2205000"/>
-            <a:ext cx="7512840" cy="1034640"/>
+            <a:ext cx="7512480" cy="1034280"/>
           </a:xfrm>
           <a:prstGeom prst="rect">
             <a:avLst/>
@@ -4253,14 +4308,14 @@
       </p:sp>
       <p:sp>
         <p:nvSpPr>
-          <p:cNvPr id="88" name="CustomShape 3"/>
+          <p:cNvPr id="94" name="CustomShape 3"/>
           <p:cNvSpPr/>
           <p:nvPr/>
         </p:nvSpPr>
         <p:spPr>
           <a:xfrm>
             <a:off x="360000" y="6479280"/>
-            <a:ext cx="11130480" cy="720360"/>
+            <a:ext cx="11130120" cy="720000"/>
           </a:xfrm>
           <a:prstGeom prst="rect">
             <a:avLst/>
@@ -4310,39 +4365,16 @@
           </a:p>
         </p:txBody>
       </p:sp>
-      <p:pic>
-        <p:nvPicPr>
-          <p:cNvPr id="89" name="Google Shape;92;p13" descr=""/>
-          <p:cNvPicPr/>
-          <p:nvPr/>
-        </p:nvPicPr>
-        <p:blipFill>
-          <a:blip r:embed="rId2"/>
-          <a:stretch/>
-        </p:blipFill>
-        <p:spPr>
-          <a:xfrm>
-            <a:off x="268920" y="573840"/>
-            <a:ext cx="5751360" cy="1359360"/>
-          </a:xfrm>
-          <a:prstGeom prst="rect">
-            <a:avLst/>
-          </a:prstGeom>
-          <a:ln>
-            <a:noFill/>
-          </a:ln>
-        </p:spPr>
-      </p:pic>
-      <p:sp>
-        <p:nvSpPr>
-          <p:cNvPr id="90" name="CustomShape 4"/>
+      <p:sp>
+        <p:nvSpPr>
+          <p:cNvPr id="95" name="CustomShape 4"/>
           <p:cNvSpPr/>
           <p:nvPr/>
         </p:nvSpPr>
         <p:spPr>
           <a:xfrm>
             <a:off x="2520000" y="3975840"/>
-            <a:ext cx="7991640" cy="1279800"/>
+            <a:ext cx="7991280" cy="1279440"/>
           </a:xfrm>
           <a:prstGeom prst="rect">
             <a:avLst/>
@@ -4384,7 +4416,7 @@
                 <a:latin typeface="Arial"/>
                 <a:ea typeface="Arial"/>
               </a:rPr>
-              <a:t>Sublime text/ vscode</a:t>
+              <a:t>Sublime text/ vscode,html5, css3, JavaScript, trello</a:t>
             </a:r>
             <a:endParaRPr b="0" lang="pt-BR" sz="1800" spc="-1" strike="noStrike">
               <a:latin typeface="Arial"/>
@@ -4414,7 +4446,7 @@
                 <a:latin typeface="Arial"/>
                 <a:ea typeface="DejaVu Sans"/>
               </a:rPr>
-              <a:t>Back End: PHP, MYSQL, Mysql workbend</a:t>
+              <a:t>Back End: PHP, MYSQL, mysql workbench</a:t>
             </a:r>
             <a:endParaRPr b="0" lang="pt-BR" sz="1800" spc="-1" strike="noStrike">
               <a:latin typeface="Arial"/>
@@ -4444,14 +4476,14 @@
       </p:sp>
       <p:sp>
         <p:nvSpPr>
-          <p:cNvPr id="91" name="CustomShape 5"/>
+          <p:cNvPr id="96" name="CustomShape 5"/>
           <p:cNvSpPr/>
           <p:nvPr/>
         </p:nvSpPr>
         <p:spPr>
           <a:xfrm>
             <a:off x="3168000" y="3140640"/>
-            <a:ext cx="5788800" cy="459000"/>
+            <a:ext cx="5788440" cy="458640"/>
           </a:xfrm>
           <a:prstGeom prst="rect">
             <a:avLst/>
@@ -4501,6 +4533,29 @@
           </a:p>
         </p:txBody>
       </p:sp>
+      <p:pic>
+        <p:nvPicPr>
+          <p:cNvPr id="97" name="Google Shape;166;p39" descr=""/>
+          <p:cNvPicPr/>
+          <p:nvPr/>
+        </p:nvPicPr>
+        <p:blipFill>
+          <a:blip r:embed="rId2"/>
+          <a:stretch/>
+        </p:blipFill>
+        <p:spPr>
+          <a:xfrm>
+            <a:off x="235080" y="283680"/>
+            <a:ext cx="4000680" cy="1019520"/>
+          </a:xfrm>
+          <a:prstGeom prst="rect">
+            <a:avLst/>
+          </a:prstGeom>
+          <a:ln>
+            <a:noFill/>
+          </a:ln>
+        </p:spPr>
+      </p:pic>
     </p:spTree>
   </p:cSld>
   <p:timing>
@@ -4559,14 +4614,14 @@
       </p:grpSpPr>
       <p:sp>
         <p:nvSpPr>
-          <p:cNvPr id="92" name="CustomShape 1"/>
+          <p:cNvPr id="98" name="CustomShape 1"/>
           <p:cNvSpPr/>
           <p:nvPr/>
         </p:nvSpPr>
         <p:spPr>
           <a:xfrm>
             <a:off x="0" y="0"/>
-            <a:ext cx="12191400" cy="2115360"/>
+            <a:ext cx="12192120" cy="1586520"/>
           </a:xfrm>
           <a:prstGeom prst="rect">
             <a:avLst/>
@@ -4587,7 +4642,7 @@
       </p:sp>
       <p:pic>
         <p:nvPicPr>
-          <p:cNvPr id="93" name="Google Shape;89;p13" descr=""/>
+          <p:cNvPr id="99" name="Google Shape;89;p13" descr=""/>
           <p:cNvPicPr/>
           <p:nvPr/>
         </p:nvPicPr>
@@ -4598,7 +4653,7 @@
         <p:spPr>
           <a:xfrm>
             <a:off x="10561680" y="0"/>
-            <a:ext cx="1083600" cy="2507400"/>
+            <a:ext cx="1083240" cy="2507040"/>
           </a:xfrm>
           <a:prstGeom prst="rect">
             <a:avLst/>
@@ -4610,14 +4665,14 @@
       </p:pic>
       <p:sp>
         <p:nvSpPr>
-          <p:cNvPr id="94" name="CustomShape 2"/>
+          <p:cNvPr id="100" name="CustomShape 2"/>
           <p:cNvSpPr/>
           <p:nvPr/>
         </p:nvSpPr>
         <p:spPr>
           <a:xfrm>
-            <a:off x="2278800" y="2637000"/>
-            <a:ext cx="7512840" cy="1322640"/>
+            <a:off x="2304000" y="2205000"/>
+            <a:ext cx="7512480" cy="1034280"/>
           </a:xfrm>
           <a:prstGeom prst="rect">
             <a:avLst/>
@@ -4672,32 +4727,22 @@
                 <a:spcPct val="100000"/>
               </a:lnSpc>
             </a:pPr>
-            <a:r>
-              <a:rPr b="1" lang="pt-BR" sz="2600" spc="-1" strike="noStrike">
-                <a:solidFill>
-                  <a:srgbClr val="8dc641"/>
-                </a:solidFill>
-                <a:latin typeface="Arial"/>
-                <a:ea typeface="Arial"/>
-              </a:rPr>
-              <a:t>Aplicações das tecnologias (onde serão aplicadas)</a:t>
-            </a:r>
-            <a:endParaRPr b="0" lang="pt-BR" sz="2600" spc="-1" strike="noStrike">
-              <a:latin typeface="Arial"/>
-            </a:endParaRPr>
-          </a:p>
-        </p:txBody>
-      </p:sp>
-      <p:sp>
-        <p:nvSpPr>
-          <p:cNvPr id="95" name="CustomShape 3"/>
+            <a:endParaRPr b="0" lang="pt-BR" sz="3200" spc="-1" strike="noStrike">
+              <a:latin typeface="Arial"/>
+            </a:endParaRPr>
+          </a:p>
+        </p:txBody>
+      </p:sp>
+      <p:sp>
+        <p:nvSpPr>
+          <p:cNvPr id="101" name="CustomShape 3"/>
           <p:cNvSpPr/>
           <p:nvPr/>
         </p:nvSpPr>
         <p:spPr>
           <a:xfrm>
             <a:off x="360000" y="6479280"/>
-            <a:ext cx="11130480" cy="720360"/>
+            <a:ext cx="11130120" cy="720000"/>
           </a:xfrm>
           <a:prstGeom prst="rect">
             <a:avLst/>
@@ -4747,9 +4792,137 @@
           </a:p>
         </p:txBody>
       </p:sp>
+      <p:sp>
+        <p:nvSpPr>
+          <p:cNvPr id="102" name="CustomShape 4"/>
+          <p:cNvSpPr/>
+          <p:nvPr/>
+        </p:nvSpPr>
+        <p:spPr>
+          <a:xfrm>
+            <a:off x="2520000" y="3975840"/>
+            <a:ext cx="7991280" cy="1279440"/>
+          </a:xfrm>
+          <a:prstGeom prst="rect">
+            <a:avLst/>
+          </a:prstGeom>
+          <a:noFill/>
+          <a:ln>
+            <a:noFill/>
+          </a:ln>
+        </p:spPr>
+        <p:style>
+          <a:lnRef idx="0"/>
+          <a:fillRef idx="0"/>
+          <a:effectRef idx="0"/>
+          <a:fontRef idx="minor"/>
+        </p:style>
+        <p:txBody>
+          <a:bodyPr lIns="0" rIns="0" tIns="0" bIns="0"/>
+          <a:p>
+            <a:pPr>
+              <a:lnSpc>
+                <a:spcPct val="100000"/>
+              </a:lnSpc>
+            </a:pPr>
+            <a:r>
+              <a:rPr b="1" lang="pt-BR" sz="1800" spc="-1" strike="noStrike">
+                <a:solidFill>
+                  <a:srgbClr val="8dc641"/>
+                </a:solidFill>
+                <a:latin typeface="Arial"/>
+                <a:ea typeface="DejaVu Sans"/>
+              </a:rPr>
+              <a:t>Será usado técnicas de normalização de dados para evitarmos redundância dos dados no banco.</a:t>
+            </a:r>
+            <a:endParaRPr b="0" lang="pt-BR" sz="1800" spc="-1" strike="noStrike">
+              <a:latin typeface="Arial"/>
+            </a:endParaRPr>
+          </a:p>
+          <a:p>
+            <a:pPr>
+              <a:lnSpc>
+                <a:spcPct val="100000"/>
+              </a:lnSpc>
+            </a:pPr>
+            <a:endParaRPr b="0" lang="pt-BR" sz="1800" spc="-1" strike="noStrike">
+              <a:latin typeface="Arial"/>
+            </a:endParaRPr>
+          </a:p>
+          <a:p>
+            <a:pPr>
+              <a:lnSpc>
+                <a:spcPct val="100000"/>
+              </a:lnSpc>
+            </a:pPr>
+            <a:endParaRPr b="0" lang="pt-BR" sz="1800" spc="-1" strike="noStrike">
+              <a:latin typeface="Arial"/>
+            </a:endParaRPr>
+          </a:p>
+        </p:txBody>
+      </p:sp>
+      <p:sp>
+        <p:nvSpPr>
+          <p:cNvPr id="103" name="CustomShape 5"/>
+          <p:cNvSpPr/>
+          <p:nvPr/>
+        </p:nvSpPr>
+        <p:spPr>
+          <a:xfrm>
+            <a:off x="3168000" y="3140640"/>
+            <a:ext cx="5788440" cy="458640"/>
+          </a:xfrm>
+          <a:prstGeom prst="rect">
+            <a:avLst/>
+          </a:prstGeom>
+          <a:noFill/>
+          <a:ln>
+            <a:noFill/>
+          </a:ln>
+        </p:spPr>
+        <p:style>
+          <a:lnRef idx="0"/>
+          <a:fillRef idx="0"/>
+          <a:effectRef idx="0"/>
+          <a:fontRef idx="minor"/>
+        </p:style>
+        <p:txBody>
+          <a:bodyPr lIns="90000" rIns="90000" tIns="45000" bIns="45000"/>
+          <a:p>
+            <a:pPr>
+              <a:lnSpc>
+                <a:spcPct val="100000"/>
+              </a:lnSpc>
+            </a:pPr>
+            <a:r>
+              <a:rPr b="1" lang="pt-BR" sz="2600" spc="-1" strike="noStrike">
+                <a:solidFill>
+                  <a:srgbClr val="8dc641"/>
+                </a:solidFill>
+                <a:latin typeface="Arial"/>
+                <a:ea typeface="Arial"/>
+              </a:rPr>
+              <a:t> </a:t>
+            </a:r>
+            <a:r>
+              <a:rPr b="1" lang="pt-BR" sz="2600" spc="-1" strike="noStrike">
+                <a:solidFill>
+                  <a:srgbClr val="8dc641"/>
+                </a:solidFill>
+                <a:latin typeface="Arial"/>
+                <a:ea typeface="Arial"/>
+              </a:rPr>
+              <a:t>Tecnologias envolvidas nas etapas</a:t>
+            </a:r>
+            <a:endParaRPr b="0" lang="pt-BR" sz="2600" spc="-1" strike="noStrike">
+              <a:latin typeface="Arial"/>
+            </a:endParaRPr>
+          </a:p>
+        </p:txBody>
+      </p:sp>
       <p:pic>
         <p:nvPicPr>
-          <p:cNvPr id="96" name="Google Shape;92;p13" descr=""/>
+          <p:cNvPr id="104" name="Google Shape;166;p39" descr=""/>
           <p:cNvPicPr/>
           <p:nvPr/>
         </p:nvPicPr>
@@ -4759,8 +4932,8 @@
         </p:blipFill>
         <p:spPr>
           <a:xfrm>
-            <a:off x="268920" y="573840"/>
-            <a:ext cx="5751360" cy="1359360"/>
+            <a:off x="235080" y="283680"/>
+            <a:ext cx="4000680" cy="1019520"/>
           </a:xfrm>
           <a:prstGeom prst="rect">
             <a:avLst/>
@@ -4828,14 +5001,14 @@
       </p:grpSpPr>
       <p:sp>
         <p:nvSpPr>
-          <p:cNvPr id="97" name="CustomShape 1"/>
+          <p:cNvPr id="105" name="CustomShape 1"/>
           <p:cNvSpPr/>
           <p:nvPr/>
         </p:nvSpPr>
         <p:spPr>
           <a:xfrm>
             <a:off x="0" y="0"/>
-            <a:ext cx="12191400" cy="2115360"/>
+            <a:ext cx="12192120" cy="1586520"/>
           </a:xfrm>
           <a:prstGeom prst="rect">
             <a:avLst/>
@@ -4856,7 +5029,7 @@
       </p:sp>
       <p:pic>
         <p:nvPicPr>
-          <p:cNvPr id="98" name="Google Shape;89;p13" descr=""/>
+          <p:cNvPr id="106" name="Google Shape;89;p13" descr=""/>
           <p:cNvPicPr/>
           <p:nvPr/>
         </p:nvPicPr>
@@ -4867,7 +5040,7 @@
         <p:spPr>
           <a:xfrm>
             <a:off x="10561680" y="0"/>
-            <a:ext cx="1083600" cy="2507400"/>
+            <a:ext cx="1083240" cy="2507040"/>
           </a:xfrm>
           <a:prstGeom prst="rect">
             <a:avLst/>
@@ -4879,14 +5052,14 @@
       </p:pic>
       <p:sp>
         <p:nvSpPr>
-          <p:cNvPr id="99" name="CustomShape 2"/>
+          <p:cNvPr id="107" name="CustomShape 2"/>
           <p:cNvSpPr/>
           <p:nvPr/>
         </p:nvSpPr>
         <p:spPr>
           <a:xfrm>
-            <a:off x="2278800" y="2637000"/>
-            <a:ext cx="7512840" cy="1322640"/>
+            <a:off x="2423160" y="1809360"/>
+            <a:ext cx="7512480" cy="1322280"/>
           </a:xfrm>
           <a:prstGeom prst="rect">
             <a:avLst/>
@@ -4935,48 +5108,18 @@
               <a:latin typeface="Arial"/>
             </a:endParaRPr>
           </a:p>
-          <a:p>
-            <a:pPr algn="ctr">
-              <a:lnSpc>
-                <a:spcPct val="100000"/>
-              </a:lnSpc>
-            </a:pPr>
-            <a:r>
-              <a:rPr b="1" lang="pt-BR" sz="2600" spc="-1" strike="noStrike">
-                <a:solidFill>
-                  <a:srgbClr val="8dc641"/>
-                </a:solidFill>
-                <a:latin typeface="Arial"/>
-                <a:ea typeface="Arial"/>
-              </a:rPr>
-              <a:t> </a:t>
-            </a:r>
-            <a:r>
-              <a:rPr b="1" lang="pt-BR" sz="2600" spc="-1" strike="noStrike">
-                <a:solidFill>
-                  <a:srgbClr val="8dc641"/>
-                </a:solidFill>
-                <a:latin typeface="Arial"/>
-                <a:ea typeface="Arial"/>
-              </a:rPr>
-              <a:t>Cronograma (quando cada etapa será entregue)</a:t>
-            </a:r>
-            <a:endParaRPr b="0" lang="pt-BR" sz="2600" spc="-1" strike="noStrike">
-              <a:latin typeface="Arial"/>
-            </a:endParaRPr>
-          </a:p>
-        </p:txBody>
-      </p:sp>
-      <p:sp>
-        <p:nvSpPr>
-          <p:cNvPr id="100" name="CustomShape 3"/>
+        </p:txBody>
+      </p:sp>
+      <p:sp>
+        <p:nvSpPr>
+          <p:cNvPr id="108" name="CustomShape 3"/>
           <p:cNvSpPr/>
           <p:nvPr/>
         </p:nvSpPr>
         <p:spPr>
           <a:xfrm>
-            <a:off x="461160" y="6479280"/>
-            <a:ext cx="11130480" cy="720360"/>
+            <a:off x="360000" y="6479280"/>
+            <a:ext cx="11130120" cy="720000"/>
           </a:xfrm>
           <a:prstGeom prst="rect">
             <a:avLst/>
@@ -5026,9 +5169,187 @@
           </a:p>
         </p:txBody>
       </p:sp>
+      <p:sp>
+        <p:nvSpPr>
+          <p:cNvPr id="109" name="CustomShape 4"/>
+          <p:cNvSpPr/>
+          <p:nvPr/>
+        </p:nvSpPr>
+        <p:spPr>
+          <a:xfrm>
+            <a:off x="2160000" y="2952000"/>
+            <a:ext cx="8205840" cy="459000"/>
+          </a:xfrm>
+          <a:prstGeom prst="rect">
+            <a:avLst/>
+          </a:prstGeom>
+          <a:noFill/>
+          <a:ln>
+            <a:noFill/>
+          </a:ln>
+        </p:spPr>
+        <p:style>
+          <a:lnRef idx="0"/>
+          <a:fillRef idx="0"/>
+          <a:effectRef idx="0"/>
+          <a:fontRef idx="minor"/>
+        </p:style>
+        <p:txBody>
+          <a:bodyPr lIns="90000" rIns="90000" tIns="45000" bIns="45000"/>
+          <a:p>
+            <a:pPr>
+              <a:lnSpc>
+                <a:spcPct val="100000"/>
+              </a:lnSpc>
+            </a:pPr>
+            <a:r>
+              <a:rPr b="1" lang="pt-BR" sz="2600" spc="-1" strike="noStrike">
+                <a:solidFill>
+                  <a:srgbClr val="8dc641"/>
+                </a:solidFill>
+                <a:latin typeface="Arial"/>
+                <a:ea typeface="Arial"/>
+              </a:rPr>
+              <a:t>Aplicações das tecnologias (onde serão aplicadas)</a:t>
+            </a:r>
+            <a:endParaRPr b="0" lang="pt-BR" sz="2600" spc="-1" strike="noStrike">
+              <a:latin typeface="Arial"/>
+            </a:endParaRPr>
+          </a:p>
+        </p:txBody>
+      </p:sp>
+      <p:sp>
+        <p:nvSpPr>
+          <p:cNvPr id="110" name="CustomShape 5"/>
+          <p:cNvSpPr/>
+          <p:nvPr/>
+        </p:nvSpPr>
+        <p:spPr>
+          <a:xfrm>
+            <a:off x="1188000" y="3674520"/>
+            <a:ext cx="9812160" cy="1653120"/>
+          </a:xfrm>
+          <a:prstGeom prst="rect">
+            <a:avLst/>
+          </a:prstGeom>
+          <a:noFill/>
+          <a:ln>
+            <a:noFill/>
+          </a:ln>
+        </p:spPr>
+        <p:style>
+          <a:lnRef idx="0"/>
+          <a:fillRef idx="0"/>
+          <a:effectRef idx="0"/>
+          <a:fontRef idx="minor"/>
+        </p:style>
+        <p:txBody>
+          <a:bodyPr lIns="90000" rIns="90000" tIns="45000" bIns="45000"/>
+          <a:p>
+            <a:pPr algn="just">
+              <a:lnSpc>
+                <a:spcPct val="100000"/>
+              </a:lnSpc>
+            </a:pPr>
+            <a:r>
+              <a:rPr b="1" lang="pt-BR" sz="1800" spc="-1" strike="noStrike">
+                <a:solidFill>
+                  <a:srgbClr val="8dc641"/>
+                </a:solidFill>
+                <a:latin typeface="Arial"/>
+                <a:ea typeface="Arial"/>
+              </a:rPr>
+              <a:t>Para realizar a modelagem do sistema, será utilizado a ferramenta lucidchart</a:t>
+            </a:r>
+            <a:endParaRPr b="0" lang="pt-BR" sz="1800" spc="-1" strike="noStrike">
+              <a:latin typeface="Arial"/>
+            </a:endParaRPr>
+          </a:p>
+          <a:p>
+            <a:pPr algn="just">
+              <a:lnSpc>
+                <a:spcPct val="100000"/>
+              </a:lnSpc>
+            </a:pPr>
+            <a:r>
+              <a:rPr b="1" lang="pt-BR" sz="1800" spc="-1" strike="noStrike">
+                <a:solidFill>
+                  <a:srgbClr val="8dc641"/>
+                </a:solidFill>
+                <a:latin typeface="Arial"/>
+                <a:ea typeface="Arial"/>
+              </a:rPr>
+              <a:t>para fazermos os diagramas de classe e casos de uso do sistema.</a:t>
+            </a:r>
+            <a:endParaRPr b="0" lang="pt-BR" sz="1800" spc="-1" strike="noStrike">
+              <a:latin typeface="Arial"/>
+            </a:endParaRPr>
+          </a:p>
+          <a:p>
+            <a:pPr algn="just">
+              <a:lnSpc>
+                <a:spcPct val="100000"/>
+              </a:lnSpc>
+            </a:pPr>
+            <a:endParaRPr b="0" lang="pt-BR" sz="1800" spc="-1" strike="noStrike">
+              <a:latin typeface="Arial"/>
+            </a:endParaRPr>
+          </a:p>
+          <a:p>
+            <a:pPr algn="just">
+              <a:lnSpc>
+                <a:spcPct val="100000"/>
+              </a:lnSpc>
+            </a:pPr>
+            <a:r>
+              <a:rPr b="1" lang="pt-BR" sz="1800" spc="-1" strike="noStrike">
+                <a:solidFill>
+                  <a:srgbClr val="8dc641"/>
+                </a:solidFill>
+                <a:latin typeface="Arial"/>
+                <a:ea typeface="Arial"/>
+              </a:rPr>
+              <a:t>Para fazermos a modelagem do banco de dados, será usado o próprio mysql workbench</a:t>
+            </a:r>
+            <a:endParaRPr b="0" lang="pt-BR" sz="1800" spc="-1" strike="noStrike">
+              <a:latin typeface="Arial"/>
+            </a:endParaRPr>
+          </a:p>
+          <a:p>
+            <a:pPr algn="just">
+              <a:lnSpc>
+                <a:spcPct val="100000"/>
+              </a:lnSpc>
+            </a:pPr>
+            <a:r>
+              <a:rPr b="1" lang="pt-BR" sz="1800" spc="-1" strike="noStrike">
+                <a:solidFill>
+                  <a:srgbClr val="8dc641"/>
+                </a:solidFill>
+                <a:latin typeface="Arial"/>
+                <a:ea typeface="Arial"/>
+              </a:rPr>
+              <a:t>Pois quando fizermos o modelo lógico já poderemos convertê-lo  para o modelo físico</a:t>
+            </a:r>
+            <a:endParaRPr b="0" lang="pt-BR" sz="1800" spc="-1" strike="noStrike">
+              <a:latin typeface="Arial"/>
+            </a:endParaRPr>
+          </a:p>
+          <a:p>
+            <a:pPr algn="just">
+              <a:lnSpc>
+                <a:spcPct val="100000"/>
+              </a:lnSpc>
+            </a:pPr>
+            <a:endParaRPr b="0" lang="pt-BR" sz="1800" spc="-1" strike="noStrike">
+              <a:latin typeface="Arial"/>
+            </a:endParaRPr>
+          </a:p>
+        </p:txBody>
+      </p:sp>
       <p:pic>
         <p:nvPicPr>
-          <p:cNvPr id="101" name="Google Shape;92;p13" descr=""/>
+          <p:cNvPr id="111" name="Google Shape;166;p39" descr=""/>
           <p:cNvPicPr/>
           <p:nvPr/>
         </p:nvPicPr>
@@ -5038,8 +5359,8 @@
         </p:blipFill>
         <p:spPr>
           <a:xfrm>
-            <a:off x="268920" y="573840"/>
-            <a:ext cx="5751360" cy="1359360"/>
+            <a:off x="235080" y="283680"/>
+            <a:ext cx="4000680" cy="1019520"/>
           </a:xfrm>
           <a:prstGeom prst="rect">
             <a:avLst/>
@@ -5058,6 +5379,674 @@
           <p:childTnLst>
             <p:seq>
               <p:cTn id="12" dur="indefinite" nodeType="mainSeq"/>
+              <p:prevCondLst>
+                <p:cond delay="0" evt="onPrev">
+                  <p:tgtEl>
+                    <p:sldTgt/>
+                  </p:tgtEl>
+                </p:cond>
+              </p:prevCondLst>
+              <p:nextCondLst>
+                <p:cond delay="0" evt="onNext">
+                  <p:tgtEl>
+                    <p:sldTgt/>
+                  </p:tgtEl>
+                </p:cond>
+              </p:nextCondLst>
+            </p:seq>
+          </p:childTnLst>
+        </p:cTn>
+      </p:par>
+    </p:tnLst>
+  </p:timing>
+</p:sld>
+</file>
+
+<file path=ppt/slides/slide7.xml><?xml version="1.0" encoding="utf-8"?>
+<p:sld xmlns:a="http://schemas.openxmlformats.org/drawingml/2006/main" xmlns:p="http://schemas.openxmlformats.org/presentationml/2006/main" xmlns:r="http://schemas.openxmlformats.org/officeDocument/2006/relationships" xmlns:p14="http://schemas.microsoft.com/office/powerpoint/2010/main" xmlns:p15="http://schemas.microsoft.com/office/powerpoint/2012/main" xmlns:mc="http://schemas.openxmlformats.org/markup-compatibility/2006">
+  <p:cSld>
+    <p:bg>
+      <p:bgPr>
+        <a:solidFill>
+          <a:srgbClr val="ffffff"/>
+        </a:solidFill>
+      </p:bgPr>
+    </p:bg>
+    <p:spTree>
+      <p:nvGrpSpPr>
+        <p:cNvPr id="1" name=""/>
+        <p:cNvGrpSpPr/>
+        <p:nvPr/>
+      </p:nvGrpSpPr>
+      <p:grpSpPr>
+        <a:xfrm>
+          <a:off x="0" y="0"/>
+          <a:ext cx="0" cy="0"/>
+          <a:chOff x="0" y="0"/>
+          <a:chExt cx="0" cy="0"/>
+        </a:xfrm>
+      </p:grpSpPr>
+      <p:sp>
+        <p:nvSpPr>
+          <p:cNvPr id="112" name="CustomShape 1"/>
+          <p:cNvSpPr/>
+          <p:nvPr/>
+        </p:nvSpPr>
+        <p:spPr>
+          <a:xfrm>
+            <a:off x="0" y="0"/>
+            <a:ext cx="12192120" cy="1586520"/>
+          </a:xfrm>
+          <a:prstGeom prst="rect">
+            <a:avLst/>
+          </a:prstGeom>
+          <a:solidFill>
+            <a:srgbClr val="347c36"/>
+          </a:solidFill>
+          <a:ln>
+            <a:noFill/>
+          </a:ln>
+        </p:spPr>
+        <p:style>
+          <a:lnRef idx="0"/>
+          <a:fillRef idx="0"/>
+          <a:effectRef idx="0"/>
+          <a:fontRef idx="minor"/>
+        </p:style>
+      </p:sp>
+      <p:pic>
+        <p:nvPicPr>
+          <p:cNvPr id="113" name="Google Shape;89;p13" descr=""/>
+          <p:cNvPicPr/>
+          <p:nvPr/>
+        </p:nvPicPr>
+        <p:blipFill>
+          <a:blip r:embed="rId1"/>
+          <a:stretch/>
+        </p:blipFill>
+        <p:spPr>
+          <a:xfrm>
+            <a:off x="10561680" y="0"/>
+            <a:ext cx="1083240" cy="2507040"/>
+          </a:xfrm>
+          <a:prstGeom prst="rect">
+            <a:avLst/>
+          </a:prstGeom>
+          <a:ln>
+            <a:noFill/>
+          </a:ln>
+        </p:spPr>
+      </p:pic>
+      <p:sp>
+        <p:nvSpPr>
+          <p:cNvPr id="114" name="CustomShape 2"/>
+          <p:cNvSpPr/>
+          <p:nvPr/>
+        </p:nvSpPr>
+        <p:spPr>
+          <a:xfrm>
+            <a:off x="2160000" y="1872000"/>
+            <a:ext cx="7512480" cy="1322280"/>
+          </a:xfrm>
+          <a:prstGeom prst="rect">
+            <a:avLst/>
+          </a:prstGeom>
+          <a:noFill/>
+          <a:ln>
+            <a:noFill/>
+          </a:ln>
+        </p:spPr>
+        <p:style>
+          <a:lnRef idx="0"/>
+          <a:fillRef idx="0"/>
+          <a:effectRef idx="0"/>
+          <a:fontRef idx="minor"/>
+        </p:style>
+        <p:txBody>
+          <a:bodyPr lIns="90000" rIns="90000" tIns="45000" bIns="45000"/>
+          <a:p>
+            <a:pPr algn="ctr">
+              <a:lnSpc>
+                <a:spcPct val="100000"/>
+              </a:lnSpc>
+            </a:pPr>
+            <a:br/>
+            <a:r>
+              <a:rPr b="1" lang="pt-BR" sz="3200" spc="-1" strike="noStrike">
+                <a:solidFill>
+                  <a:srgbClr val="8dc641"/>
+                </a:solidFill>
+                <a:latin typeface="Arial"/>
+                <a:ea typeface="Arial"/>
+              </a:rPr>
+              <a:t>Prática  de análise de sistemas</a:t>
+            </a:r>
+            <a:endParaRPr b="0" lang="pt-BR" sz="3200" spc="-1" strike="noStrike">
+              <a:latin typeface="Arial"/>
+            </a:endParaRPr>
+          </a:p>
+          <a:p>
+            <a:pPr algn="ctr">
+              <a:lnSpc>
+                <a:spcPct val="100000"/>
+              </a:lnSpc>
+            </a:pPr>
+            <a:endParaRPr b="0" lang="pt-BR" sz="3200" spc="-1" strike="noStrike">
+              <a:latin typeface="Arial"/>
+            </a:endParaRPr>
+          </a:p>
+        </p:txBody>
+      </p:sp>
+      <p:sp>
+        <p:nvSpPr>
+          <p:cNvPr id="115" name="CustomShape 3"/>
+          <p:cNvSpPr/>
+          <p:nvPr/>
+        </p:nvSpPr>
+        <p:spPr>
+          <a:xfrm>
+            <a:off x="461160" y="6479280"/>
+            <a:ext cx="11130120" cy="720000"/>
+          </a:xfrm>
+          <a:prstGeom prst="rect">
+            <a:avLst/>
+          </a:prstGeom>
+          <a:noFill/>
+          <a:ln>
+            <a:noFill/>
+          </a:ln>
+        </p:spPr>
+        <p:style>
+          <a:lnRef idx="0"/>
+          <a:fillRef idx="0"/>
+          <a:effectRef idx="0"/>
+          <a:fontRef idx="minor"/>
+        </p:style>
+        <p:txBody>
+          <a:bodyPr lIns="90000" rIns="90000" tIns="45000" bIns="45000"/>
+          <a:p>
+            <a:pPr algn="ctr">
+              <a:lnSpc>
+                <a:spcPct val="100000"/>
+              </a:lnSpc>
+            </a:pPr>
+            <a:r>
+              <a:rPr b="1" lang="pt-BR" sz="1500" spc="-1" strike="noStrike">
+                <a:solidFill>
+                  <a:srgbClr val="8dc641"/>
+                </a:solidFill>
+                <a:latin typeface="Arial"/>
+                <a:ea typeface="Arial"/>
+              </a:rPr>
+              <a:t> </a:t>
+            </a:r>
+            <a:r>
+              <a:rPr b="1" lang="pt-BR" sz="1500" spc="-1" strike="noStrike">
+                <a:solidFill>
+                  <a:srgbClr val="8dc641"/>
+                </a:solidFill>
+                <a:latin typeface="Arial"/>
+                <a:ea typeface="Arial"/>
+              </a:rPr>
+              <a:t>Fabio Vasques, Gieder Loreto</a:t>
+            </a:r>
+            <a:endParaRPr b="0" lang="pt-BR" sz="1500" spc="-1" strike="noStrike">
+              <a:latin typeface="Arial"/>
+            </a:endParaRPr>
+          </a:p>
+        </p:txBody>
+      </p:sp>
+      <p:sp>
+        <p:nvSpPr>
+          <p:cNvPr id="116" name="CustomShape 4"/>
+          <p:cNvSpPr/>
+          <p:nvPr/>
+        </p:nvSpPr>
+        <p:spPr>
+          <a:xfrm>
+            <a:off x="4320000" y="2288880"/>
+            <a:ext cx="2332080" cy="914760"/>
+          </a:xfrm>
+          <a:prstGeom prst="rect">
+            <a:avLst/>
+          </a:prstGeom>
+          <a:noFill/>
+          <a:ln>
+            <a:noFill/>
+          </a:ln>
+        </p:spPr>
+        <p:style>
+          <a:lnRef idx="0"/>
+          <a:fillRef idx="0"/>
+          <a:effectRef idx="0"/>
+          <a:fontRef idx="minor"/>
+        </p:style>
+        <p:txBody>
+          <a:bodyPr lIns="90000" rIns="90000" tIns="45000" bIns="45000"/>
+          <a:p>
+            <a:pPr algn="ctr">
+              <a:lnSpc>
+                <a:spcPct val="100000"/>
+              </a:lnSpc>
+            </a:pPr>
+            <a:endParaRPr b="0" lang="pt-BR" sz="1800" spc="-1" strike="noStrike">
+              <a:latin typeface="Arial"/>
+            </a:endParaRPr>
+          </a:p>
+          <a:p>
+            <a:pPr>
+              <a:lnSpc>
+                <a:spcPct val="100000"/>
+              </a:lnSpc>
+            </a:pPr>
+            <a:r>
+              <a:rPr b="1" lang="pt-BR" sz="2600" spc="-1" strike="noStrike">
+                <a:solidFill>
+                  <a:srgbClr val="8dc641"/>
+                </a:solidFill>
+                <a:latin typeface="Arial"/>
+                <a:ea typeface="Arial"/>
+              </a:rPr>
+              <a:t> </a:t>
+            </a:r>
+            <a:r>
+              <a:rPr b="1" lang="pt-BR" sz="2600" spc="-1" strike="noStrike">
+                <a:solidFill>
+                  <a:srgbClr val="8dc641"/>
+                </a:solidFill>
+                <a:latin typeface="Arial"/>
+                <a:ea typeface="Arial"/>
+              </a:rPr>
+              <a:t>Cronograma </a:t>
+            </a:r>
+            <a:endParaRPr b="0" lang="pt-BR" sz="2600" spc="-1" strike="noStrike">
+              <a:latin typeface="Arial"/>
+            </a:endParaRPr>
+          </a:p>
+        </p:txBody>
+      </p:sp>
+      <p:sp>
+        <p:nvSpPr>
+          <p:cNvPr id="117" name="CustomShape 5"/>
+          <p:cNvSpPr/>
+          <p:nvPr/>
+        </p:nvSpPr>
+        <p:spPr>
+          <a:xfrm>
+            <a:off x="1944720" y="3493080"/>
+            <a:ext cx="7335720" cy="656640"/>
+          </a:xfrm>
+          <a:prstGeom prst="rect">
+            <a:avLst/>
+          </a:prstGeom>
+          <a:noFill/>
+          <a:ln>
+            <a:noFill/>
+          </a:ln>
+        </p:spPr>
+        <p:style>
+          <a:lnRef idx="0"/>
+          <a:fillRef idx="0"/>
+          <a:effectRef idx="0"/>
+          <a:fontRef idx="minor"/>
+        </p:style>
+        <p:txBody>
+          <a:bodyPr lIns="90000" rIns="90000" tIns="45000" bIns="45000"/>
+          <a:p>
+            <a:pPr>
+              <a:lnSpc>
+                <a:spcPct val="100000"/>
+              </a:lnSpc>
+            </a:pPr>
+            <a:r>
+              <a:rPr b="1" lang="pt-BR" sz="2000" spc="-1" strike="noStrike">
+                <a:solidFill>
+                  <a:srgbClr val="8dc641"/>
+                </a:solidFill>
+                <a:latin typeface="Arial"/>
+                <a:ea typeface="Arial"/>
+              </a:rPr>
+              <a:t>durante as fazes do projeto, será usado a ferramenta trello </a:t>
+            </a:r>
+            <a:endParaRPr b="0" lang="pt-BR" sz="2000" spc="-1" strike="noStrike">
+              <a:latin typeface="Arial"/>
+            </a:endParaRPr>
+          </a:p>
+          <a:p>
+            <a:pPr>
+              <a:lnSpc>
+                <a:spcPct val="100000"/>
+              </a:lnSpc>
+            </a:pPr>
+            <a:r>
+              <a:rPr b="1" lang="pt-BR" sz="2000" spc="-1" strike="noStrike">
+                <a:solidFill>
+                  <a:srgbClr val="8dc641"/>
+                </a:solidFill>
+                <a:latin typeface="Arial"/>
+                <a:ea typeface="Arial"/>
+              </a:rPr>
+              <a:t>para auxiliar no planejamento das tarefas.</a:t>
+            </a:r>
+            <a:endParaRPr b="0" lang="pt-BR" sz="2000" spc="-1" strike="noStrike">
+              <a:latin typeface="Arial"/>
+            </a:endParaRPr>
+          </a:p>
+        </p:txBody>
+      </p:sp>
+      <p:pic>
+        <p:nvPicPr>
+          <p:cNvPr id="118" name="Google Shape;166;p39" descr=""/>
+          <p:cNvPicPr/>
+          <p:nvPr/>
+        </p:nvPicPr>
+        <p:blipFill>
+          <a:blip r:embed="rId2"/>
+          <a:stretch/>
+        </p:blipFill>
+        <p:spPr>
+          <a:xfrm>
+            <a:off x="235080" y="283680"/>
+            <a:ext cx="4000680" cy="1019520"/>
+          </a:xfrm>
+          <a:prstGeom prst="rect">
+            <a:avLst/>
+          </a:prstGeom>
+          <a:ln>
+            <a:noFill/>
+          </a:ln>
+        </p:spPr>
+      </p:pic>
+    </p:spTree>
+  </p:cSld>
+  <p:timing>
+    <p:tnLst>
+      <p:par>
+        <p:cTn id="13" dur="indefinite" restart="never" nodeType="tmRoot">
+          <p:childTnLst>
+            <p:seq>
+              <p:cTn id="14" dur="indefinite" nodeType="mainSeq"/>
+              <p:prevCondLst>
+                <p:cond delay="0" evt="onPrev">
+                  <p:tgtEl>
+                    <p:sldTgt/>
+                  </p:tgtEl>
+                </p:cond>
+              </p:prevCondLst>
+              <p:nextCondLst>
+                <p:cond delay="0" evt="onNext">
+                  <p:tgtEl>
+                    <p:sldTgt/>
+                  </p:tgtEl>
+                </p:cond>
+              </p:nextCondLst>
+            </p:seq>
+          </p:childTnLst>
+        </p:cTn>
+      </p:par>
+    </p:tnLst>
+  </p:timing>
+</p:sld>
+</file>
+
+<file path=ppt/slides/slide8.xml><?xml version="1.0" encoding="utf-8"?>
+<p:sld xmlns:a="http://schemas.openxmlformats.org/drawingml/2006/main" xmlns:p="http://schemas.openxmlformats.org/presentationml/2006/main" xmlns:r="http://schemas.openxmlformats.org/officeDocument/2006/relationships" xmlns:p14="http://schemas.microsoft.com/office/powerpoint/2010/main" xmlns:p15="http://schemas.microsoft.com/office/powerpoint/2012/main" xmlns:mc="http://schemas.openxmlformats.org/markup-compatibility/2006">
+  <p:cSld>
+    <p:bg>
+      <p:bgPr>
+        <a:solidFill>
+          <a:srgbClr val="ffffff"/>
+        </a:solidFill>
+      </p:bgPr>
+    </p:bg>
+    <p:spTree>
+      <p:nvGrpSpPr>
+        <p:cNvPr id="1" name=""/>
+        <p:cNvGrpSpPr/>
+        <p:nvPr/>
+      </p:nvGrpSpPr>
+      <p:grpSpPr>
+        <a:xfrm>
+          <a:off x="0" y="0"/>
+          <a:ext cx="0" cy="0"/>
+          <a:chOff x="0" y="0"/>
+          <a:chExt cx="0" cy="0"/>
+        </a:xfrm>
+      </p:grpSpPr>
+      <p:sp>
+        <p:nvSpPr>
+          <p:cNvPr id="119" name="CustomShape 1"/>
+          <p:cNvSpPr/>
+          <p:nvPr/>
+        </p:nvSpPr>
+        <p:spPr>
+          <a:xfrm>
+            <a:off x="0" y="0"/>
+            <a:ext cx="12192120" cy="1586520"/>
+          </a:xfrm>
+          <a:prstGeom prst="rect">
+            <a:avLst/>
+          </a:prstGeom>
+          <a:solidFill>
+            <a:srgbClr val="347c36"/>
+          </a:solidFill>
+          <a:ln>
+            <a:noFill/>
+          </a:ln>
+        </p:spPr>
+        <p:style>
+          <a:lnRef idx="0"/>
+          <a:fillRef idx="0"/>
+          <a:effectRef idx="0"/>
+          <a:fontRef idx="minor"/>
+        </p:style>
+      </p:sp>
+      <p:pic>
+        <p:nvPicPr>
+          <p:cNvPr id="120" name="Google Shape;89;p13" descr=""/>
+          <p:cNvPicPr/>
+          <p:nvPr/>
+        </p:nvPicPr>
+        <p:blipFill>
+          <a:blip r:embed="rId1"/>
+          <a:stretch/>
+        </p:blipFill>
+        <p:spPr>
+          <a:xfrm>
+            <a:off x="10561680" y="0"/>
+            <a:ext cx="1083240" cy="1800000"/>
+          </a:xfrm>
+          <a:prstGeom prst="rect">
+            <a:avLst/>
+          </a:prstGeom>
+          <a:ln>
+            <a:noFill/>
+          </a:ln>
+        </p:spPr>
+      </p:pic>
+      <p:sp>
+        <p:nvSpPr>
+          <p:cNvPr id="121" name="CustomShape 2"/>
+          <p:cNvSpPr/>
+          <p:nvPr/>
+        </p:nvSpPr>
+        <p:spPr>
+          <a:xfrm>
+            <a:off x="461160" y="6479280"/>
+            <a:ext cx="11130120" cy="720000"/>
+          </a:xfrm>
+          <a:prstGeom prst="rect">
+            <a:avLst/>
+          </a:prstGeom>
+          <a:noFill/>
+          <a:ln>
+            <a:noFill/>
+          </a:ln>
+        </p:spPr>
+        <p:style>
+          <a:lnRef idx="0"/>
+          <a:fillRef idx="0"/>
+          <a:effectRef idx="0"/>
+          <a:fontRef idx="minor"/>
+        </p:style>
+        <p:txBody>
+          <a:bodyPr lIns="90000" rIns="90000" tIns="45000" bIns="45000"/>
+          <a:p>
+            <a:pPr algn="ctr">
+              <a:lnSpc>
+                <a:spcPct val="100000"/>
+              </a:lnSpc>
+            </a:pPr>
+            <a:r>
+              <a:rPr b="1" lang="pt-BR" sz="1500" spc="-1" strike="noStrike">
+                <a:solidFill>
+                  <a:srgbClr val="8dc641"/>
+                </a:solidFill>
+                <a:latin typeface="Arial"/>
+                <a:ea typeface="Arial"/>
+              </a:rPr>
+              <a:t> </a:t>
+            </a:r>
+            <a:r>
+              <a:rPr b="1" lang="pt-BR" sz="1500" spc="-1" strike="noStrike">
+                <a:solidFill>
+                  <a:srgbClr val="8dc641"/>
+                </a:solidFill>
+                <a:latin typeface="Arial"/>
+                <a:ea typeface="Arial"/>
+              </a:rPr>
+              <a:t>Fabio Vasques, Gieder Loreto</a:t>
+            </a:r>
+            <a:endParaRPr b="0" lang="pt-BR" sz="1500" spc="-1" strike="noStrike">
+              <a:latin typeface="Arial"/>
+            </a:endParaRPr>
+          </a:p>
+        </p:txBody>
+      </p:sp>
+      <p:sp>
+        <p:nvSpPr>
+          <p:cNvPr id="122" name="CustomShape 3"/>
+          <p:cNvSpPr/>
+          <p:nvPr/>
+        </p:nvSpPr>
+        <p:spPr>
+          <a:xfrm>
+            <a:off x="4320000" y="1316880"/>
+            <a:ext cx="2332080" cy="914760"/>
+          </a:xfrm>
+          <a:prstGeom prst="rect">
+            <a:avLst/>
+          </a:prstGeom>
+          <a:noFill/>
+          <a:ln>
+            <a:noFill/>
+          </a:ln>
+        </p:spPr>
+        <p:style>
+          <a:lnRef idx="0"/>
+          <a:fillRef idx="0"/>
+          <a:effectRef idx="0"/>
+          <a:fontRef idx="minor"/>
+        </p:style>
+        <p:txBody>
+          <a:bodyPr lIns="90000" rIns="90000" tIns="45000" bIns="45000"/>
+          <a:p>
+            <a:pPr algn="ctr">
+              <a:lnSpc>
+                <a:spcPct val="100000"/>
+              </a:lnSpc>
+            </a:pPr>
+            <a:endParaRPr b="0" lang="pt-BR" sz="1800" spc="-1" strike="noStrike">
+              <a:latin typeface="Arial"/>
+            </a:endParaRPr>
+          </a:p>
+          <a:p>
+            <a:pPr>
+              <a:lnSpc>
+                <a:spcPct val="100000"/>
+              </a:lnSpc>
+            </a:pPr>
+            <a:r>
+              <a:rPr b="1" lang="pt-BR" sz="2600" spc="-1" strike="noStrike">
+                <a:solidFill>
+                  <a:srgbClr val="8dc641"/>
+                </a:solidFill>
+                <a:latin typeface="Arial"/>
+                <a:ea typeface="Arial"/>
+              </a:rPr>
+              <a:t> </a:t>
+            </a:r>
+            <a:r>
+              <a:rPr b="1" lang="pt-BR" sz="2600" spc="-1" strike="noStrike">
+                <a:solidFill>
+                  <a:srgbClr val="8dc641"/>
+                </a:solidFill>
+                <a:latin typeface="Arial"/>
+                <a:ea typeface="Arial"/>
+              </a:rPr>
+              <a:t>Cronograma </a:t>
+            </a:r>
+            <a:endParaRPr b="0" lang="pt-BR" sz="2600" spc="-1" strike="noStrike">
+              <a:latin typeface="Arial"/>
+            </a:endParaRPr>
+          </a:p>
+        </p:txBody>
+      </p:sp>
+      <p:pic>
+        <p:nvPicPr>
+          <p:cNvPr id="123" name="" descr=""/>
+          <p:cNvPicPr/>
+          <p:nvPr/>
+        </p:nvPicPr>
+        <p:blipFill>
+          <a:blip r:embed="rId2"/>
+          <a:stretch/>
+        </p:blipFill>
+        <p:spPr>
+          <a:xfrm>
+            <a:off x="562320" y="2016000"/>
+            <a:ext cx="10417680" cy="4842000"/>
+          </a:xfrm>
+          <a:prstGeom prst="rect">
+            <a:avLst/>
+          </a:prstGeom>
+          <a:ln>
+            <a:noFill/>
+          </a:ln>
+        </p:spPr>
+      </p:pic>
+      <p:pic>
+        <p:nvPicPr>
+          <p:cNvPr id="124" name="Google Shape;166;p39" descr=""/>
+          <p:cNvPicPr/>
+          <p:nvPr/>
+        </p:nvPicPr>
+        <p:blipFill>
+          <a:blip r:embed="rId3"/>
+          <a:stretch/>
+        </p:blipFill>
+        <p:spPr>
+          <a:xfrm>
+            <a:off x="235080" y="283680"/>
+            <a:ext cx="4000680" cy="1019520"/>
+          </a:xfrm>
+          <a:prstGeom prst="rect">
+            <a:avLst/>
+          </a:prstGeom>
+          <a:ln>
+            <a:noFill/>
+          </a:ln>
+        </p:spPr>
+      </p:pic>
+    </p:spTree>
+  </p:cSld>
+  <p:timing>
+    <p:tnLst>
+      <p:par>
+        <p:cTn id="15" dur="indefinite" restart="never" nodeType="tmRoot">
+          <p:childTnLst>
+            <p:seq>
+              <p:cTn id="16" dur="indefinite" nodeType="mainSeq"/>
               <p:prevCondLst>
                 <p:cond delay="0" evt="onPrev">
                   <p:tgtEl>

</xml_diff>

<commit_message>
Revisao apresentacao com Logos + cronograma README
</commit_message>
<xml_diff>
--- a/primeira entrega.pptx
+++ b/primeira entrega.pptx
@@ -9,11 +9,12 @@
     <p:sldId id="257" r:id="rId3"/>
     <p:sldId id="258" r:id="rId4"/>
     <p:sldId id="259" r:id="rId5"/>
-    <p:sldId id="260" r:id="rId6"/>
-    <p:sldId id="261" r:id="rId7"/>
-    <p:sldId id="262" r:id="rId8"/>
-    <p:sldId id="263" r:id="rId9"/>
-    <p:sldId id="264" r:id="rId10"/>
+    <p:sldId id="265" r:id="rId6"/>
+    <p:sldId id="260" r:id="rId7"/>
+    <p:sldId id="261" r:id="rId8"/>
+    <p:sldId id="262" r:id="rId9"/>
+    <p:sldId id="263" r:id="rId10"/>
+    <p:sldId id="264" r:id="rId11"/>
   </p:sldIdLst>
   <p:sldSz cx="12192000" cy="6858000"/>
   <p:notesSz cx="7559675" cy="10691813"/>
@@ -112,6 +113,11 @@
       </a:defRPr>
     </a:lvl9pPr>
   </p:defaultTextStyle>
+  <p:extLst>
+    <p:ext uri="{EFAFB233-063F-42B5-8137-9DF3F51BA10A}">
+      <p15:sldGuideLst xmlns:p15="http://schemas.microsoft.com/office/powerpoint/2012/main"/>
+    </p:ext>
+  </p:extLst>
 </p:presentation>
 </file>
 
@@ -2125,7 +2131,7 @@
         </p:nvSpPr>
         <p:spPr>
           <a:xfrm>
-            <a:off x="2520000" y="1764000"/>
+            <a:off x="2918207" y="1870200"/>
             <a:ext cx="7512480" cy="1322280"/>
           </a:xfrm>
           <a:prstGeom prst="rect">
@@ -2157,18 +2163,23 @@
                 <a:spcPct val="100000"/>
               </a:lnSpc>
             </a:pPr>
-            <a:br/>
+            <a:br>
+              <a:rPr dirty="0"/>
+            </a:br>
             <a:r>
-              <a:rPr lang="pt-BR" sz="3200" b="1" strike="noStrike" spc="-1">
+              <a:rPr lang="pt-BR" sz="3200" b="1" strike="noStrike" spc="-1" dirty="0">
                 <a:solidFill>
-                  <a:srgbClr val="62A73B"/>
+                  <a:srgbClr val="92D050"/>
                 </a:solidFill>
                 <a:latin typeface="Arial"/>
                 <a:ea typeface="DejaVu Sans"/>
               </a:rPr>
               <a:t>Prática  de análise de sistemas</a:t>
             </a:r>
-            <a:endParaRPr lang="pt-BR" sz="3200" b="0" strike="noStrike" spc="-1">
+            <a:endParaRPr lang="pt-BR" sz="3200" b="0" strike="noStrike" spc="-1" dirty="0">
+              <a:solidFill>
+                <a:srgbClr val="92D050"/>
+              </a:solidFill>
               <a:latin typeface="Arial"/>
             </a:endParaRPr>
           </a:p>
@@ -2178,7 +2189,7 @@
                 <a:spcPct val="100000"/>
               </a:lnSpc>
             </a:pPr>
-            <a:endParaRPr lang="pt-BR" sz="3200" b="0" strike="noStrike" spc="-1">
+            <a:endParaRPr lang="pt-BR" sz="3200" b="0" strike="noStrike" spc="-1" dirty="0">
               <a:latin typeface="Arial"/>
             </a:endParaRPr>
           </a:p>
@@ -2280,7 +2291,7 @@
                 <a:spcPct val="100000"/>
               </a:lnSpc>
             </a:pPr>
-            <a:endParaRPr lang="pt-BR" sz="1800" b="0" strike="noStrike" spc="-1">
+            <a:endParaRPr lang="pt-BR" sz="1800" b="0" strike="noStrike" spc="-1" dirty="0">
               <a:latin typeface="Arial"/>
             </a:endParaRPr>
           </a:p>
@@ -2291,7 +2302,7 @@
               </a:lnSpc>
             </a:pPr>
             <a:r>
-              <a:rPr lang="pt-BR" sz="2000" b="1" strike="noStrike" spc="-1">
+              <a:rPr lang="pt-BR" sz="2000" b="1" strike="noStrike" spc="-1" dirty="0">
                 <a:solidFill>
                   <a:srgbClr val="8DC641"/>
                 </a:solidFill>
@@ -2300,7 +2311,7 @@
               </a:rPr>
               <a:t>Processo (etapas de desenvolvimento)</a:t>
             </a:r>
-            <a:endParaRPr lang="pt-BR" sz="2000" b="0" strike="noStrike" spc="-1">
+            <a:endParaRPr lang="pt-BR" sz="2000" b="0" strike="noStrike" spc="-1" dirty="0">
               <a:latin typeface="Arial"/>
             </a:endParaRPr>
           </a:p>
@@ -2396,6 +2407,329 @@
         </p:spPr>
       </p:pic>
     </p:spTree>
+  </p:cSld>
+  <p:clrMapOvr>
+    <a:masterClrMapping/>
+  </p:clrMapOvr>
+  <p:timing>
+    <p:tnLst>
+      <p:par>
+        <p:cTn id="1" dur="indefinite" restart="never" nodeType="tmRoot">
+          <p:childTnLst>
+            <p:seq>
+              <p:cTn id="2" dur="indefinite" nodeType="mainSeq"/>
+              <p:prevCondLst>
+                <p:cond evt="onPrev" delay="0">
+                  <p:tgtEl>
+                    <p:sldTgt/>
+                  </p:tgtEl>
+                </p:cond>
+              </p:prevCondLst>
+              <p:nextCondLst>
+                <p:cond evt="onNext" delay="0">
+                  <p:tgtEl>
+                    <p:sldTgt/>
+                  </p:tgtEl>
+                </p:cond>
+              </p:nextCondLst>
+            </p:seq>
+          </p:childTnLst>
+        </p:cTn>
+      </p:par>
+    </p:tnLst>
+  </p:timing>
+</p:sld>
+</file>
+
+<file path=ppt/slides/slide10.xml><?xml version="1.0" encoding="utf-8"?>
+<p:sld xmlns:a="http://schemas.openxmlformats.org/drawingml/2006/main" xmlns:r="http://schemas.openxmlformats.org/officeDocument/2006/relationships" xmlns:p="http://schemas.openxmlformats.org/presentationml/2006/main">
+  <p:cSld>
+    <p:bg>
+      <p:bgPr>
+        <a:solidFill>
+          <a:srgbClr val="FFFFFF"/>
+        </a:solidFill>
+        <a:effectLst/>
+      </p:bgPr>
+    </p:bg>
+    <p:spTree>
+      <p:nvGrpSpPr>
+        <p:cNvPr id="1" name=""/>
+        <p:cNvGrpSpPr/>
+        <p:nvPr/>
+      </p:nvGrpSpPr>
+      <p:grpSpPr>
+        <a:xfrm>
+          <a:off x="0" y="0"/>
+          <a:ext cx="0" cy="0"/>
+          <a:chOff x="0" y="0"/>
+          <a:chExt cx="0" cy="0"/>
+        </a:xfrm>
+      </p:grpSpPr>
+      <p:sp>
+        <p:nvSpPr>
+          <p:cNvPr id="119" name="CustomShape 1"/>
+          <p:cNvSpPr/>
+          <p:nvPr/>
+        </p:nvSpPr>
+        <p:spPr>
+          <a:xfrm>
+            <a:off x="0" y="0"/>
+            <a:ext cx="12192120" cy="1586520"/>
+          </a:xfrm>
+          <a:prstGeom prst="rect">
+            <a:avLst/>
+          </a:prstGeom>
+          <a:solidFill>
+            <a:srgbClr val="347C36"/>
+          </a:solidFill>
+          <a:ln>
+            <a:noFill/>
+          </a:ln>
+        </p:spPr>
+        <p:style>
+          <a:lnRef idx="0">
+            <a:scrgbClr r="0" g="0" b="0"/>
+          </a:lnRef>
+          <a:fillRef idx="0">
+            <a:scrgbClr r="0" g="0" b="0"/>
+          </a:fillRef>
+          <a:effectRef idx="0">
+            <a:scrgbClr r="0" g="0" b="0"/>
+          </a:effectRef>
+          <a:fontRef idx="minor"/>
+        </p:style>
+      </p:sp>
+      <p:pic>
+        <p:nvPicPr>
+          <p:cNvPr id="120" name="Google Shape;89;p13"/>
+          <p:cNvPicPr/>
+          <p:nvPr/>
+        </p:nvPicPr>
+        <p:blipFill>
+          <a:blip r:embed="rId2"/>
+          <a:stretch/>
+        </p:blipFill>
+        <p:spPr>
+          <a:xfrm>
+            <a:off x="10561680" y="0"/>
+            <a:ext cx="1083240" cy="1800000"/>
+          </a:xfrm>
+          <a:prstGeom prst="rect">
+            <a:avLst/>
+          </a:prstGeom>
+          <a:ln>
+            <a:noFill/>
+          </a:ln>
+        </p:spPr>
+      </p:pic>
+      <p:sp>
+        <p:nvSpPr>
+          <p:cNvPr id="121" name="CustomShape 2"/>
+          <p:cNvSpPr/>
+          <p:nvPr/>
+        </p:nvSpPr>
+        <p:spPr>
+          <a:xfrm>
+            <a:off x="461160" y="6479280"/>
+            <a:ext cx="11130120" cy="720000"/>
+          </a:xfrm>
+          <a:prstGeom prst="rect">
+            <a:avLst/>
+          </a:prstGeom>
+          <a:noFill/>
+          <a:ln>
+            <a:noFill/>
+          </a:ln>
+        </p:spPr>
+        <p:style>
+          <a:lnRef idx="0">
+            <a:scrgbClr r="0" g="0" b="0"/>
+          </a:lnRef>
+          <a:fillRef idx="0">
+            <a:scrgbClr r="0" g="0" b="0"/>
+          </a:fillRef>
+          <a:effectRef idx="0">
+            <a:scrgbClr r="0" g="0" b="0"/>
+          </a:effectRef>
+          <a:fontRef idx="minor"/>
+        </p:style>
+        <p:txBody>
+          <a:bodyPr lIns="90000" tIns="45000" rIns="90000" bIns="45000"/>
+          <a:lstStyle/>
+          <a:p>
+            <a:pPr algn="ctr">
+              <a:lnSpc>
+                <a:spcPct val="100000"/>
+              </a:lnSpc>
+            </a:pPr>
+            <a:r>
+              <a:rPr lang="pt-BR" sz="1500" b="1" strike="noStrike" spc="-1">
+                <a:solidFill>
+                  <a:srgbClr val="8DC641"/>
+                </a:solidFill>
+                <a:latin typeface="Arial"/>
+                <a:ea typeface="Arial"/>
+              </a:rPr>
+              <a:t> Fabio Vasques, Gieder Loreto</a:t>
+            </a:r>
+            <a:endParaRPr lang="pt-BR" sz="1500" b="0" strike="noStrike" spc="-1">
+              <a:latin typeface="Arial"/>
+            </a:endParaRPr>
+          </a:p>
+        </p:txBody>
+      </p:sp>
+      <p:sp>
+        <p:nvSpPr>
+          <p:cNvPr id="122" name="CustomShape 3"/>
+          <p:cNvSpPr/>
+          <p:nvPr/>
+        </p:nvSpPr>
+        <p:spPr>
+          <a:xfrm>
+            <a:off x="4319999" y="1316880"/>
+            <a:ext cx="4004193" cy="1237134"/>
+          </a:xfrm>
+          <a:prstGeom prst="rect">
+            <a:avLst/>
+          </a:prstGeom>
+          <a:noFill/>
+          <a:ln>
+            <a:noFill/>
+          </a:ln>
+        </p:spPr>
+        <p:style>
+          <a:lnRef idx="0">
+            <a:scrgbClr r="0" g="0" b="0"/>
+          </a:lnRef>
+          <a:fillRef idx="0">
+            <a:scrgbClr r="0" g="0" b="0"/>
+          </a:fillRef>
+          <a:effectRef idx="0">
+            <a:scrgbClr r="0" g="0" b="0"/>
+          </a:effectRef>
+          <a:fontRef idx="minor"/>
+        </p:style>
+        <p:txBody>
+          <a:bodyPr lIns="90000" tIns="45000" rIns="90000" bIns="45000"/>
+          <a:lstStyle/>
+          <a:p>
+            <a:pPr algn="ctr">
+              <a:lnSpc>
+                <a:spcPct val="100000"/>
+              </a:lnSpc>
+            </a:pPr>
+            <a:endParaRPr lang="pt-BR" sz="1800" b="0" strike="noStrike" spc="-1" dirty="0">
+              <a:latin typeface="Arial"/>
+            </a:endParaRPr>
+          </a:p>
+          <a:p>
+            <a:pPr>
+              <a:lnSpc>
+                <a:spcPct val="100000"/>
+              </a:lnSpc>
+            </a:pPr>
+            <a:r>
+              <a:rPr lang="pt-BR" sz="2600" b="1" strike="noStrike" spc="-1" dirty="0">
+                <a:solidFill>
+                  <a:srgbClr val="8DC641"/>
+                </a:solidFill>
+                <a:latin typeface="Arial"/>
+                <a:ea typeface="Arial"/>
+              </a:rPr>
+              <a:t> Cronograma de </a:t>
+            </a:r>
+            <a:r>
+              <a:rPr lang="pt-BR" sz="2600" b="1" strike="noStrike" spc="-1" dirty="0" err="1">
+                <a:solidFill>
+                  <a:srgbClr val="8DC641"/>
+                </a:solidFill>
+                <a:latin typeface="Arial"/>
+                <a:ea typeface="Arial"/>
+              </a:rPr>
+              <a:t>Gantt</a:t>
+            </a:r>
+            <a:r>
+              <a:rPr lang="pt-BR" sz="2600" b="1" strike="noStrike" spc="-1" dirty="0">
+                <a:solidFill>
+                  <a:srgbClr val="8DC641"/>
+                </a:solidFill>
+                <a:latin typeface="Arial"/>
+                <a:ea typeface="Arial"/>
+              </a:rPr>
+              <a:t> </a:t>
+            </a:r>
+            <a:endParaRPr lang="pt-BR" sz="2600" b="0" strike="noStrike" spc="-1" dirty="0">
+              <a:latin typeface="Arial"/>
+            </a:endParaRPr>
+          </a:p>
+        </p:txBody>
+      </p:sp>
+      <p:pic>
+        <p:nvPicPr>
+          <p:cNvPr id="124" name="Google Shape;166;p39"/>
+          <p:cNvPicPr/>
+          <p:nvPr/>
+        </p:nvPicPr>
+        <p:blipFill>
+          <a:blip r:embed="rId3"/>
+          <a:stretch/>
+        </p:blipFill>
+        <p:spPr>
+          <a:xfrm>
+            <a:off x="235080" y="283680"/>
+            <a:ext cx="4000680" cy="1019520"/>
+          </a:xfrm>
+          <a:prstGeom prst="rect">
+            <a:avLst/>
+          </a:prstGeom>
+          <a:ln>
+            <a:noFill/>
+          </a:ln>
+        </p:spPr>
+      </p:pic>
+      <p:pic>
+        <p:nvPicPr>
+          <p:cNvPr id="3" name="Imagem 2">
+            <a:extLst>
+              <a:ext uri="{FF2B5EF4-FFF2-40B4-BE49-F238E27FC236}">
+                <a16:creationId xmlns:a16="http://schemas.microsoft.com/office/drawing/2014/main" id="{F9E6EB3A-2761-42AE-A9D6-AE4464A22E68}"/>
+              </a:ext>
+            </a:extLst>
+          </p:cNvPr>
+          <p:cNvPicPr>
+            <a:picLocks noChangeAspect="1"/>
+          </p:cNvPicPr>
+          <p:nvPr/>
+        </p:nvPicPr>
+        <p:blipFill>
+          <a:blip r:embed="rId4">
+            <a:extLst>
+              <a:ext uri="{28A0092B-C50C-407E-A947-70E740481C1C}">
+                <a14:useLocalDpi xmlns:a14="http://schemas.microsoft.com/office/drawing/2010/main" val="0"/>
+              </a:ext>
+            </a:extLst>
+          </a:blip>
+          <a:stretch>
+            <a:fillRect/>
+          </a:stretch>
+        </p:blipFill>
+        <p:spPr>
+          <a:xfrm>
+            <a:off x="2661627" y="2213202"/>
+            <a:ext cx="7587841" cy="4266078"/>
+          </a:xfrm>
+          <a:prstGeom prst="rect">
+            <a:avLst/>
+          </a:prstGeom>
+        </p:spPr>
+      </p:pic>
+    </p:spTree>
+    <p:extLst>
+      <p:ext uri="{BB962C8B-B14F-4D97-AF65-F5344CB8AC3E}">
+        <p14:creationId xmlns:p14="http://schemas.microsoft.com/office/powerpoint/2010/main" val="1631031712"/>
+      </p:ext>
+    </p:extLst>
   </p:cSld>
   <p:clrMapOvr>
     <a:masterClrMapping/>
@@ -2520,7 +2854,7 @@
         </p:nvSpPr>
         <p:spPr>
           <a:xfrm>
-            <a:off x="2296800" y="1982160"/>
+            <a:off x="2312820" y="1688963"/>
             <a:ext cx="7512480" cy="1322280"/>
           </a:xfrm>
           <a:prstGeom prst="rect">
@@ -2552,9 +2886,11 @@
                 <a:spcPct val="100000"/>
               </a:lnSpc>
             </a:pPr>
-            <a:br/>
+            <a:br>
+              <a:rPr dirty="0"/>
+            </a:br>
             <a:r>
-              <a:rPr lang="pt-BR" sz="3200" b="1" strike="noStrike" spc="-1">
+              <a:rPr lang="pt-BR" sz="3200" b="1" strike="noStrike" spc="-1" dirty="0">
                 <a:solidFill>
                   <a:srgbClr val="8DC641"/>
                 </a:solidFill>
@@ -2563,7 +2899,7 @@
               </a:rPr>
               <a:t>Prática  de análise de sistemas</a:t>
             </a:r>
-            <a:endParaRPr lang="pt-BR" sz="3200" b="0" strike="noStrike" spc="-1">
+            <a:endParaRPr lang="pt-BR" sz="3200" b="0" strike="noStrike" spc="-1" dirty="0">
               <a:latin typeface="Arial"/>
             </a:endParaRPr>
           </a:p>
@@ -2573,7 +2909,7 @@
                 <a:spcPct val="100000"/>
               </a:lnSpc>
             </a:pPr>
-            <a:endParaRPr lang="pt-BR" sz="3200" b="0" strike="noStrike" spc="-1">
+            <a:endParaRPr lang="pt-BR" sz="3200" b="0" strike="noStrike" spc="-1" dirty="0">
               <a:latin typeface="Arial"/>
             </a:endParaRPr>
           </a:p>
@@ -2643,7 +2979,7 @@
         </p:nvSpPr>
         <p:spPr>
           <a:xfrm>
-            <a:off x="3415320" y="2748600"/>
+            <a:off x="3623760" y="2355671"/>
             <a:ext cx="4890600" cy="828720"/>
           </a:xfrm>
           <a:prstGeom prst="rect">
@@ -2675,7 +3011,7 @@
                 <a:spcPct val="100000"/>
               </a:lnSpc>
             </a:pPr>
-            <a:endParaRPr lang="pt-BR" sz="1800" b="0" strike="noStrike" spc="-1">
+            <a:endParaRPr lang="pt-BR" sz="1800" b="0" strike="noStrike" spc="-1" dirty="0">
               <a:latin typeface="Arial"/>
             </a:endParaRPr>
           </a:p>
@@ -2686,7 +3022,7 @@
               </a:lnSpc>
             </a:pPr>
             <a:r>
-              <a:rPr lang="pt-BR" sz="2000" b="1" strike="noStrike" spc="-1">
+              <a:rPr lang="pt-BR" sz="2000" b="1" strike="noStrike" spc="-1" dirty="0">
                 <a:solidFill>
                   <a:srgbClr val="8DC641"/>
                 </a:solidFill>
@@ -2695,7 +3031,7 @@
               </a:rPr>
               <a:t>Processo (etapas de desenvolvimento)</a:t>
             </a:r>
-            <a:endParaRPr lang="pt-BR" sz="2000" b="0" strike="noStrike" spc="-1">
+            <a:endParaRPr lang="pt-BR" sz="2000" b="0" strike="noStrike" spc="-1" dirty="0">
               <a:latin typeface="Arial"/>
             </a:endParaRPr>
           </a:p>
@@ -2765,8 +3101,8 @@
         </p:nvSpPr>
         <p:spPr>
           <a:xfrm>
-            <a:off x="900000" y="3773880"/>
-            <a:ext cx="10186560" cy="1625400"/>
+            <a:off x="603503" y="3414554"/>
+            <a:ext cx="10984994" cy="2110726"/>
           </a:xfrm>
           <a:prstGeom prst="rect">
             <a:avLst/>
@@ -2798,16 +3134,23 @@
               </a:lnSpc>
             </a:pPr>
             <a:r>
-              <a:rPr lang="pt-BR" sz="1800" b="1" strike="noStrike" spc="-1">
+              <a:rPr lang="pt-BR" sz="1800" b="1" strike="noStrike" spc="-1" dirty="0">
                 <a:solidFill>
                   <a:srgbClr val="62A73B"/>
                 </a:solidFill>
                 <a:latin typeface="Arial"/>
                 <a:ea typeface="DejaVu Sans"/>
               </a:rPr>
-              <a:t>-Será feito o levantamento de requisitos e todas as necessidades que o sistema precisa ter.</a:t>
+              <a:t>- Será feito o levantamento de requisitos e todas as necessidades que o sistema precisa ter.</a:t>
             </a:r>
-            <a:endParaRPr lang="pt-BR" sz="1800" b="0" strike="noStrike" spc="-1">
+          </a:p>
+          <a:p>
+            <a:pPr algn="just">
+              <a:lnSpc>
+                <a:spcPct val="100000"/>
+              </a:lnSpc>
+            </a:pPr>
+            <a:endParaRPr lang="pt-BR" sz="1800" b="0" strike="noStrike" spc="-1" dirty="0">
               <a:latin typeface="Arial"/>
             </a:endParaRPr>
           </a:p>
@@ -2818,16 +3161,16 @@
               </a:lnSpc>
             </a:pPr>
             <a:r>
-              <a:rPr lang="pt-BR" sz="1800" b="1" strike="noStrike" spc="-1">
+              <a:rPr lang="pt-BR" sz="1800" b="1" strike="noStrike" spc="-1" dirty="0">
                 <a:solidFill>
                   <a:srgbClr val="62A73B"/>
                 </a:solidFill>
                 <a:latin typeface="Arial"/>
                 <a:ea typeface="DejaVu Sans"/>
               </a:rPr>
-              <a:t>-Depois iremos para a fase de planejamento onde definiremos as estimativas, cronograma e</a:t>
+              <a:t>- Depois iremos para a fase de planejamento onde definiremos as estimativas, cronograma e</a:t>
             </a:r>
-            <a:endParaRPr lang="pt-BR" sz="1800" b="0" strike="noStrike" spc="-1">
+            <a:endParaRPr lang="pt-BR" sz="1800" b="0" strike="noStrike" spc="-1" dirty="0">
               <a:latin typeface="Arial"/>
             </a:endParaRPr>
           </a:p>
@@ -2838,7 +3181,7 @@
               </a:lnSpc>
             </a:pPr>
             <a:r>
-              <a:rPr lang="pt-BR" sz="1800" b="1" strike="noStrike" spc="-1">
+              <a:rPr lang="pt-BR" sz="1800" b="1" strike="noStrike" spc="-1" dirty="0">
                 <a:solidFill>
                   <a:srgbClr val="62A73B"/>
                 </a:solidFill>
@@ -2847,7 +3190,14 @@
               </a:rPr>
               <a:t> o acompanhamento.</a:t>
             </a:r>
-            <a:endParaRPr lang="pt-BR" sz="1800" b="0" strike="noStrike" spc="-1">
+          </a:p>
+          <a:p>
+            <a:pPr algn="just">
+              <a:lnSpc>
+                <a:spcPct val="100000"/>
+              </a:lnSpc>
+            </a:pPr>
+            <a:endParaRPr lang="pt-BR" sz="1800" b="0" strike="noStrike" spc="-1" dirty="0">
               <a:latin typeface="Arial"/>
             </a:endParaRPr>
           </a:p>
@@ -2858,16 +3208,23 @@
               </a:lnSpc>
             </a:pPr>
             <a:r>
-              <a:rPr lang="pt-BR" sz="1800" b="1" strike="noStrike" spc="-1">
+              <a:rPr lang="pt-BR" sz="1800" b="1" strike="noStrike" spc="-1" dirty="0">
                 <a:solidFill>
                   <a:srgbClr val="62A73B"/>
                 </a:solidFill>
                 <a:latin typeface="Arial"/>
                 <a:ea typeface="DejaVu Sans"/>
               </a:rPr>
-              <a:t>-Após isso partiremos para a modelagem onde será feito a análise do projeto</a:t>
+              <a:t>- Após isso partiremos para a modelagem onde será feito a análise do projeto</a:t>
             </a:r>
-            <a:endParaRPr lang="pt-BR" sz="1800" b="0" strike="noStrike" spc="-1">
+          </a:p>
+          <a:p>
+            <a:pPr algn="just">
+              <a:lnSpc>
+                <a:spcPct val="100000"/>
+              </a:lnSpc>
+            </a:pPr>
+            <a:endParaRPr lang="pt-BR" spc="-1" dirty="0">
               <a:latin typeface="Arial"/>
             </a:endParaRPr>
           </a:p>
@@ -2878,16 +3235,23 @@
               </a:lnSpc>
             </a:pPr>
             <a:r>
-              <a:rPr lang="pt-BR" sz="1800" b="1" strike="noStrike" spc="-1">
+              <a:rPr lang="pt-BR" sz="1800" b="1" strike="noStrike" spc="-1" dirty="0">
                 <a:solidFill>
                   <a:srgbClr val="62A73B"/>
                 </a:solidFill>
                 <a:latin typeface="Arial"/>
                 <a:ea typeface="DejaVu Sans"/>
               </a:rPr>
-              <a:t>-Depois chegaremos a fase da codificação e testes.</a:t>
+              <a:t>- Depois chegaremos a fase da codificação e testes.</a:t>
             </a:r>
-            <a:endParaRPr lang="pt-BR" sz="1800" b="0" strike="noStrike" spc="-1">
+          </a:p>
+          <a:p>
+            <a:pPr algn="just">
+              <a:lnSpc>
+                <a:spcPct val="100000"/>
+              </a:lnSpc>
+            </a:pPr>
+            <a:endParaRPr lang="pt-BR" sz="1800" b="0" strike="noStrike" spc="-1" dirty="0">
               <a:latin typeface="Arial"/>
             </a:endParaRPr>
           </a:p>
@@ -2898,16 +3262,16 @@
               </a:lnSpc>
             </a:pPr>
             <a:r>
-              <a:rPr lang="pt-BR" sz="1800" b="1" strike="noStrike" spc="-1">
+              <a:rPr lang="pt-BR" sz="1800" b="1" strike="noStrike" spc="-1" dirty="0">
                 <a:solidFill>
                   <a:srgbClr val="62A73B"/>
                 </a:solidFill>
                 <a:latin typeface="Arial"/>
                 <a:ea typeface="DejaVu Sans"/>
               </a:rPr>
-              <a:t>-por ultimo a entrega do projeto final.</a:t>
+              <a:t>- Por ultimo a entrega do projeto final.</a:t>
             </a:r>
-            <a:endParaRPr lang="pt-BR" sz="1800" b="0" strike="noStrike" spc="-1">
+            <a:endParaRPr lang="pt-BR" sz="1800" b="0" strike="noStrike" spc="-1" dirty="0">
               <a:latin typeface="Arial"/>
             </a:endParaRPr>
           </a:p>
@@ -3371,7 +3735,7 @@
         </p:nvGrpSpPr>
         <p:grpSpPr>
           <a:xfrm>
-            <a:off x="1332000" y="3780000"/>
+            <a:off x="1349280" y="3916800"/>
             <a:ext cx="1223280" cy="755280"/>
             <a:chOff x="1332000" y="3780000"/>
             <a:chExt cx="1223280" cy="755280"/>
@@ -3602,7 +3966,7 @@
         </p:nvGrpSpPr>
         <p:grpSpPr>
           <a:xfrm>
-            <a:off x="3501720" y="3823560"/>
+            <a:off x="3529800" y="3913583"/>
             <a:ext cx="1223280" cy="755280"/>
             <a:chOff x="3501720" y="3823560"/>
             <a:chExt cx="1223280" cy="755280"/>
@@ -3853,10 +4217,10 @@
         </p:nvGrpSpPr>
         <p:grpSpPr>
           <a:xfrm>
-            <a:off x="5986080" y="3931920"/>
-            <a:ext cx="1223280" cy="755280"/>
-            <a:chOff x="5986080" y="3931920"/>
-            <a:chExt cx="1223280" cy="755280"/>
+            <a:off x="5971448" y="3901971"/>
+            <a:ext cx="1223280" cy="759669"/>
+            <a:chOff x="5986080" y="3927531"/>
+            <a:chExt cx="1223280" cy="759669"/>
           </a:xfrm>
         </p:grpSpPr>
         <p:sp>
@@ -3976,7 +4340,7 @@
           </p:nvSpPr>
           <p:spPr>
             <a:xfrm>
-              <a:off x="6094080" y="4133880"/>
+              <a:off x="6183000" y="3927531"/>
               <a:ext cx="919080" cy="515160"/>
             </a:xfrm>
             <a:prstGeom prst="rect">
@@ -4009,7 +4373,7 @@
                 </a:lnSpc>
               </a:pPr>
               <a:r>
-                <a:rPr lang="pt-BR" sz="1000" b="1" strike="noStrike" spc="-1">
+                <a:rPr lang="pt-BR" sz="1000" b="1" strike="noStrike" spc="-1" dirty="0">
                   <a:solidFill>
                     <a:srgbClr val="89C765"/>
                   </a:solidFill>
@@ -4018,7 +4382,7 @@
                 </a:rPr>
                 <a:t>-Modelagem</a:t>
               </a:r>
-              <a:endParaRPr lang="pt-BR" sz="1000" b="0" strike="noStrike" spc="-1">
+              <a:endParaRPr lang="pt-BR" sz="1000" b="0" strike="noStrike" spc="-1" dirty="0">
                 <a:latin typeface="Arial"/>
               </a:endParaRPr>
             </a:p>
@@ -4029,16 +4393,26 @@
                 </a:lnSpc>
               </a:pPr>
               <a:r>
-                <a:rPr lang="pt-BR" sz="1000" b="1" strike="noStrike" spc="-1">
+                <a:rPr lang="pt-BR" sz="1000" b="1" spc="-1" dirty="0">
                   <a:solidFill>
                     <a:srgbClr val="89C765"/>
                   </a:solidFill>
                   <a:latin typeface="Arial"/>
                   <a:ea typeface="DejaVu Sans"/>
                 </a:rPr>
-                <a:t>-Análise</a:t>
+                <a:t>E </a:t>
               </a:r>
-              <a:endParaRPr lang="pt-BR" sz="1000" b="0" strike="noStrike" spc="-1">
+              <a:r>
+                <a:rPr lang="pt-BR" sz="1000" b="1" strike="noStrike" spc="-1" dirty="0">
+                  <a:solidFill>
+                    <a:srgbClr val="89C765"/>
+                  </a:solidFill>
+                  <a:latin typeface="Arial"/>
+                  <a:ea typeface="DejaVu Sans"/>
+                </a:rPr>
+                <a:t>Análise</a:t>
+              </a:r>
+              <a:endParaRPr lang="pt-BR" sz="1000" b="0" strike="noStrike" spc="-1" dirty="0">
                 <a:latin typeface="Arial"/>
               </a:endParaRPr>
             </a:p>
@@ -4049,7 +4423,7 @@
                 </a:lnSpc>
               </a:pPr>
               <a:r>
-                <a:rPr lang="pt-BR" sz="1000" b="1" strike="noStrike" spc="-1">
+                <a:rPr lang="pt-BR" sz="1000" b="1" strike="noStrike" spc="-1" dirty="0">
                   <a:solidFill>
                     <a:srgbClr val="89C765"/>
                   </a:solidFill>
@@ -4058,7 +4432,7 @@
                 </a:rPr>
                 <a:t> do projeto</a:t>
               </a:r>
-              <a:endParaRPr lang="pt-BR" sz="1000" b="0" strike="noStrike" spc="-1">
+              <a:endParaRPr lang="pt-BR" sz="1000" b="0" strike="noStrike" spc="-1" dirty="0">
                 <a:latin typeface="Arial"/>
               </a:endParaRPr>
             </a:p>
@@ -4104,7 +4478,7 @@
         </p:nvGrpSpPr>
         <p:grpSpPr>
           <a:xfrm>
-            <a:off x="8434440" y="4040280"/>
+            <a:off x="8240688" y="3906360"/>
             <a:ext cx="1223280" cy="755280"/>
             <a:chOff x="8434440" y="4040280"/>
             <a:chExt cx="1223280" cy="755280"/>
@@ -4227,7 +4601,7 @@
           </p:nvSpPr>
           <p:spPr>
             <a:xfrm>
-              <a:off x="8542440" y="4242240"/>
+              <a:off x="8622906" y="4066020"/>
               <a:ext cx="940320" cy="373320"/>
             </a:xfrm>
             <a:prstGeom prst="rect">
@@ -4260,7 +4634,7 @@
                 </a:lnSpc>
               </a:pPr>
               <a:r>
-                <a:rPr lang="pt-BR" sz="1000" b="1" strike="noStrike" spc="-1">
+                <a:rPr lang="pt-BR" sz="1000" b="1" strike="noStrike" spc="-1" dirty="0">
                   <a:solidFill>
                     <a:srgbClr val="89C765"/>
                   </a:solidFill>
@@ -4269,7 +4643,7 @@
                 </a:rPr>
                 <a:t>-Codificação</a:t>
               </a:r>
-              <a:endParaRPr lang="pt-BR" sz="1000" b="0" strike="noStrike" spc="-1">
+              <a:endParaRPr lang="pt-BR" sz="1000" b="0" strike="noStrike" spc="-1" dirty="0">
                 <a:latin typeface="Arial"/>
               </a:endParaRPr>
             </a:p>
@@ -4280,7 +4654,7 @@
                 </a:lnSpc>
               </a:pPr>
               <a:r>
-                <a:rPr lang="pt-BR" sz="1000" b="1" strike="noStrike" spc="-1">
+                <a:rPr lang="pt-BR" sz="1000" b="1" strike="noStrike" spc="-1" dirty="0">
                   <a:solidFill>
                     <a:srgbClr val="89C765"/>
                   </a:solidFill>
@@ -4289,7 +4663,7 @@
                 </a:rPr>
                 <a:t>e testes</a:t>
               </a:r>
-              <a:endParaRPr lang="pt-BR" sz="1000" b="0" strike="noStrike" spc="-1">
+              <a:endParaRPr lang="pt-BR" sz="1000" b="0" strike="noStrike" spc="-1" dirty="0">
                 <a:latin typeface="Arial"/>
               </a:endParaRPr>
             </a:p>
@@ -4335,10 +4709,10 @@
         </p:nvGrpSpPr>
         <p:grpSpPr>
           <a:xfrm>
-            <a:off x="10738800" y="4220640"/>
-            <a:ext cx="1223280" cy="858960"/>
+            <a:off x="10435248" y="3849683"/>
+            <a:ext cx="1223280" cy="807120"/>
             <a:chOff x="10738800" y="4220640"/>
-            <a:chExt cx="1223280" cy="858960"/>
+            <a:chExt cx="1223280" cy="807120"/>
           </a:xfrm>
         </p:grpSpPr>
         <p:sp>
@@ -4458,7 +4832,7 @@
           </p:nvSpPr>
           <p:spPr>
             <a:xfrm>
-              <a:off x="10846800" y="4422600"/>
+              <a:off x="10967899" y="4370760"/>
               <a:ext cx="835200" cy="657000"/>
             </a:xfrm>
             <a:prstGeom prst="rect">
@@ -4491,7 +4865,7 @@
                 </a:lnSpc>
               </a:pPr>
               <a:r>
-                <a:rPr lang="pt-BR" sz="1000" b="1" strike="noStrike" spc="-1">
+                <a:rPr lang="pt-BR" sz="1000" b="1" strike="noStrike" spc="-1" dirty="0">
                   <a:solidFill>
                     <a:srgbClr val="89C765"/>
                   </a:solidFill>
@@ -4500,7 +4874,7 @@
                 </a:rPr>
                 <a:t>-Entrega </a:t>
               </a:r>
-              <a:endParaRPr lang="pt-BR" sz="1000" b="0" strike="noStrike" spc="-1">
+              <a:endParaRPr lang="pt-BR" sz="1000" b="0" strike="noStrike" spc="-1" dirty="0">
                 <a:latin typeface="Arial"/>
               </a:endParaRPr>
             </a:p>
@@ -4511,7 +4885,7 @@
                 </a:lnSpc>
               </a:pPr>
               <a:r>
-                <a:rPr lang="pt-BR" sz="1000" b="1" strike="noStrike" spc="-1">
+                <a:rPr lang="pt-BR" sz="1000" b="1" strike="noStrike" spc="-1" dirty="0">
                   <a:solidFill>
                     <a:srgbClr val="89C765"/>
                   </a:solidFill>
@@ -4520,7 +4894,7 @@
                 </a:rPr>
                 <a:t>do projeto </a:t>
               </a:r>
-              <a:endParaRPr lang="pt-BR" sz="1000" b="0" strike="noStrike" spc="-1">
+              <a:endParaRPr lang="pt-BR" sz="1000" b="0" strike="noStrike" spc="-1" dirty="0">
                 <a:latin typeface="Arial"/>
               </a:endParaRPr>
             </a:p>
@@ -4531,7 +4905,7 @@
                 </a:lnSpc>
               </a:pPr>
               <a:r>
-                <a:rPr lang="pt-BR" sz="1000" b="1" strike="noStrike" spc="-1">
+                <a:rPr lang="pt-BR" sz="1000" b="1" strike="noStrike" spc="-1" dirty="0">
                   <a:solidFill>
                     <a:srgbClr val="89C765"/>
                   </a:solidFill>
@@ -4540,7 +4914,7 @@
                 </a:rPr>
                 <a:t>Final</a:t>
               </a:r>
-              <a:endParaRPr lang="pt-BR" sz="1000" b="0" strike="noStrike" spc="-1">
+              <a:endParaRPr lang="pt-BR" sz="1000" b="0" strike="noStrike" spc="-1" dirty="0">
                 <a:latin typeface="Arial"/>
               </a:endParaRPr>
             </a:p>
@@ -4550,7 +4924,7 @@
                   <a:spcPct val="100000"/>
                 </a:lnSpc>
               </a:pPr>
-              <a:endParaRPr lang="pt-BR" sz="1000" b="0" strike="noStrike" spc="-1">
+              <a:endParaRPr lang="pt-BR" sz="1000" b="0" strike="noStrike" spc="-1" dirty="0">
                 <a:latin typeface="Arial"/>
               </a:endParaRPr>
             </a:p>
@@ -4564,9 +4938,9 @@
           <p:nvPr/>
         </p:nvSpPr>
         <p:spPr>
-          <a:xfrm>
-            <a:off x="108000" y="3960000"/>
-            <a:ext cx="1224000" cy="0"/>
+          <a:xfrm flipV="1">
+            <a:off x="290000" y="4305420"/>
+            <a:ext cx="1059280" cy="17028"/>
           </a:xfrm>
           <a:prstGeom prst="line">
             <a:avLst/>
@@ -4599,7 +4973,7 @@
         </p:nvSpPr>
         <p:spPr>
           <a:xfrm>
-            <a:off x="2592000" y="4104000"/>
+            <a:off x="2593800" y="4326049"/>
             <a:ext cx="936000" cy="0"/>
           </a:xfrm>
           <a:prstGeom prst="line">
@@ -4667,8 +5041,8 @@
         </p:nvSpPr>
         <p:spPr>
           <a:xfrm>
-            <a:off x="7236000" y="4428000"/>
-            <a:ext cx="1224000" cy="0"/>
+            <a:off x="7194728" y="4284000"/>
+            <a:ext cx="1045301" cy="0"/>
           </a:xfrm>
           <a:prstGeom prst="line">
             <a:avLst/>
@@ -4700,9 +5074,9 @@
           <p:nvPr/>
         </p:nvSpPr>
         <p:spPr>
-          <a:xfrm>
-            <a:off x="9684000" y="4608000"/>
-            <a:ext cx="1044000" cy="0"/>
+          <a:xfrm flipV="1">
+            <a:off x="9463968" y="4271940"/>
+            <a:ext cx="971280" cy="12060"/>
           </a:xfrm>
           <a:prstGeom prst="line">
             <a:avLst/>
@@ -4875,7 +5249,7 @@
         </p:nvSpPr>
         <p:spPr>
           <a:xfrm>
-            <a:off x="2304000" y="2205000"/>
+            <a:off x="2502000" y="1404697"/>
             <a:ext cx="7512480" cy="1034280"/>
           </a:xfrm>
           <a:prstGeom prst="rect">
@@ -4907,9 +5281,11 @@
                 <a:spcPct val="100000"/>
               </a:lnSpc>
             </a:pPr>
-            <a:br/>
+            <a:br>
+              <a:rPr dirty="0"/>
+            </a:br>
             <a:r>
-              <a:rPr lang="pt-BR" sz="3200" b="1" strike="noStrike" spc="-1">
+              <a:rPr lang="pt-BR" sz="3200" b="1" strike="noStrike" spc="-1" dirty="0">
                 <a:solidFill>
                   <a:srgbClr val="8DC641"/>
                 </a:solidFill>
@@ -4918,7 +5294,7 @@
               </a:rPr>
               <a:t>Prática  de análise de sistemas</a:t>
             </a:r>
-            <a:endParaRPr lang="pt-BR" sz="3200" b="0" strike="noStrike" spc="-1">
+            <a:endParaRPr lang="pt-BR" sz="3200" b="0" strike="noStrike" spc="-1" dirty="0">
               <a:latin typeface="Arial"/>
             </a:endParaRPr>
           </a:p>
@@ -4928,7 +5304,7 @@
                 <a:spcPct val="100000"/>
               </a:lnSpc>
             </a:pPr>
-            <a:endParaRPr lang="pt-BR" sz="3200" b="0" strike="noStrike" spc="-1">
+            <a:endParaRPr lang="pt-BR" sz="3200" b="0" strike="noStrike" spc="-1" dirty="0">
               <a:latin typeface="Arial"/>
             </a:endParaRPr>
           </a:p>
@@ -4938,7 +5314,7 @@
                 <a:spcPct val="100000"/>
               </a:lnSpc>
             </a:pPr>
-            <a:endParaRPr lang="pt-BR" sz="3200" b="0" strike="noStrike" spc="-1">
+            <a:endParaRPr lang="pt-BR" sz="3200" b="0" strike="noStrike" spc="-1" dirty="0">
               <a:latin typeface="Arial"/>
             </a:endParaRPr>
           </a:p>
@@ -5002,14 +5378,14 @@
       </p:sp>
       <p:sp>
         <p:nvSpPr>
-          <p:cNvPr id="95" name="CustomShape 4"/>
+          <p:cNvPr id="96" name="CustomShape 5"/>
           <p:cNvSpPr/>
           <p:nvPr/>
         </p:nvSpPr>
         <p:spPr>
           <a:xfrm>
-            <a:off x="2520000" y="3975840"/>
-            <a:ext cx="7991280" cy="1279440"/>
+            <a:off x="3246329" y="2169252"/>
+            <a:ext cx="5788440" cy="458640"/>
           </a:xfrm>
           <a:prstGeom prst="rect">
             <a:avLst/>
@@ -5032,7 +5408,7 @@
           <a:fontRef idx="minor"/>
         </p:style>
         <p:txBody>
-          <a:bodyPr lIns="0" tIns="0" rIns="0" bIns="0"/>
+          <a:bodyPr lIns="90000" tIns="45000" rIns="90000" bIns="45000"/>
           <a:lstStyle/>
           <a:p>
             <a:pPr>
@@ -5041,123 +5417,7 @@
               </a:lnSpc>
             </a:pPr>
             <a:r>
-              <a:rPr lang="pt-BR" sz="1800" b="1" strike="noStrike" spc="-1">
-                <a:solidFill>
-                  <a:srgbClr val="8DC641"/>
-                </a:solidFill>
-                <a:latin typeface="Arial"/>
-                <a:ea typeface="DejaVu Sans"/>
-              </a:rPr>
-              <a:t>Front End : Bootstrap 4, Jquery, git, </a:t>
-            </a:r>
-            <a:r>
-              <a:rPr lang="pt-BR" sz="1800" b="1" strike="noStrike" spc="-1">
-                <a:solidFill>
-                  <a:srgbClr val="8DC641"/>
-                </a:solidFill>
-                <a:latin typeface="Arial"/>
-                <a:ea typeface="Arial"/>
-              </a:rPr>
-              <a:t>Sublime text/ vscode,html5, css3, JavaScript, trello</a:t>
-            </a:r>
-            <a:endParaRPr lang="pt-BR" sz="1800" b="0" strike="noStrike" spc="-1">
-              <a:latin typeface="Arial"/>
-            </a:endParaRPr>
-          </a:p>
-          <a:p>
-            <a:pPr>
-              <a:lnSpc>
-                <a:spcPct val="100000"/>
-              </a:lnSpc>
-            </a:pPr>
-            <a:endParaRPr lang="pt-BR" sz="1800" b="0" strike="noStrike" spc="-1">
-              <a:latin typeface="Arial"/>
-            </a:endParaRPr>
-          </a:p>
-          <a:p>
-            <a:pPr>
-              <a:lnSpc>
-                <a:spcPct val="100000"/>
-              </a:lnSpc>
-            </a:pPr>
-            <a:r>
-              <a:rPr lang="pt-BR" sz="1800" b="1" strike="noStrike" spc="-1">
-                <a:solidFill>
-                  <a:srgbClr val="8DC641"/>
-                </a:solidFill>
-                <a:latin typeface="Arial"/>
-                <a:ea typeface="DejaVu Sans"/>
-              </a:rPr>
-              <a:t>Back End: PHP, MYSQL, mysql workbench</a:t>
-            </a:r>
-            <a:endParaRPr lang="pt-BR" sz="1800" b="0" strike="noStrike" spc="-1">
-              <a:latin typeface="Arial"/>
-            </a:endParaRPr>
-          </a:p>
-          <a:p>
-            <a:pPr>
-              <a:lnSpc>
-                <a:spcPct val="100000"/>
-              </a:lnSpc>
-            </a:pPr>
-            <a:endParaRPr lang="pt-BR" sz="1800" b="0" strike="noStrike" spc="-1">
-              <a:latin typeface="Arial"/>
-            </a:endParaRPr>
-          </a:p>
-          <a:p>
-            <a:pPr>
-              <a:lnSpc>
-                <a:spcPct val="100000"/>
-              </a:lnSpc>
-            </a:pPr>
-            <a:endParaRPr lang="pt-BR" sz="1800" b="0" strike="noStrike" spc="-1">
-              <a:latin typeface="Arial"/>
-            </a:endParaRPr>
-          </a:p>
-        </p:txBody>
-      </p:sp>
-      <p:sp>
-        <p:nvSpPr>
-          <p:cNvPr id="96" name="CustomShape 5"/>
-          <p:cNvSpPr/>
-          <p:nvPr/>
-        </p:nvSpPr>
-        <p:spPr>
-          <a:xfrm>
-            <a:off x="3168000" y="3140640"/>
-            <a:ext cx="5788440" cy="458640"/>
-          </a:xfrm>
-          <a:prstGeom prst="rect">
-            <a:avLst/>
-          </a:prstGeom>
-          <a:noFill/>
-          <a:ln>
-            <a:noFill/>
-          </a:ln>
-        </p:spPr>
-        <p:style>
-          <a:lnRef idx="0">
-            <a:scrgbClr r="0" g="0" b="0"/>
-          </a:lnRef>
-          <a:fillRef idx="0">
-            <a:scrgbClr r="0" g="0" b="0"/>
-          </a:fillRef>
-          <a:effectRef idx="0">
-            <a:scrgbClr r="0" g="0" b="0"/>
-          </a:effectRef>
-          <a:fontRef idx="minor"/>
-        </p:style>
-        <p:txBody>
-          <a:bodyPr lIns="90000" tIns="45000" rIns="90000" bIns="45000"/>
-          <a:lstStyle/>
-          <a:p>
-            <a:pPr>
-              <a:lnSpc>
-                <a:spcPct val="100000"/>
-              </a:lnSpc>
-            </a:pPr>
-            <a:r>
-              <a:rPr lang="pt-BR" sz="2600" b="1" strike="noStrike" spc="-1">
+              <a:rPr lang="pt-BR" sz="2600" b="1" strike="noStrike" spc="-1" dirty="0">
                 <a:solidFill>
                   <a:srgbClr val="8DC641"/>
                 </a:solidFill>
@@ -5166,7 +5426,7 @@
               </a:rPr>
               <a:t> Tecnologias envolvidas nas etapas</a:t>
             </a:r>
-            <a:endParaRPr lang="pt-BR" sz="2600" b="0" strike="noStrike" spc="-1">
+            <a:endParaRPr lang="pt-BR" sz="2600" b="0" strike="noStrike" spc="-1" dirty="0">
               <a:latin typeface="Arial"/>
             </a:endParaRPr>
           </a:p>
@@ -5193,6 +5453,258 @@
           <a:ln>
             <a:noFill/>
           </a:ln>
+        </p:spPr>
+      </p:pic>
+      <p:pic>
+        <p:nvPicPr>
+          <p:cNvPr id="7" name="Imagem 6">
+            <a:extLst>
+              <a:ext uri="{FF2B5EF4-FFF2-40B4-BE49-F238E27FC236}">
+                <a16:creationId xmlns:a16="http://schemas.microsoft.com/office/drawing/2014/main" id="{68E3B549-F3A1-4AF6-9266-1595C0A8FB10}"/>
+              </a:ext>
+            </a:extLst>
+          </p:cNvPr>
+          <p:cNvPicPr>
+            <a:picLocks noChangeAspect="1"/>
+          </p:cNvPicPr>
+          <p:nvPr/>
+        </p:nvPicPr>
+        <p:blipFill>
+          <a:blip r:embed="rId4">
+            <a:extLst>
+              <a:ext uri="{28A0092B-C50C-407E-A947-70E740481C1C}">
+                <a14:useLocalDpi xmlns:a14="http://schemas.microsoft.com/office/drawing/2010/main" val="0"/>
+              </a:ext>
+            </a:extLst>
+          </a:blip>
+          <a:stretch>
+            <a:fillRect/>
+          </a:stretch>
+        </p:blipFill>
+        <p:spPr>
+          <a:xfrm>
+            <a:off x="5127732" y="4505884"/>
+            <a:ext cx="1894838" cy="947419"/>
+          </a:xfrm>
+          <a:prstGeom prst="rect">
+            <a:avLst/>
+          </a:prstGeom>
+        </p:spPr>
+      </p:pic>
+      <p:pic>
+        <p:nvPicPr>
+          <p:cNvPr id="9" name="Imagem 8">
+            <a:extLst>
+              <a:ext uri="{FF2B5EF4-FFF2-40B4-BE49-F238E27FC236}">
+                <a16:creationId xmlns:a16="http://schemas.microsoft.com/office/drawing/2014/main" id="{94D28981-6D35-4EB8-BFB8-AEA245FC4062}"/>
+              </a:ext>
+            </a:extLst>
+          </p:cNvPr>
+          <p:cNvPicPr>
+            <a:picLocks noChangeAspect="1"/>
+          </p:cNvPicPr>
+          <p:nvPr/>
+        </p:nvPicPr>
+        <p:blipFill>
+          <a:blip r:embed="rId5">
+            <a:extLst>
+              <a:ext uri="{28A0092B-C50C-407E-A947-70E740481C1C}">
+                <a14:useLocalDpi xmlns:a14="http://schemas.microsoft.com/office/drawing/2010/main" val="0"/>
+              </a:ext>
+            </a:extLst>
+          </a:blip>
+          <a:stretch>
+            <a:fillRect/>
+          </a:stretch>
+        </p:blipFill>
+        <p:spPr>
+          <a:xfrm>
+            <a:off x="8011254" y="4467546"/>
+            <a:ext cx="926792" cy="926792"/>
+          </a:xfrm>
+          <a:prstGeom prst="rect">
+            <a:avLst/>
+          </a:prstGeom>
+        </p:spPr>
+      </p:pic>
+      <p:pic>
+        <p:nvPicPr>
+          <p:cNvPr id="11" name="Imagem 10">
+            <a:extLst>
+              <a:ext uri="{FF2B5EF4-FFF2-40B4-BE49-F238E27FC236}">
+                <a16:creationId xmlns:a16="http://schemas.microsoft.com/office/drawing/2014/main" id="{1F15C987-1575-4CB2-8E8B-1EF1A0DD4A93}"/>
+              </a:ext>
+            </a:extLst>
+          </p:cNvPr>
+          <p:cNvPicPr>
+            <a:picLocks noChangeAspect="1"/>
+          </p:cNvPicPr>
+          <p:nvPr/>
+        </p:nvPicPr>
+        <p:blipFill>
+          <a:blip r:embed="rId6">
+            <a:extLst>
+              <a:ext uri="{28A0092B-C50C-407E-A947-70E740481C1C}">
+                <a14:useLocalDpi xmlns:a14="http://schemas.microsoft.com/office/drawing/2010/main" val="0"/>
+              </a:ext>
+            </a:extLst>
+          </a:blip>
+          <a:stretch>
+            <a:fillRect/>
+          </a:stretch>
+        </p:blipFill>
+        <p:spPr>
+          <a:xfrm>
+            <a:off x="1092398" y="5400566"/>
+            <a:ext cx="1496987" cy="838313"/>
+          </a:xfrm>
+          <a:prstGeom prst="rect">
+            <a:avLst/>
+          </a:prstGeom>
+        </p:spPr>
+      </p:pic>
+      <p:pic>
+        <p:nvPicPr>
+          <p:cNvPr id="13" name="Imagem 12">
+            <a:extLst>
+              <a:ext uri="{FF2B5EF4-FFF2-40B4-BE49-F238E27FC236}">
+                <a16:creationId xmlns:a16="http://schemas.microsoft.com/office/drawing/2014/main" id="{AEC8479C-26DC-4FE7-9481-E27FA42E111C}"/>
+              </a:ext>
+            </a:extLst>
+          </p:cNvPr>
+          <p:cNvPicPr>
+            <a:picLocks noChangeAspect="1"/>
+          </p:cNvPicPr>
+          <p:nvPr/>
+        </p:nvPicPr>
+        <p:blipFill>
+          <a:blip r:embed="rId7">
+            <a:extLst>
+              <a:ext uri="{28A0092B-C50C-407E-A947-70E740481C1C}">
+                <a14:useLocalDpi xmlns:a14="http://schemas.microsoft.com/office/drawing/2010/main" val="0"/>
+              </a:ext>
+            </a:extLst>
+          </a:blip>
+          <a:stretch>
+            <a:fillRect/>
+          </a:stretch>
+        </p:blipFill>
+        <p:spPr>
+          <a:xfrm>
+            <a:off x="2274087" y="4038360"/>
+            <a:ext cx="2619375" cy="1743075"/>
+          </a:xfrm>
+          <a:prstGeom prst="rect">
+            <a:avLst/>
+          </a:prstGeom>
+        </p:spPr>
+      </p:pic>
+      <p:pic>
+        <p:nvPicPr>
+          <p:cNvPr id="15" name="Imagem 14">
+            <a:extLst>
+              <a:ext uri="{FF2B5EF4-FFF2-40B4-BE49-F238E27FC236}">
+                <a16:creationId xmlns:a16="http://schemas.microsoft.com/office/drawing/2014/main" id="{69506CAF-B0AA-4273-8291-8AF131A995D8}"/>
+              </a:ext>
+            </a:extLst>
+          </p:cNvPr>
+          <p:cNvPicPr>
+            <a:picLocks noChangeAspect="1"/>
+          </p:cNvPicPr>
+          <p:nvPr/>
+        </p:nvPicPr>
+        <p:blipFill>
+          <a:blip r:embed="rId8">
+            <a:extLst>
+              <a:ext uri="{28A0092B-C50C-407E-A947-70E740481C1C}">
+                <a14:useLocalDpi xmlns:a14="http://schemas.microsoft.com/office/drawing/2010/main" val="0"/>
+              </a:ext>
+            </a:extLst>
+          </a:blip>
+          <a:stretch>
+            <a:fillRect/>
+          </a:stretch>
+        </p:blipFill>
+        <p:spPr>
+          <a:xfrm>
+            <a:off x="5127732" y="5721511"/>
+            <a:ext cx="2693793" cy="720000"/>
+          </a:xfrm>
+          <a:prstGeom prst="rect">
+            <a:avLst/>
+          </a:prstGeom>
+        </p:spPr>
+      </p:pic>
+      <p:pic>
+        <p:nvPicPr>
+          <p:cNvPr id="17" name="Imagem 16">
+            <a:extLst>
+              <a:ext uri="{FF2B5EF4-FFF2-40B4-BE49-F238E27FC236}">
+                <a16:creationId xmlns:a16="http://schemas.microsoft.com/office/drawing/2014/main" id="{EF129ECB-ED4D-403B-AD78-DA07282A0882}"/>
+              </a:ext>
+            </a:extLst>
+          </p:cNvPr>
+          <p:cNvPicPr>
+            <a:picLocks noChangeAspect="1"/>
+          </p:cNvPicPr>
+          <p:nvPr/>
+        </p:nvPicPr>
+        <p:blipFill>
+          <a:blip r:embed="rId9">
+            <a:extLst>
+              <a:ext uri="{28A0092B-C50C-407E-A947-70E740481C1C}">
+                <a14:useLocalDpi xmlns:a14="http://schemas.microsoft.com/office/drawing/2010/main" val="0"/>
+              </a:ext>
+            </a:extLst>
+          </a:blip>
+          <a:stretch>
+            <a:fillRect/>
+          </a:stretch>
+        </p:blipFill>
+        <p:spPr>
+          <a:xfrm>
+            <a:off x="8938046" y="5453303"/>
+            <a:ext cx="1773710" cy="1102111"/>
+          </a:xfrm>
+          <a:prstGeom prst="rect">
+            <a:avLst/>
+          </a:prstGeom>
+        </p:spPr>
+      </p:pic>
+      <p:pic>
+        <p:nvPicPr>
+          <p:cNvPr id="19" name="Imagem 18">
+            <a:extLst>
+              <a:ext uri="{FF2B5EF4-FFF2-40B4-BE49-F238E27FC236}">
+                <a16:creationId xmlns:a16="http://schemas.microsoft.com/office/drawing/2014/main" id="{185F81A6-AF70-45B7-A148-C7B434F77556}"/>
+              </a:ext>
+            </a:extLst>
+          </p:cNvPr>
+          <p:cNvPicPr>
+            <a:picLocks noChangeAspect="1"/>
+          </p:cNvPicPr>
+          <p:nvPr/>
+        </p:nvPicPr>
+        <p:blipFill>
+          <a:blip r:embed="rId10">
+            <a:extLst>
+              <a:ext uri="{28A0092B-C50C-407E-A947-70E740481C1C}">
+                <a14:useLocalDpi xmlns:a14="http://schemas.microsoft.com/office/drawing/2010/main" val="0"/>
+              </a:ext>
+            </a:extLst>
+          </a:blip>
+          <a:stretch>
+            <a:fillRect/>
+          </a:stretch>
+        </p:blipFill>
+        <p:spPr>
+          <a:xfrm>
+            <a:off x="3437928" y="2800506"/>
+            <a:ext cx="5095897" cy="1446825"/>
+          </a:xfrm>
+          <a:prstGeom prst="rect">
+            <a:avLst/>
+          </a:prstGeom>
         </p:spPr>
       </p:pic>
     </p:spTree>
@@ -5257,7 +5769,7 @@
       </p:grpSpPr>
       <p:sp>
         <p:nvSpPr>
-          <p:cNvPr id="98" name="CustomShape 1"/>
+          <p:cNvPr id="91" name="CustomShape 1"/>
           <p:cNvSpPr/>
           <p:nvPr/>
         </p:nvSpPr>
@@ -5291,7 +5803,7 @@
       </p:sp>
       <p:pic>
         <p:nvPicPr>
-          <p:cNvPr id="99" name="Google Shape;89;p13"/>
+          <p:cNvPr id="92" name="Google Shape;89;p13"/>
           <p:cNvPicPr/>
           <p:nvPr/>
         </p:nvPicPr>
@@ -5314,13 +5826,13 @@
       </p:pic>
       <p:sp>
         <p:nvSpPr>
-          <p:cNvPr id="100" name="CustomShape 2"/>
+          <p:cNvPr id="93" name="CustomShape 2"/>
           <p:cNvSpPr/>
           <p:nvPr/>
         </p:nvSpPr>
         <p:spPr>
           <a:xfrm>
-            <a:off x="2304000" y="2205000"/>
+            <a:off x="2502000" y="1776239"/>
             <a:ext cx="7512480" cy="1034280"/>
           </a:xfrm>
           <a:prstGeom prst="rect">
@@ -5352,9 +5864,11 @@
                 <a:spcPct val="100000"/>
               </a:lnSpc>
             </a:pPr>
-            <a:br/>
+            <a:br>
+              <a:rPr dirty="0"/>
+            </a:br>
             <a:r>
-              <a:rPr lang="pt-BR" sz="3200" b="1" strike="noStrike" spc="-1">
+              <a:rPr lang="pt-BR" sz="3200" b="1" strike="noStrike" spc="-1" dirty="0">
                 <a:solidFill>
                   <a:srgbClr val="8DC641"/>
                 </a:solidFill>
@@ -5363,7 +5877,7 @@
               </a:rPr>
               <a:t>Prática  de análise de sistemas</a:t>
             </a:r>
-            <a:endParaRPr lang="pt-BR" sz="3200" b="0" strike="noStrike" spc="-1">
+            <a:endParaRPr lang="pt-BR" sz="3200" b="0" strike="noStrike" spc="-1" dirty="0">
               <a:latin typeface="Arial"/>
             </a:endParaRPr>
           </a:p>
@@ -5373,7 +5887,7 @@
                 <a:spcPct val="100000"/>
               </a:lnSpc>
             </a:pPr>
-            <a:endParaRPr lang="pt-BR" sz="3200" b="0" strike="noStrike" spc="-1">
+            <a:endParaRPr lang="pt-BR" sz="3200" b="0" strike="noStrike" spc="-1" dirty="0">
               <a:latin typeface="Arial"/>
             </a:endParaRPr>
           </a:p>
@@ -5383,7 +5897,7 @@
                 <a:spcPct val="100000"/>
               </a:lnSpc>
             </a:pPr>
-            <a:endParaRPr lang="pt-BR" sz="3200" b="0" strike="noStrike" spc="-1">
+            <a:endParaRPr lang="pt-BR" sz="3200" b="0" strike="noStrike" spc="-1" dirty="0">
               <a:latin typeface="Arial"/>
             </a:endParaRPr>
           </a:p>
@@ -5391,7 +5905,7 @@
       </p:sp>
       <p:sp>
         <p:nvSpPr>
-          <p:cNvPr id="101" name="CustomShape 3"/>
+          <p:cNvPr id="94" name="CustomShape 3"/>
           <p:cNvSpPr/>
           <p:nvPr/>
         </p:nvSpPr>
@@ -5447,14 +5961,14 @@
       </p:sp>
       <p:sp>
         <p:nvSpPr>
-          <p:cNvPr id="102" name="CustomShape 4"/>
+          <p:cNvPr id="96" name="CustomShape 5"/>
           <p:cNvSpPr/>
           <p:nvPr/>
         </p:nvSpPr>
         <p:spPr>
           <a:xfrm>
-            <a:off x="2520000" y="3975840"/>
-            <a:ext cx="7991280" cy="1279440"/>
+            <a:off x="3364020" y="2675880"/>
+            <a:ext cx="5788440" cy="458640"/>
           </a:xfrm>
           <a:prstGeom prst="rect">
             <a:avLst/>
@@ -5477,7 +5991,7 @@
           <a:fontRef idx="minor"/>
         </p:style>
         <p:txBody>
-          <a:bodyPr lIns="0" tIns="0" rIns="0" bIns="0"/>
+          <a:bodyPr lIns="90000" tIns="45000" rIns="90000" bIns="45000"/>
           <a:lstStyle/>
           <a:p>
             <a:pPr>
@@ -5486,83 +6000,7 @@
               </a:lnSpc>
             </a:pPr>
             <a:r>
-              <a:rPr lang="pt-BR" sz="1800" b="1" strike="noStrike" spc="-1">
-                <a:solidFill>
-                  <a:srgbClr val="8DC641"/>
-                </a:solidFill>
-                <a:latin typeface="Arial"/>
-                <a:ea typeface="DejaVu Sans"/>
-              </a:rPr>
-              <a:t>Será usado técnicas de normalização de dados para evitarmos redundância dos dados no banco.</a:t>
-            </a:r>
-            <a:endParaRPr lang="pt-BR" sz="1800" b="0" strike="noStrike" spc="-1">
-              <a:latin typeface="Arial"/>
-            </a:endParaRPr>
-          </a:p>
-          <a:p>
-            <a:pPr>
-              <a:lnSpc>
-                <a:spcPct val="100000"/>
-              </a:lnSpc>
-            </a:pPr>
-            <a:endParaRPr lang="pt-BR" sz="1800" b="0" strike="noStrike" spc="-1">
-              <a:latin typeface="Arial"/>
-            </a:endParaRPr>
-          </a:p>
-          <a:p>
-            <a:pPr>
-              <a:lnSpc>
-                <a:spcPct val="100000"/>
-              </a:lnSpc>
-            </a:pPr>
-            <a:endParaRPr lang="pt-BR" sz="1800" b="0" strike="noStrike" spc="-1">
-              <a:latin typeface="Arial"/>
-            </a:endParaRPr>
-          </a:p>
-        </p:txBody>
-      </p:sp>
-      <p:sp>
-        <p:nvSpPr>
-          <p:cNvPr id="103" name="CustomShape 5"/>
-          <p:cNvSpPr/>
-          <p:nvPr/>
-        </p:nvSpPr>
-        <p:spPr>
-          <a:xfrm>
-            <a:off x="3168000" y="3140640"/>
-            <a:ext cx="5788440" cy="458640"/>
-          </a:xfrm>
-          <a:prstGeom prst="rect">
-            <a:avLst/>
-          </a:prstGeom>
-          <a:noFill/>
-          <a:ln>
-            <a:noFill/>
-          </a:ln>
-        </p:spPr>
-        <p:style>
-          <a:lnRef idx="0">
-            <a:scrgbClr r="0" g="0" b="0"/>
-          </a:lnRef>
-          <a:fillRef idx="0">
-            <a:scrgbClr r="0" g="0" b="0"/>
-          </a:fillRef>
-          <a:effectRef idx="0">
-            <a:scrgbClr r="0" g="0" b="0"/>
-          </a:effectRef>
-          <a:fontRef idx="minor"/>
-        </p:style>
-        <p:txBody>
-          <a:bodyPr lIns="90000" tIns="45000" rIns="90000" bIns="45000"/>
-          <a:lstStyle/>
-          <a:p>
-            <a:pPr>
-              <a:lnSpc>
-                <a:spcPct val="100000"/>
-              </a:lnSpc>
-            </a:pPr>
-            <a:r>
-              <a:rPr lang="pt-BR" sz="2600" b="1" strike="noStrike" spc="-1">
+              <a:rPr lang="pt-BR" sz="2600" b="1" strike="noStrike" spc="-1" dirty="0">
                 <a:solidFill>
                   <a:srgbClr val="8DC641"/>
                 </a:solidFill>
@@ -5571,7 +6009,7 @@
               </a:rPr>
               <a:t> Tecnologias envolvidas nas etapas</a:t>
             </a:r>
-            <a:endParaRPr lang="pt-BR" sz="2600" b="0" strike="noStrike" spc="-1">
+            <a:endParaRPr lang="pt-BR" sz="2600" b="0" strike="noStrike" spc="-1" dirty="0">
               <a:latin typeface="Arial"/>
             </a:endParaRPr>
           </a:p>
@@ -5579,7 +6017,7 @@
       </p:sp>
       <p:pic>
         <p:nvPicPr>
-          <p:cNvPr id="104" name="Google Shape;166;p39"/>
+          <p:cNvPr id="97" name="Google Shape;166;p39"/>
           <p:cNvPicPr/>
           <p:nvPr/>
         </p:nvPicPr>
@@ -5600,7 +6038,120 @@
           </a:ln>
         </p:spPr>
       </p:pic>
+      <p:pic>
+        <p:nvPicPr>
+          <p:cNvPr id="3" name="Imagem 2">
+            <a:extLst>
+              <a:ext uri="{FF2B5EF4-FFF2-40B4-BE49-F238E27FC236}">
+                <a16:creationId xmlns:a16="http://schemas.microsoft.com/office/drawing/2014/main" id="{FF155DAF-4F61-4320-8ACF-3D412C263C74}"/>
+              </a:ext>
+            </a:extLst>
+          </p:cNvPr>
+          <p:cNvPicPr>
+            <a:picLocks noChangeAspect="1"/>
+          </p:cNvPicPr>
+          <p:nvPr/>
+        </p:nvPicPr>
+        <p:blipFill>
+          <a:blip r:embed="rId4">
+            <a:extLst>
+              <a:ext uri="{28A0092B-C50C-407E-A947-70E740481C1C}">
+                <a14:useLocalDpi xmlns:a14="http://schemas.microsoft.com/office/drawing/2010/main" val="0"/>
+              </a:ext>
+            </a:extLst>
+          </a:blip>
+          <a:stretch>
+            <a:fillRect/>
+          </a:stretch>
+        </p:blipFill>
+        <p:spPr>
+          <a:xfrm>
+            <a:off x="973245" y="4564459"/>
+            <a:ext cx="2524349" cy="931204"/>
+          </a:xfrm>
+          <a:prstGeom prst="rect">
+            <a:avLst/>
+          </a:prstGeom>
+        </p:spPr>
+      </p:pic>
+      <p:pic>
+        <p:nvPicPr>
+          <p:cNvPr id="5" name="Imagem 4">
+            <a:extLst>
+              <a:ext uri="{FF2B5EF4-FFF2-40B4-BE49-F238E27FC236}">
+                <a16:creationId xmlns:a16="http://schemas.microsoft.com/office/drawing/2014/main" id="{518EC933-CE99-4CC5-B7BA-20B2C9EE5732}"/>
+              </a:ext>
+            </a:extLst>
+          </p:cNvPr>
+          <p:cNvPicPr>
+            <a:picLocks noChangeAspect="1"/>
+          </p:cNvPicPr>
+          <p:nvPr/>
+        </p:nvPicPr>
+        <p:blipFill>
+          <a:blip r:embed="rId5">
+            <a:extLst>
+              <a:ext uri="{28A0092B-C50C-407E-A947-70E740481C1C}">
+                <a14:useLocalDpi xmlns:a14="http://schemas.microsoft.com/office/drawing/2010/main" val="0"/>
+              </a:ext>
+            </a:extLst>
+          </a:blip>
+          <a:stretch>
+            <a:fillRect/>
+          </a:stretch>
+        </p:blipFill>
+        <p:spPr>
+          <a:xfrm>
+            <a:off x="8199204" y="4343899"/>
+            <a:ext cx="2362476" cy="1369435"/>
+          </a:xfrm>
+          <a:prstGeom prst="rect">
+            <a:avLst/>
+          </a:prstGeom>
+        </p:spPr>
+      </p:pic>
+      <p:pic>
+        <p:nvPicPr>
+          <p:cNvPr id="12" name="Imagem 11">
+            <a:extLst>
+              <a:ext uri="{FF2B5EF4-FFF2-40B4-BE49-F238E27FC236}">
+                <a16:creationId xmlns:a16="http://schemas.microsoft.com/office/drawing/2014/main" id="{A06665C9-AB61-407E-A29B-9CC609C5CDD6}"/>
+              </a:ext>
+            </a:extLst>
+          </p:cNvPr>
+          <p:cNvPicPr>
+            <a:picLocks noChangeAspect="1"/>
+          </p:cNvPicPr>
+          <p:nvPr/>
+        </p:nvPicPr>
+        <p:blipFill>
+          <a:blip r:embed="rId6">
+            <a:extLst>
+              <a:ext uri="{28A0092B-C50C-407E-A947-70E740481C1C}">
+                <a14:useLocalDpi xmlns:a14="http://schemas.microsoft.com/office/drawing/2010/main" val="0"/>
+              </a:ext>
+            </a:extLst>
+          </a:blip>
+          <a:stretch>
+            <a:fillRect/>
+          </a:stretch>
+        </p:blipFill>
+        <p:spPr>
+          <a:xfrm>
+            <a:off x="3676992" y="3192136"/>
+            <a:ext cx="4838015" cy="2303527"/>
+          </a:xfrm>
+          <a:prstGeom prst="rect">
+            <a:avLst/>
+          </a:prstGeom>
+        </p:spPr>
+      </p:pic>
     </p:spTree>
+    <p:extLst>
+      <p:ext uri="{BB962C8B-B14F-4D97-AF65-F5344CB8AC3E}">
+        <p14:creationId xmlns:p14="http://schemas.microsoft.com/office/powerpoint/2010/main" val="495282686"/>
+      </p:ext>
+    </p:extLst>
   </p:cSld>
   <p:clrMapOvr>
     <a:masterClrMapping/>
@@ -5662,7 +6213,7 @@
       </p:grpSpPr>
       <p:sp>
         <p:nvSpPr>
-          <p:cNvPr id="105" name="CustomShape 1"/>
+          <p:cNvPr id="98" name="CustomShape 1"/>
           <p:cNvSpPr/>
           <p:nvPr/>
         </p:nvSpPr>
@@ -5696,7 +6247,7 @@
       </p:sp>
       <p:pic>
         <p:nvPicPr>
-          <p:cNvPr id="106" name="Google Shape;89;p13"/>
+          <p:cNvPr id="99" name="Google Shape;89;p13"/>
           <p:cNvPicPr/>
           <p:nvPr/>
         </p:nvPicPr>
@@ -5719,14 +6270,14 @@
       </p:pic>
       <p:sp>
         <p:nvSpPr>
-          <p:cNvPr id="107" name="CustomShape 2"/>
+          <p:cNvPr id="100" name="CustomShape 2"/>
           <p:cNvSpPr/>
           <p:nvPr/>
         </p:nvSpPr>
         <p:spPr>
           <a:xfrm>
-            <a:off x="2423160" y="1809360"/>
-            <a:ext cx="7512480" cy="1322280"/>
+            <a:off x="2304000" y="2205000"/>
+            <a:ext cx="7512480" cy="1034280"/>
           </a:xfrm>
           <a:prstGeom prst="rect">
             <a:avLst/>
@@ -5782,11 +6333,21 @@
               <a:latin typeface="Arial"/>
             </a:endParaRPr>
           </a:p>
+          <a:p>
+            <a:pPr algn="ctr">
+              <a:lnSpc>
+                <a:spcPct val="100000"/>
+              </a:lnSpc>
+            </a:pPr>
+            <a:endParaRPr lang="pt-BR" sz="3200" b="0" strike="noStrike" spc="-1">
+              <a:latin typeface="Arial"/>
+            </a:endParaRPr>
+          </a:p>
         </p:txBody>
       </p:sp>
       <p:sp>
         <p:nvSpPr>
-          <p:cNvPr id="108" name="CustomShape 3"/>
+          <p:cNvPr id="101" name="CustomShape 3"/>
           <p:cNvSpPr/>
           <p:nvPr/>
         </p:nvSpPr>
@@ -5842,14 +6403,90 @@
       </p:sp>
       <p:sp>
         <p:nvSpPr>
-          <p:cNvPr id="109" name="CustomShape 4"/>
+          <p:cNvPr id="102" name="CustomShape 4"/>
           <p:cNvSpPr/>
           <p:nvPr/>
         </p:nvSpPr>
         <p:spPr>
           <a:xfrm>
-            <a:off x="2160000" y="2952000"/>
-            <a:ext cx="8205840" cy="459000"/>
+            <a:off x="2520000" y="3975840"/>
+            <a:ext cx="7991280" cy="1279440"/>
+          </a:xfrm>
+          <a:prstGeom prst="rect">
+            <a:avLst/>
+          </a:prstGeom>
+          <a:noFill/>
+          <a:ln>
+            <a:noFill/>
+          </a:ln>
+        </p:spPr>
+        <p:style>
+          <a:lnRef idx="0">
+            <a:scrgbClr r="0" g="0" b="0"/>
+          </a:lnRef>
+          <a:fillRef idx="0">
+            <a:scrgbClr r="0" g="0" b="0"/>
+          </a:fillRef>
+          <a:effectRef idx="0">
+            <a:scrgbClr r="0" g="0" b="0"/>
+          </a:effectRef>
+          <a:fontRef idx="minor"/>
+        </p:style>
+        <p:txBody>
+          <a:bodyPr lIns="0" tIns="0" rIns="0" bIns="0"/>
+          <a:lstStyle/>
+          <a:p>
+            <a:pPr>
+              <a:lnSpc>
+                <a:spcPct val="100000"/>
+              </a:lnSpc>
+            </a:pPr>
+            <a:r>
+              <a:rPr lang="pt-BR" sz="1800" b="1" strike="noStrike" spc="-1">
+                <a:solidFill>
+                  <a:srgbClr val="8DC641"/>
+                </a:solidFill>
+                <a:latin typeface="Arial"/>
+                <a:ea typeface="DejaVu Sans"/>
+              </a:rPr>
+              <a:t>Será usado técnicas de normalização de dados para evitarmos redundância dos dados no banco.</a:t>
+            </a:r>
+            <a:endParaRPr lang="pt-BR" sz="1800" b="0" strike="noStrike" spc="-1">
+              <a:latin typeface="Arial"/>
+            </a:endParaRPr>
+          </a:p>
+          <a:p>
+            <a:pPr>
+              <a:lnSpc>
+                <a:spcPct val="100000"/>
+              </a:lnSpc>
+            </a:pPr>
+            <a:endParaRPr lang="pt-BR" sz="1800" b="0" strike="noStrike" spc="-1">
+              <a:latin typeface="Arial"/>
+            </a:endParaRPr>
+          </a:p>
+          <a:p>
+            <a:pPr>
+              <a:lnSpc>
+                <a:spcPct val="100000"/>
+              </a:lnSpc>
+            </a:pPr>
+            <a:endParaRPr lang="pt-BR" sz="1800" b="0" strike="noStrike" spc="-1">
+              <a:latin typeface="Arial"/>
+            </a:endParaRPr>
+          </a:p>
+        </p:txBody>
+      </p:sp>
+      <p:sp>
+        <p:nvSpPr>
+          <p:cNvPr id="103" name="CustomShape 5"/>
+          <p:cNvSpPr/>
+          <p:nvPr/>
+        </p:nvSpPr>
+        <p:spPr>
+          <a:xfrm>
+            <a:off x="3168000" y="3140640"/>
+            <a:ext cx="5788440" cy="458640"/>
           </a:xfrm>
           <a:prstGeom prst="rect">
             <a:avLst/>
@@ -5888,7 +6525,7 @@
                 <a:latin typeface="Arial"/>
                 <a:ea typeface="Arial"/>
               </a:rPr>
-              <a:t>Aplicações das tecnologias (onde serão aplicadas)</a:t>
+              <a:t> Tecnologias envolvidas nas etapas</a:t>
             </a:r>
             <a:endParaRPr lang="pt-BR" sz="2600" b="0" strike="noStrike" spc="-1">
               <a:latin typeface="Arial"/>
@@ -5896,145 +6533,9 @@
           </a:p>
         </p:txBody>
       </p:sp>
-      <p:sp>
-        <p:nvSpPr>
-          <p:cNvPr id="110" name="CustomShape 5"/>
-          <p:cNvSpPr/>
-          <p:nvPr/>
-        </p:nvSpPr>
-        <p:spPr>
-          <a:xfrm>
-            <a:off x="1188000" y="3674520"/>
-            <a:ext cx="9812160" cy="1653120"/>
-          </a:xfrm>
-          <a:prstGeom prst="rect">
-            <a:avLst/>
-          </a:prstGeom>
-          <a:noFill/>
-          <a:ln>
-            <a:noFill/>
-          </a:ln>
-        </p:spPr>
-        <p:style>
-          <a:lnRef idx="0">
-            <a:scrgbClr r="0" g="0" b="0"/>
-          </a:lnRef>
-          <a:fillRef idx="0">
-            <a:scrgbClr r="0" g="0" b="0"/>
-          </a:fillRef>
-          <a:effectRef idx="0">
-            <a:scrgbClr r="0" g="0" b="0"/>
-          </a:effectRef>
-          <a:fontRef idx="minor"/>
-        </p:style>
-        <p:txBody>
-          <a:bodyPr lIns="90000" tIns="45000" rIns="90000" bIns="45000"/>
-          <a:lstStyle/>
-          <a:p>
-            <a:pPr algn="just">
-              <a:lnSpc>
-                <a:spcPct val="100000"/>
-              </a:lnSpc>
-            </a:pPr>
-            <a:r>
-              <a:rPr lang="pt-BR" sz="1800" b="1" strike="noStrike" spc="-1">
-                <a:solidFill>
-                  <a:srgbClr val="8DC641"/>
-                </a:solidFill>
-                <a:latin typeface="Arial"/>
-                <a:ea typeface="Arial"/>
-              </a:rPr>
-              <a:t>Para realizar a modelagem do sistema, será utilizado a ferramenta lucidchart</a:t>
-            </a:r>
-            <a:endParaRPr lang="pt-BR" sz="1800" b="0" strike="noStrike" spc="-1">
-              <a:latin typeface="Arial"/>
-            </a:endParaRPr>
-          </a:p>
-          <a:p>
-            <a:pPr algn="just">
-              <a:lnSpc>
-                <a:spcPct val="100000"/>
-              </a:lnSpc>
-            </a:pPr>
-            <a:r>
-              <a:rPr lang="pt-BR" sz="1800" b="1" strike="noStrike" spc="-1">
-                <a:solidFill>
-                  <a:srgbClr val="8DC641"/>
-                </a:solidFill>
-                <a:latin typeface="Arial"/>
-                <a:ea typeface="Arial"/>
-              </a:rPr>
-              <a:t>para fazermos os diagramas de classe e casos de uso do sistema.</a:t>
-            </a:r>
-            <a:endParaRPr lang="pt-BR" sz="1800" b="0" strike="noStrike" spc="-1">
-              <a:latin typeface="Arial"/>
-            </a:endParaRPr>
-          </a:p>
-          <a:p>
-            <a:pPr algn="just">
-              <a:lnSpc>
-                <a:spcPct val="100000"/>
-              </a:lnSpc>
-            </a:pPr>
-            <a:endParaRPr lang="pt-BR" sz="1800" b="0" strike="noStrike" spc="-1">
-              <a:latin typeface="Arial"/>
-            </a:endParaRPr>
-          </a:p>
-          <a:p>
-            <a:pPr algn="just">
-              <a:lnSpc>
-                <a:spcPct val="100000"/>
-              </a:lnSpc>
-            </a:pPr>
-            <a:r>
-              <a:rPr lang="pt-BR" sz="1800" b="1" strike="noStrike" spc="-1">
-                <a:solidFill>
-                  <a:srgbClr val="8DC641"/>
-                </a:solidFill>
-                <a:latin typeface="Arial"/>
-                <a:ea typeface="Arial"/>
-              </a:rPr>
-              <a:t>Para fazermos a modelagem do banco de dados, será usado o próprio mysql workbench</a:t>
-            </a:r>
-            <a:endParaRPr lang="pt-BR" sz="1800" b="0" strike="noStrike" spc="-1">
-              <a:latin typeface="Arial"/>
-            </a:endParaRPr>
-          </a:p>
-          <a:p>
-            <a:pPr algn="just">
-              <a:lnSpc>
-                <a:spcPct val="100000"/>
-              </a:lnSpc>
-            </a:pPr>
-            <a:r>
-              <a:rPr lang="pt-BR" sz="1800" b="1" strike="noStrike" spc="-1">
-                <a:solidFill>
-                  <a:srgbClr val="8DC641"/>
-                </a:solidFill>
-                <a:latin typeface="Arial"/>
-                <a:ea typeface="Arial"/>
-              </a:rPr>
-              <a:t>Pois quando fizermos o modelo lógico já poderemos convertê-lo  para o modelo físico</a:t>
-            </a:r>
-            <a:endParaRPr lang="pt-BR" sz="1800" b="0" strike="noStrike" spc="-1">
-              <a:latin typeface="Arial"/>
-            </a:endParaRPr>
-          </a:p>
-          <a:p>
-            <a:pPr algn="just">
-              <a:lnSpc>
-                <a:spcPct val="100000"/>
-              </a:lnSpc>
-            </a:pPr>
-            <a:endParaRPr lang="pt-BR" sz="1800" b="0" strike="noStrike" spc="-1">
-              <a:latin typeface="Arial"/>
-            </a:endParaRPr>
-          </a:p>
-        </p:txBody>
-      </p:sp>
       <p:pic>
         <p:nvPicPr>
-          <p:cNvPr id="111" name="Google Shape;166;p39"/>
+          <p:cNvPr id="104" name="Google Shape;166;p39"/>
           <p:cNvPicPr/>
           <p:nvPr/>
         </p:nvPicPr>
@@ -6117,7 +6618,7 @@
       </p:grpSpPr>
       <p:sp>
         <p:nvSpPr>
-          <p:cNvPr id="112" name="CustomShape 1"/>
+          <p:cNvPr id="105" name="CustomShape 1"/>
           <p:cNvSpPr/>
           <p:nvPr/>
         </p:nvSpPr>
@@ -6151,7 +6652,7 @@
       </p:sp>
       <p:pic>
         <p:nvPicPr>
-          <p:cNvPr id="113" name="Google Shape;89;p13"/>
+          <p:cNvPr id="106" name="Google Shape;89;p13"/>
           <p:cNvPicPr/>
           <p:nvPr/>
         </p:nvPicPr>
@@ -6174,13 +6675,13 @@
       </p:pic>
       <p:sp>
         <p:nvSpPr>
-          <p:cNvPr id="114" name="CustomShape 2"/>
+          <p:cNvPr id="107" name="CustomShape 2"/>
           <p:cNvSpPr/>
           <p:nvPr/>
         </p:nvSpPr>
         <p:spPr>
           <a:xfrm>
-            <a:off x="2160000" y="1872000"/>
+            <a:off x="2423160" y="1809360"/>
             <a:ext cx="7512480" cy="1322280"/>
           </a:xfrm>
           <a:prstGeom prst="rect">
@@ -6241,13 +6742,13 @@
       </p:sp>
       <p:sp>
         <p:nvSpPr>
-          <p:cNvPr id="115" name="CustomShape 3"/>
+          <p:cNvPr id="108" name="CustomShape 3"/>
           <p:cNvSpPr/>
           <p:nvPr/>
         </p:nvSpPr>
         <p:spPr>
           <a:xfrm>
-            <a:off x="461160" y="6479280"/>
+            <a:off x="360000" y="6479280"/>
             <a:ext cx="11130120" cy="720000"/>
           </a:xfrm>
           <a:prstGeom prst="rect">
@@ -6297,14 +6798,14 @@
       </p:sp>
       <p:sp>
         <p:nvSpPr>
-          <p:cNvPr id="116" name="CustomShape 4"/>
+          <p:cNvPr id="109" name="CustomShape 4"/>
           <p:cNvSpPr/>
           <p:nvPr/>
         </p:nvSpPr>
         <p:spPr>
           <a:xfrm>
-            <a:off x="4320000" y="2288880"/>
-            <a:ext cx="2332080" cy="914760"/>
+            <a:off x="2160000" y="2952000"/>
+            <a:ext cx="8205840" cy="459000"/>
           </a:xfrm>
           <a:prstGeom prst="rect">
             <a:avLst/>
@@ -6329,16 +6830,6 @@
         <p:txBody>
           <a:bodyPr lIns="90000" tIns="45000" rIns="90000" bIns="45000"/>
           <a:lstStyle/>
-          <a:p>
-            <a:pPr algn="ctr">
-              <a:lnSpc>
-                <a:spcPct val="100000"/>
-              </a:lnSpc>
-            </a:pPr>
-            <a:endParaRPr lang="pt-BR" sz="1800" b="0" strike="noStrike" spc="-1">
-              <a:latin typeface="Arial"/>
-            </a:endParaRPr>
-          </a:p>
           <a:p>
             <a:pPr>
               <a:lnSpc>
@@ -6353,7 +6844,7 @@
                 <a:latin typeface="Arial"/>
                 <a:ea typeface="Arial"/>
               </a:rPr>
-              <a:t> Cronograma </a:t>
+              <a:t>Aplicações das tecnologias (onde serão aplicadas)</a:t>
             </a:r>
             <a:endParaRPr lang="pt-BR" sz="2600" b="0" strike="noStrike" spc="-1">
               <a:latin typeface="Arial"/>
@@ -6363,14 +6854,14 @@
       </p:sp>
       <p:sp>
         <p:nvSpPr>
-          <p:cNvPr id="117" name="CustomShape 5"/>
+          <p:cNvPr id="110" name="CustomShape 5"/>
           <p:cNvSpPr/>
           <p:nvPr/>
         </p:nvSpPr>
         <p:spPr>
           <a:xfrm>
-            <a:off x="1944720" y="3493080"/>
-            <a:ext cx="7335720" cy="656640"/>
+            <a:off x="1188000" y="3674520"/>
+            <a:ext cx="9812160" cy="1653120"/>
           </a:xfrm>
           <a:prstGeom prst="rect">
             <a:avLst/>
@@ -6396,42 +6887,102 @@
           <a:bodyPr lIns="90000" tIns="45000" rIns="90000" bIns="45000"/>
           <a:lstStyle/>
           <a:p>
-            <a:pPr>
+            <a:pPr algn="just">
               <a:lnSpc>
                 <a:spcPct val="100000"/>
               </a:lnSpc>
             </a:pPr>
             <a:r>
-              <a:rPr lang="pt-BR" sz="2000" b="1" strike="noStrike" spc="-1">
+              <a:rPr lang="pt-BR" sz="1800" b="1" strike="noStrike" spc="-1">
                 <a:solidFill>
                   <a:srgbClr val="8DC641"/>
                 </a:solidFill>
                 <a:latin typeface="Arial"/>
                 <a:ea typeface="Arial"/>
               </a:rPr>
-              <a:t>durante as fazes do projeto, será usado a ferramenta trello </a:t>
+              <a:t>Para realizar a modelagem do sistema, será utilizado a ferramenta lucidchart</a:t>
             </a:r>
-            <a:endParaRPr lang="pt-BR" sz="2000" b="0" strike="noStrike" spc="-1">
-              <a:latin typeface="Arial"/>
-            </a:endParaRPr>
-          </a:p>
-          <a:p>
-            <a:pPr>
+            <a:endParaRPr lang="pt-BR" sz="1800" b="0" strike="noStrike" spc="-1">
+              <a:latin typeface="Arial"/>
+            </a:endParaRPr>
+          </a:p>
+          <a:p>
+            <a:pPr algn="just">
               <a:lnSpc>
                 <a:spcPct val="100000"/>
               </a:lnSpc>
             </a:pPr>
             <a:r>
-              <a:rPr lang="pt-BR" sz="2000" b="1" strike="noStrike" spc="-1">
+              <a:rPr lang="pt-BR" sz="1800" b="1" strike="noStrike" spc="-1">
                 <a:solidFill>
                   <a:srgbClr val="8DC641"/>
                 </a:solidFill>
                 <a:latin typeface="Arial"/>
                 <a:ea typeface="Arial"/>
               </a:rPr>
-              <a:t>para auxiliar no planejamento das tarefas.</a:t>
+              <a:t>para fazermos os diagramas de classe e casos de uso do sistema.</a:t>
             </a:r>
-            <a:endParaRPr lang="pt-BR" sz="2000" b="0" strike="noStrike" spc="-1">
+            <a:endParaRPr lang="pt-BR" sz="1800" b="0" strike="noStrike" spc="-1">
+              <a:latin typeface="Arial"/>
+            </a:endParaRPr>
+          </a:p>
+          <a:p>
+            <a:pPr algn="just">
+              <a:lnSpc>
+                <a:spcPct val="100000"/>
+              </a:lnSpc>
+            </a:pPr>
+            <a:endParaRPr lang="pt-BR" sz="1800" b="0" strike="noStrike" spc="-1">
+              <a:latin typeface="Arial"/>
+            </a:endParaRPr>
+          </a:p>
+          <a:p>
+            <a:pPr algn="just">
+              <a:lnSpc>
+                <a:spcPct val="100000"/>
+              </a:lnSpc>
+            </a:pPr>
+            <a:r>
+              <a:rPr lang="pt-BR" sz="1800" b="1" strike="noStrike" spc="-1">
+                <a:solidFill>
+                  <a:srgbClr val="8DC641"/>
+                </a:solidFill>
+                <a:latin typeface="Arial"/>
+                <a:ea typeface="Arial"/>
+              </a:rPr>
+              <a:t>Para fazermos a modelagem do banco de dados, será usado o próprio mysql workbench</a:t>
+            </a:r>
+            <a:endParaRPr lang="pt-BR" sz="1800" b="0" strike="noStrike" spc="-1">
+              <a:latin typeface="Arial"/>
+            </a:endParaRPr>
+          </a:p>
+          <a:p>
+            <a:pPr algn="just">
+              <a:lnSpc>
+                <a:spcPct val="100000"/>
+              </a:lnSpc>
+            </a:pPr>
+            <a:r>
+              <a:rPr lang="pt-BR" sz="1800" b="1" strike="noStrike" spc="-1">
+                <a:solidFill>
+                  <a:srgbClr val="8DC641"/>
+                </a:solidFill>
+                <a:latin typeface="Arial"/>
+                <a:ea typeface="Arial"/>
+              </a:rPr>
+              <a:t>Pois quando fizermos o modelo lógico já poderemos convertê-lo  para o modelo físico</a:t>
+            </a:r>
+            <a:endParaRPr lang="pt-BR" sz="1800" b="0" strike="noStrike" spc="-1">
+              <a:latin typeface="Arial"/>
+            </a:endParaRPr>
+          </a:p>
+          <a:p>
+            <a:pPr algn="just">
+              <a:lnSpc>
+                <a:spcPct val="100000"/>
+              </a:lnSpc>
+            </a:pPr>
+            <a:endParaRPr lang="pt-BR" sz="1800" b="0" strike="noStrike" spc="-1">
               <a:latin typeface="Arial"/>
             </a:endParaRPr>
           </a:p>
@@ -6439,7 +6990,7 @@
       </p:sp>
       <p:pic>
         <p:nvPicPr>
-          <p:cNvPr id="118" name="Google Shape;166;p39"/>
+          <p:cNvPr id="111" name="Google Shape;166;p39"/>
           <p:cNvPicPr/>
           <p:nvPr/>
         </p:nvPicPr>
@@ -6522,7 +7073,7 @@
       </p:grpSpPr>
       <p:sp>
         <p:nvSpPr>
-          <p:cNvPr id="119" name="CustomShape 1"/>
+          <p:cNvPr id="112" name="CustomShape 1"/>
           <p:cNvSpPr/>
           <p:nvPr/>
         </p:nvSpPr>
@@ -6556,7 +7107,7 @@
       </p:sp>
       <p:pic>
         <p:nvPicPr>
-          <p:cNvPr id="120" name="Google Shape;89;p13"/>
+          <p:cNvPr id="113" name="Google Shape;89;p13"/>
           <p:cNvPicPr/>
           <p:nvPr/>
         </p:nvPicPr>
@@ -6567,7 +7118,7 @@
         <p:spPr>
           <a:xfrm>
             <a:off x="10561680" y="0"/>
-            <a:ext cx="1083240" cy="1800000"/>
+            <a:ext cx="1083240" cy="2507040"/>
           </a:xfrm>
           <a:prstGeom prst="rect">
             <a:avLst/>
@@ -6579,7 +7130,74 @@
       </p:pic>
       <p:sp>
         <p:nvSpPr>
-          <p:cNvPr id="121" name="CustomShape 2"/>
+          <p:cNvPr id="114" name="CustomShape 2"/>
+          <p:cNvSpPr/>
+          <p:nvPr/>
+        </p:nvSpPr>
+        <p:spPr>
+          <a:xfrm>
+            <a:off x="2160000" y="1872000"/>
+            <a:ext cx="7512480" cy="1322280"/>
+          </a:xfrm>
+          <a:prstGeom prst="rect">
+            <a:avLst/>
+          </a:prstGeom>
+          <a:noFill/>
+          <a:ln>
+            <a:noFill/>
+          </a:ln>
+        </p:spPr>
+        <p:style>
+          <a:lnRef idx="0">
+            <a:scrgbClr r="0" g="0" b="0"/>
+          </a:lnRef>
+          <a:fillRef idx="0">
+            <a:scrgbClr r="0" g="0" b="0"/>
+          </a:fillRef>
+          <a:effectRef idx="0">
+            <a:scrgbClr r="0" g="0" b="0"/>
+          </a:effectRef>
+          <a:fontRef idx="minor"/>
+        </p:style>
+        <p:txBody>
+          <a:bodyPr lIns="90000" tIns="45000" rIns="90000" bIns="45000"/>
+          <a:lstStyle/>
+          <a:p>
+            <a:pPr algn="ctr">
+              <a:lnSpc>
+                <a:spcPct val="100000"/>
+              </a:lnSpc>
+            </a:pPr>
+            <a:br/>
+            <a:r>
+              <a:rPr lang="pt-BR" sz="3200" b="1" strike="noStrike" spc="-1">
+                <a:solidFill>
+                  <a:srgbClr val="8DC641"/>
+                </a:solidFill>
+                <a:latin typeface="Arial"/>
+                <a:ea typeface="Arial"/>
+              </a:rPr>
+              <a:t>Prática  de análise de sistemas</a:t>
+            </a:r>
+            <a:endParaRPr lang="pt-BR" sz="3200" b="0" strike="noStrike" spc="-1">
+              <a:latin typeface="Arial"/>
+            </a:endParaRPr>
+          </a:p>
+          <a:p>
+            <a:pPr algn="ctr">
+              <a:lnSpc>
+                <a:spcPct val="100000"/>
+              </a:lnSpc>
+            </a:pPr>
+            <a:endParaRPr lang="pt-BR" sz="3200" b="0" strike="noStrike" spc="-1">
+              <a:latin typeface="Arial"/>
+            </a:endParaRPr>
+          </a:p>
+        </p:txBody>
+      </p:sp>
+      <p:sp>
+        <p:nvSpPr>
+          <p:cNvPr id="115" name="CustomShape 3"/>
           <p:cNvSpPr/>
           <p:nvPr/>
         </p:nvSpPr>
@@ -6635,13 +7253,13 @@
       </p:sp>
       <p:sp>
         <p:nvSpPr>
-          <p:cNvPr id="122" name="CustomShape 3"/>
+          <p:cNvPr id="116" name="CustomShape 4"/>
           <p:cNvSpPr/>
           <p:nvPr/>
         </p:nvSpPr>
         <p:spPr>
           <a:xfrm>
-            <a:off x="4320000" y="1316880"/>
+            <a:off x="4320000" y="2288880"/>
             <a:ext cx="2332080" cy="914760"/>
           </a:xfrm>
           <a:prstGeom prst="rect">
@@ -6699,9 +7317,105 @@
           </a:p>
         </p:txBody>
       </p:sp>
+      <p:sp>
+        <p:nvSpPr>
+          <p:cNvPr id="117" name="CustomShape 5"/>
+          <p:cNvSpPr/>
+          <p:nvPr/>
+        </p:nvSpPr>
+        <p:spPr>
+          <a:xfrm>
+            <a:off x="1944720" y="3493080"/>
+            <a:ext cx="7335720" cy="656640"/>
+          </a:xfrm>
+          <a:prstGeom prst="rect">
+            <a:avLst/>
+          </a:prstGeom>
+          <a:noFill/>
+          <a:ln>
+            <a:noFill/>
+          </a:ln>
+        </p:spPr>
+        <p:style>
+          <a:lnRef idx="0">
+            <a:scrgbClr r="0" g="0" b="0"/>
+          </a:lnRef>
+          <a:fillRef idx="0">
+            <a:scrgbClr r="0" g="0" b="0"/>
+          </a:fillRef>
+          <a:effectRef idx="0">
+            <a:scrgbClr r="0" g="0" b="0"/>
+          </a:effectRef>
+          <a:fontRef idx="minor"/>
+        </p:style>
+        <p:txBody>
+          <a:bodyPr lIns="90000" tIns="45000" rIns="90000" bIns="45000"/>
+          <a:lstStyle/>
+          <a:p>
+            <a:pPr>
+              <a:lnSpc>
+                <a:spcPct val="100000"/>
+              </a:lnSpc>
+            </a:pPr>
+            <a:r>
+              <a:rPr lang="pt-BR" sz="2000" b="1" spc="-1" dirty="0">
+                <a:solidFill>
+                  <a:srgbClr val="8DC641"/>
+                </a:solidFill>
+                <a:latin typeface="Arial"/>
+                <a:ea typeface="Arial"/>
+              </a:rPr>
+              <a:t>D</a:t>
+            </a:r>
+            <a:r>
+              <a:rPr lang="pt-BR" sz="2000" b="1" strike="noStrike" spc="-1" dirty="0">
+                <a:solidFill>
+                  <a:srgbClr val="8DC641"/>
+                </a:solidFill>
+                <a:latin typeface="Arial"/>
+                <a:ea typeface="Arial"/>
+              </a:rPr>
+              <a:t>urante as fases do projeto, será usado a ferramenta </a:t>
+            </a:r>
+            <a:r>
+              <a:rPr lang="pt-BR" sz="2000" b="1" spc="-1" dirty="0" err="1">
+                <a:solidFill>
+                  <a:srgbClr val="8DC641"/>
+                </a:solidFill>
+                <a:latin typeface="Arial"/>
+                <a:ea typeface="Arial"/>
+              </a:rPr>
+              <a:t>T</a:t>
+            </a:r>
+            <a:r>
+              <a:rPr lang="pt-BR" sz="2000" b="1" strike="noStrike" spc="-1" dirty="0" err="1">
+                <a:solidFill>
+                  <a:srgbClr val="8DC641"/>
+                </a:solidFill>
+                <a:latin typeface="Arial"/>
+                <a:ea typeface="Arial"/>
+              </a:rPr>
+              <a:t>rello</a:t>
+            </a:r>
+            <a:r>
+              <a:rPr lang="pt-BR" sz="2000" b="1" strike="noStrike" spc="-1" dirty="0">
+                <a:solidFill>
+                  <a:srgbClr val="8DC641"/>
+                </a:solidFill>
+                <a:latin typeface="Arial"/>
+                <a:ea typeface="Arial"/>
+              </a:rPr>
+              <a:t> para auxiliar no planejamento das tarefas.</a:t>
+            </a:r>
+            <a:endParaRPr lang="pt-BR" sz="2000" b="0" strike="noStrike" spc="-1" dirty="0">
+              <a:latin typeface="Arial"/>
+            </a:endParaRPr>
+          </a:p>
+        </p:txBody>
+      </p:sp>
       <p:pic>
         <p:nvPicPr>
-          <p:cNvPr id="123" name="Imagem 122"/>
+          <p:cNvPr id="118" name="Google Shape;166;p39"/>
           <p:cNvPicPr/>
           <p:nvPr/>
         </p:nvPicPr>
@@ -6711,8 +7425,8 @@
         </p:blipFill>
         <p:spPr>
           <a:xfrm>
-            <a:off x="562320" y="2016000"/>
-            <a:ext cx="10417680" cy="4842000"/>
+            <a:off x="235080" y="283680"/>
+            <a:ext cx="4000680" cy="1019520"/>
           </a:xfrm>
           <a:prstGeom prst="rect">
             <a:avLst/>
@@ -6724,25 +7438,38 @@
       </p:pic>
       <p:pic>
         <p:nvPicPr>
-          <p:cNvPr id="124" name="Google Shape;166;p39"/>
-          <p:cNvPicPr/>
+          <p:cNvPr id="3" name="Imagem 2">
+            <a:extLst>
+              <a:ext uri="{FF2B5EF4-FFF2-40B4-BE49-F238E27FC236}">
+                <a16:creationId xmlns:a16="http://schemas.microsoft.com/office/drawing/2014/main" id="{A6923CF4-406F-4D8D-9102-B58283090856}"/>
+              </a:ext>
+            </a:extLst>
+          </p:cNvPr>
+          <p:cNvPicPr>
+            <a:picLocks noChangeAspect="1"/>
+          </p:cNvPicPr>
           <p:nvPr/>
         </p:nvPicPr>
         <p:blipFill>
-          <a:blip r:embed="rId4"/>
-          <a:stretch/>
+          <a:blip r:embed="rId4">
+            <a:extLst>
+              <a:ext uri="{28A0092B-C50C-407E-A947-70E740481C1C}">
+                <a14:useLocalDpi xmlns:a14="http://schemas.microsoft.com/office/drawing/2010/main" val="0"/>
+              </a:ext>
+            </a:extLst>
+          </a:blip>
+          <a:stretch>
+            <a:fillRect/>
+          </a:stretch>
         </p:blipFill>
         <p:spPr>
           <a:xfrm>
-            <a:off x="235080" y="283680"/>
-            <a:ext cx="4000680" cy="1019520"/>
-          </a:xfrm>
-          <a:prstGeom prst="rect">
-            <a:avLst/>
-          </a:prstGeom>
-          <a:ln>
-            <a:noFill/>
-          </a:ln>
+            <a:off x="4320000" y="4592670"/>
+            <a:ext cx="3614509" cy="966090"/>
+          </a:xfrm>
+          <a:prstGeom prst="rect">
+            <a:avLst/>
+          </a:prstGeom>
         </p:spPr>
       </p:pic>
     </p:spTree>
@@ -6926,8 +7653,8 @@
         </p:nvSpPr>
         <p:spPr>
           <a:xfrm>
-            <a:off x="4319999" y="1316880"/>
-            <a:ext cx="4004193" cy="1237134"/>
+            <a:off x="4320000" y="1316880"/>
+            <a:ext cx="2332080" cy="914760"/>
           </a:xfrm>
           <a:prstGeom prst="rect">
             <a:avLst/>
@@ -6958,7 +7685,7 @@
                 <a:spcPct val="100000"/>
               </a:lnSpc>
             </a:pPr>
-            <a:endParaRPr lang="pt-BR" sz="1800" b="0" strike="noStrike" spc="-1" dirty="0">
+            <a:endParaRPr lang="pt-BR" sz="1800" b="0" strike="noStrike" spc="-1">
               <a:latin typeface="Arial"/>
             </a:endParaRPr>
           </a:p>
@@ -6969,36 +7696,16 @@
               </a:lnSpc>
             </a:pPr>
             <a:r>
-              <a:rPr lang="pt-BR" sz="2600" b="1" strike="noStrike" spc="-1" dirty="0">
+              <a:rPr lang="pt-BR" sz="2600" b="1" strike="noStrike" spc="-1">
                 <a:solidFill>
                   <a:srgbClr val="8DC641"/>
                 </a:solidFill>
                 <a:latin typeface="Arial"/>
                 <a:ea typeface="Arial"/>
               </a:rPr>
-              <a:t> Cronograma de </a:t>
+              <a:t> Cronograma </a:t>
             </a:r>
-            <a:r>
-              <a:rPr lang="pt-BR" sz="2600" b="1" strike="noStrike" spc="-1" dirty="0" err="1">
-                <a:solidFill>
-                  <a:srgbClr val="8DC641"/>
-                </a:solidFill>
-                <a:latin typeface="Arial"/>
-                <a:ea typeface="Arial"/>
-              </a:rPr>
-              <a:t>Gantt</a:t>
-            </a:r>
-            <a:r>
-              <a:rPr lang="pt-BR" sz="2600" b="1" strike="noStrike" spc="-1" dirty="0">
-                <a:solidFill>
-                  <a:srgbClr val="8DC641"/>
-                </a:solidFill>
-                <a:latin typeface="Arial"/>
-                <a:ea typeface="Arial"/>
-              </a:rPr>
-              <a:t> </a:t>
-            </a:r>
-            <a:endParaRPr lang="pt-BR" sz="2600" b="0" strike="noStrike" spc="-1" dirty="0">
+            <a:endParaRPr lang="pt-BR" sz="2600" b="0" strike="noStrike" spc="-1">
               <a:latin typeface="Arial"/>
             </a:endParaRPr>
           </a:p>
@@ -7006,7 +7713,7 @@
       </p:sp>
       <p:pic>
         <p:nvPicPr>
-          <p:cNvPr id="124" name="Google Shape;166;p39"/>
+          <p:cNvPr id="123" name="Imagem 122"/>
           <p:cNvPicPr/>
           <p:nvPr/>
         </p:nvPicPr>
@@ -7016,8 +7723,8 @@
         </p:blipFill>
         <p:spPr>
           <a:xfrm>
-            <a:off x="235080" y="283680"/>
-            <a:ext cx="4000680" cy="1019520"/>
+            <a:off x="562320" y="2016000"/>
+            <a:ext cx="10417680" cy="4842000"/>
           </a:xfrm>
           <a:prstGeom prst="rect">
             <a:avLst/>
@@ -7029,46 +7736,28 @@
       </p:pic>
       <p:pic>
         <p:nvPicPr>
-          <p:cNvPr id="3" name="Imagem 2">
-            <a:extLst>
-              <a:ext uri="{FF2B5EF4-FFF2-40B4-BE49-F238E27FC236}">
-                <a16:creationId xmlns:a16="http://schemas.microsoft.com/office/drawing/2014/main" id="{F9E6EB3A-2761-42AE-A9D6-AE4464A22E68}"/>
-              </a:ext>
-            </a:extLst>
-          </p:cNvPr>
-          <p:cNvPicPr>
-            <a:picLocks noChangeAspect="1"/>
-          </p:cNvPicPr>
+          <p:cNvPr id="124" name="Google Shape;166;p39"/>
+          <p:cNvPicPr/>
           <p:nvPr/>
         </p:nvPicPr>
         <p:blipFill>
-          <a:blip r:embed="rId4">
-            <a:extLst>
-              <a:ext uri="{28A0092B-C50C-407E-A947-70E740481C1C}">
-                <a14:useLocalDpi xmlns:a14="http://schemas.microsoft.com/office/drawing/2010/main" val="0"/>
-              </a:ext>
-            </a:extLst>
-          </a:blip>
-          <a:stretch>
-            <a:fillRect/>
-          </a:stretch>
+          <a:blip r:embed="rId4"/>
+          <a:stretch/>
         </p:blipFill>
         <p:spPr>
           <a:xfrm>
-            <a:off x="2293138" y="2015488"/>
-            <a:ext cx="7939504" cy="4463792"/>
-          </a:xfrm>
-          <a:prstGeom prst="rect">
-            <a:avLst/>
-          </a:prstGeom>
+            <a:off x="235080" y="283680"/>
+            <a:ext cx="4000680" cy="1019520"/>
+          </a:xfrm>
+          <a:prstGeom prst="rect">
+            <a:avLst/>
+          </a:prstGeom>
+          <a:ln>
+            <a:noFill/>
+          </a:ln>
         </p:spPr>
       </p:pic>
     </p:spTree>
-    <p:extLst>
-      <p:ext uri="{BB962C8B-B14F-4D97-AF65-F5344CB8AC3E}">
-        <p14:creationId xmlns:p14="http://schemas.microsoft.com/office/powerpoint/2010/main" val="1631031712"/>
-      </p:ext>
-    </p:extLst>
   </p:cSld>
   <p:clrMapOvr>
     <a:masterClrMapping/>

</xml_diff>